<commit_message>
mode returns/prints mode, adjust show, update doc
git-svn-id: svn+ssh://cdcvs.fnal.gov/cvs/projects/trace-svn/trunk@225 f0fafde3-ccc7-4eb4-bb98-6daa41875d3e
</commit_message>
<xml_diff>
--- a/trace/doc/trace.pptx
+++ b/trace/doc/trace.pptx
@@ -4,14 +4,25 @@
   <p:sldMasterIdLst>
     <p:sldMasterId id="2147483648" r:id="rId1"/>
   </p:sldMasterIdLst>
+  <p:notesMasterIdLst>
+    <p:notesMasterId r:id="rId14"/>
+  </p:notesMasterIdLst>
+  <p:handoutMasterIdLst>
+    <p:handoutMasterId r:id="rId15"/>
+  </p:handoutMasterIdLst>
   <p:sldIdLst>
     <p:sldId id="256" r:id="rId2"/>
     <p:sldId id="262" r:id="rId3"/>
-    <p:sldId id="258" r:id="rId4"/>
-    <p:sldId id="259" r:id="rId5"/>
-    <p:sldId id="260" r:id="rId6"/>
-    <p:sldId id="263" r:id="rId7"/>
-    <p:sldId id="257" r:id="rId8"/>
+    <p:sldId id="267" r:id="rId4"/>
+    <p:sldId id="264" r:id="rId5"/>
+    <p:sldId id="266" r:id="rId6"/>
+    <p:sldId id="268" r:id="rId7"/>
+    <p:sldId id="265" r:id="rId8"/>
+    <p:sldId id="269" r:id="rId9"/>
+    <p:sldId id="258" r:id="rId10"/>
+    <p:sldId id="259" r:id="rId11"/>
+    <p:sldId id="260" r:id="rId12"/>
+    <p:sldId id="263" r:id="rId13"/>
   </p:sldIdLst>
   <p:sldSz cx="9144000" cy="6858000" type="screen4x3"/>
   <p:notesSz cx="6858000" cy="9144000"/>
@@ -113,6 +124,607 @@
 </p:presentation>
 </file>
 
+<file path=ppt/handoutMasters/handoutMaster1.xml><?xml version="1.0" encoding="utf-8"?>
+<p:handoutMaster xmlns:a="http://schemas.openxmlformats.org/drawingml/2006/main" xmlns:r="http://schemas.openxmlformats.org/officeDocument/2006/relationships" xmlns:p="http://schemas.openxmlformats.org/presentationml/2006/main">
+  <p:cSld>
+    <p:bg>
+      <p:bgRef idx="1001">
+        <a:schemeClr val="bg1"/>
+      </p:bgRef>
+    </p:bg>
+    <p:spTree>
+      <p:nvGrpSpPr>
+        <p:cNvPr id="1" name=""/>
+        <p:cNvGrpSpPr/>
+        <p:nvPr/>
+      </p:nvGrpSpPr>
+      <p:grpSpPr>
+        <a:xfrm>
+          <a:off x="0" y="0"/>
+          <a:ext cx="0" cy="0"/>
+          <a:chOff x="0" y="0"/>
+          <a:chExt cx="0" cy="0"/>
+        </a:xfrm>
+      </p:grpSpPr>
+      <p:sp>
+        <p:nvSpPr>
+          <p:cNvPr id="2" name="Header Placeholder 1"/>
+          <p:cNvSpPr>
+            <a:spLocks noGrp="1"/>
+          </p:cNvSpPr>
+          <p:nvPr>
+            <p:ph type="hdr" sz="quarter"/>
+          </p:nvPr>
+        </p:nvSpPr>
+        <p:spPr>
+          <a:xfrm>
+            <a:off x="0" y="0"/>
+            <a:ext cx="2971800" cy="457200"/>
+          </a:xfrm>
+          <a:prstGeom prst="rect">
+            <a:avLst/>
+          </a:prstGeom>
+        </p:spPr>
+        <p:txBody>
+          <a:bodyPr vert="horz" lIns="91440" tIns="45720" rIns="91440" bIns="45720" rtlCol="0"/>
+          <a:lstStyle>
+            <a:lvl1pPr algn="l">
+              <a:defRPr sz="1200"/>
+            </a:lvl1pPr>
+          </a:lstStyle>
+          <a:p>
+            <a:endParaRPr lang="en-US"/>
+          </a:p>
+        </p:txBody>
+      </p:sp>
+      <p:sp>
+        <p:nvSpPr>
+          <p:cNvPr id="3" name="Date Placeholder 2"/>
+          <p:cNvSpPr>
+            <a:spLocks noGrp="1"/>
+          </p:cNvSpPr>
+          <p:nvPr>
+            <p:ph type="dt" sz="quarter" idx="1"/>
+          </p:nvPr>
+        </p:nvSpPr>
+        <p:spPr>
+          <a:xfrm>
+            <a:off x="3884613" y="0"/>
+            <a:ext cx="2971800" cy="457200"/>
+          </a:xfrm>
+          <a:prstGeom prst="rect">
+            <a:avLst/>
+          </a:prstGeom>
+        </p:spPr>
+        <p:txBody>
+          <a:bodyPr vert="horz" lIns="91440" tIns="45720" rIns="91440" bIns="45720" rtlCol="0"/>
+          <a:lstStyle>
+            <a:lvl1pPr algn="r">
+              <a:defRPr sz="1200"/>
+            </a:lvl1pPr>
+          </a:lstStyle>
+          <a:p>
+            <a:fld id="{A2FEBFDB-231B-674F-910D-B890E9DE9DBA}" type="datetimeFigureOut">
+              <a:rPr lang="en-US" smtClean="0"/>
+              <a:t>3/12/14</a:t>
+            </a:fld>
+            <a:endParaRPr lang="en-US"/>
+          </a:p>
+        </p:txBody>
+      </p:sp>
+      <p:sp>
+        <p:nvSpPr>
+          <p:cNvPr id="4" name="Footer Placeholder 3"/>
+          <p:cNvSpPr>
+            <a:spLocks noGrp="1"/>
+          </p:cNvSpPr>
+          <p:nvPr>
+            <p:ph type="ftr" sz="quarter" idx="2"/>
+          </p:nvPr>
+        </p:nvSpPr>
+        <p:spPr>
+          <a:xfrm>
+            <a:off x="0" y="8685213"/>
+            <a:ext cx="2971800" cy="457200"/>
+          </a:xfrm>
+          <a:prstGeom prst="rect">
+            <a:avLst/>
+          </a:prstGeom>
+        </p:spPr>
+        <p:txBody>
+          <a:bodyPr vert="horz" lIns="91440" tIns="45720" rIns="91440" bIns="45720" rtlCol="0" anchor="b"/>
+          <a:lstStyle>
+            <a:lvl1pPr algn="l">
+              <a:defRPr sz="1200"/>
+            </a:lvl1pPr>
+          </a:lstStyle>
+          <a:p>
+            <a:endParaRPr lang="en-US"/>
+          </a:p>
+        </p:txBody>
+      </p:sp>
+      <p:sp>
+        <p:nvSpPr>
+          <p:cNvPr id="5" name="Slide Number Placeholder 4"/>
+          <p:cNvSpPr>
+            <a:spLocks noGrp="1"/>
+          </p:cNvSpPr>
+          <p:nvPr>
+            <p:ph type="sldNum" sz="quarter" idx="3"/>
+          </p:nvPr>
+        </p:nvSpPr>
+        <p:spPr>
+          <a:xfrm>
+            <a:off x="3884613" y="8685213"/>
+            <a:ext cx="2971800" cy="457200"/>
+          </a:xfrm>
+          <a:prstGeom prst="rect">
+            <a:avLst/>
+          </a:prstGeom>
+        </p:spPr>
+        <p:txBody>
+          <a:bodyPr vert="horz" lIns="91440" tIns="45720" rIns="91440" bIns="45720" rtlCol="0" anchor="b"/>
+          <a:lstStyle>
+            <a:lvl1pPr algn="r">
+              <a:defRPr sz="1200"/>
+            </a:lvl1pPr>
+          </a:lstStyle>
+          <a:p>
+            <a:fld id="{2368A9A3-DF69-5741-AC82-500B60F08468}" type="slidenum">
+              <a:rPr lang="en-US" smtClean="0"/>
+              <a:t>‹#›</a:t>
+            </a:fld>
+            <a:endParaRPr lang="en-US"/>
+          </a:p>
+        </p:txBody>
+      </p:sp>
+    </p:spTree>
+    <p:extLst>
+      <p:ext uri="{BB962C8B-B14F-4D97-AF65-F5344CB8AC3E}">
+        <p14:creationId xmlns:p14="http://schemas.microsoft.com/office/powerpoint/2010/main" val="225052419"/>
+      </p:ext>
+    </p:extLst>
+  </p:cSld>
+  <p:clrMap bg1="lt1" tx1="dk1" bg2="lt2" tx2="dk2" accent1="accent1" accent2="accent2" accent3="accent3" accent4="accent4" accent5="accent5" accent6="accent6" hlink="hlink" folHlink="folHlink"/>
+  <p:hf hdr="0" ftr="0" dt="0"/>
+</p:handoutMaster>
+</file>
+
+<file path=ppt/notesMasters/notesMaster1.xml><?xml version="1.0" encoding="utf-8"?>
+<p:notesMaster xmlns:a="http://schemas.openxmlformats.org/drawingml/2006/main" xmlns:r="http://schemas.openxmlformats.org/officeDocument/2006/relationships" xmlns:p="http://schemas.openxmlformats.org/presentationml/2006/main">
+  <p:cSld>
+    <p:bg>
+      <p:bgRef idx="1001">
+        <a:schemeClr val="bg1"/>
+      </p:bgRef>
+    </p:bg>
+    <p:spTree>
+      <p:nvGrpSpPr>
+        <p:cNvPr id="1" name=""/>
+        <p:cNvGrpSpPr/>
+        <p:nvPr/>
+      </p:nvGrpSpPr>
+      <p:grpSpPr>
+        <a:xfrm>
+          <a:off x="0" y="0"/>
+          <a:ext cx="0" cy="0"/>
+          <a:chOff x="0" y="0"/>
+          <a:chExt cx="0" cy="0"/>
+        </a:xfrm>
+      </p:grpSpPr>
+      <p:sp>
+        <p:nvSpPr>
+          <p:cNvPr id="2" name="Header Placeholder 1"/>
+          <p:cNvSpPr>
+            <a:spLocks noGrp="1"/>
+          </p:cNvSpPr>
+          <p:nvPr>
+            <p:ph type="hdr" sz="quarter"/>
+          </p:nvPr>
+        </p:nvSpPr>
+        <p:spPr>
+          <a:xfrm>
+            <a:off x="0" y="0"/>
+            <a:ext cx="2971800" cy="457200"/>
+          </a:xfrm>
+          <a:prstGeom prst="rect">
+            <a:avLst/>
+          </a:prstGeom>
+        </p:spPr>
+        <p:txBody>
+          <a:bodyPr vert="horz" lIns="91440" tIns="45720" rIns="91440" bIns="45720" rtlCol="0"/>
+          <a:lstStyle>
+            <a:lvl1pPr algn="l">
+              <a:defRPr sz="1200"/>
+            </a:lvl1pPr>
+          </a:lstStyle>
+          <a:p>
+            <a:endParaRPr lang="en-US"/>
+          </a:p>
+        </p:txBody>
+      </p:sp>
+      <p:sp>
+        <p:nvSpPr>
+          <p:cNvPr id="3" name="Date Placeholder 2"/>
+          <p:cNvSpPr>
+            <a:spLocks noGrp="1"/>
+          </p:cNvSpPr>
+          <p:nvPr>
+            <p:ph type="dt" idx="1"/>
+          </p:nvPr>
+        </p:nvSpPr>
+        <p:spPr>
+          <a:xfrm>
+            <a:off x="3884613" y="0"/>
+            <a:ext cx="2971800" cy="457200"/>
+          </a:xfrm>
+          <a:prstGeom prst="rect">
+            <a:avLst/>
+          </a:prstGeom>
+        </p:spPr>
+        <p:txBody>
+          <a:bodyPr vert="horz" lIns="91440" tIns="45720" rIns="91440" bIns="45720" rtlCol="0"/>
+          <a:lstStyle>
+            <a:lvl1pPr algn="r">
+              <a:defRPr sz="1200"/>
+            </a:lvl1pPr>
+          </a:lstStyle>
+          <a:p>
+            <a:fld id="{D5EAA2E6-C9CE-534C-9D4C-804D2B58C141}" type="datetimeFigureOut">
+              <a:rPr lang="en-US" smtClean="0"/>
+              <a:t>3/12/14</a:t>
+            </a:fld>
+            <a:endParaRPr lang="en-US"/>
+          </a:p>
+        </p:txBody>
+      </p:sp>
+      <p:sp>
+        <p:nvSpPr>
+          <p:cNvPr id="4" name="Slide Image Placeholder 3"/>
+          <p:cNvSpPr>
+            <a:spLocks noGrp="1" noRot="1" noChangeAspect="1"/>
+          </p:cNvSpPr>
+          <p:nvPr>
+            <p:ph type="sldImg" idx="2"/>
+          </p:nvPr>
+        </p:nvSpPr>
+        <p:spPr>
+          <a:xfrm>
+            <a:off x="1143000" y="685800"/>
+            <a:ext cx="4572000" cy="3429000"/>
+          </a:xfrm>
+          <a:prstGeom prst="rect">
+            <a:avLst/>
+          </a:prstGeom>
+          <a:noFill/>
+          <a:ln w="12700">
+            <a:solidFill>
+              <a:prstClr val="black"/>
+            </a:solidFill>
+          </a:ln>
+        </p:spPr>
+        <p:txBody>
+          <a:bodyPr vert="horz" lIns="91440" tIns="45720" rIns="91440" bIns="45720" rtlCol="0" anchor="ctr"/>
+          <a:lstStyle/>
+          <a:p>
+            <a:endParaRPr lang="en-US"/>
+          </a:p>
+        </p:txBody>
+      </p:sp>
+      <p:sp>
+        <p:nvSpPr>
+          <p:cNvPr id="5" name="Notes Placeholder 4"/>
+          <p:cNvSpPr>
+            <a:spLocks noGrp="1"/>
+          </p:cNvSpPr>
+          <p:nvPr>
+            <p:ph type="body" sz="quarter" idx="3"/>
+          </p:nvPr>
+        </p:nvSpPr>
+        <p:spPr>
+          <a:xfrm>
+            <a:off x="685800" y="4343400"/>
+            <a:ext cx="5486400" cy="4114800"/>
+          </a:xfrm>
+          <a:prstGeom prst="rect">
+            <a:avLst/>
+          </a:prstGeom>
+        </p:spPr>
+        <p:txBody>
+          <a:bodyPr vert="horz" lIns="91440" tIns="45720" rIns="91440" bIns="45720" rtlCol="0"/>
+          <a:lstStyle/>
+          <a:p>
+            <a:pPr lvl="0"/>
+            <a:r>
+              <a:rPr lang="en-US" smtClean="0"/>
+              <a:t>Click to edit Master text styles</a:t>
+            </a:r>
+          </a:p>
+          <a:p>
+            <a:pPr lvl="1"/>
+            <a:r>
+              <a:rPr lang="en-US" smtClean="0"/>
+              <a:t>Second level</a:t>
+            </a:r>
+          </a:p>
+          <a:p>
+            <a:pPr lvl="2"/>
+            <a:r>
+              <a:rPr lang="en-US" smtClean="0"/>
+              <a:t>Third level</a:t>
+            </a:r>
+          </a:p>
+          <a:p>
+            <a:pPr lvl="3"/>
+            <a:r>
+              <a:rPr lang="en-US" smtClean="0"/>
+              <a:t>Fourth level</a:t>
+            </a:r>
+          </a:p>
+          <a:p>
+            <a:pPr lvl="4"/>
+            <a:r>
+              <a:rPr lang="en-US" smtClean="0"/>
+              <a:t>Fifth level</a:t>
+            </a:r>
+            <a:endParaRPr lang="en-US"/>
+          </a:p>
+        </p:txBody>
+      </p:sp>
+      <p:sp>
+        <p:nvSpPr>
+          <p:cNvPr id="6" name="Footer Placeholder 5"/>
+          <p:cNvSpPr>
+            <a:spLocks noGrp="1"/>
+          </p:cNvSpPr>
+          <p:nvPr>
+            <p:ph type="ftr" sz="quarter" idx="4"/>
+          </p:nvPr>
+        </p:nvSpPr>
+        <p:spPr>
+          <a:xfrm>
+            <a:off x="0" y="8685213"/>
+            <a:ext cx="2971800" cy="457200"/>
+          </a:xfrm>
+          <a:prstGeom prst="rect">
+            <a:avLst/>
+          </a:prstGeom>
+        </p:spPr>
+        <p:txBody>
+          <a:bodyPr vert="horz" lIns="91440" tIns="45720" rIns="91440" bIns="45720" rtlCol="0" anchor="b"/>
+          <a:lstStyle>
+            <a:lvl1pPr algn="l">
+              <a:defRPr sz="1200"/>
+            </a:lvl1pPr>
+          </a:lstStyle>
+          <a:p>
+            <a:endParaRPr lang="en-US"/>
+          </a:p>
+        </p:txBody>
+      </p:sp>
+      <p:sp>
+        <p:nvSpPr>
+          <p:cNvPr id="7" name="Slide Number Placeholder 6"/>
+          <p:cNvSpPr>
+            <a:spLocks noGrp="1"/>
+          </p:cNvSpPr>
+          <p:nvPr>
+            <p:ph type="sldNum" sz="quarter" idx="5"/>
+          </p:nvPr>
+        </p:nvSpPr>
+        <p:spPr>
+          <a:xfrm>
+            <a:off x="3884613" y="8685213"/>
+            <a:ext cx="2971800" cy="457200"/>
+          </a:xfrm>
+          <a:prstGeom prst="rect">
+            <a:avLst/>
+          </a:prstGeom>
+        </p:spPr>
+        <p:txBody>
+          <a:bodyPr vert="horz" lIns="91440" tIns="45720" rIns="91440" bIns="45720" rtlCol="0" anchor="b"/>
+          <a:lstStyle>
+            <a:lvl1pPr algn="r">
+              <a:defRPr sz="1200"/>
+            </a:lvl1pPr>
+          </a:lstStyle>
+          <a:p>
+            <a:fld id="{24EFC237-02D5-534B-8234-1802D5F53100}" type="slidenum">
+              <a:rPr lang="en-US" smtClean="0"/>
+              <a:t>‹#›</a:t>
+            </a:fld>
+            <a:endParaRPr lang="en-US"/>
+          </a:p>
+        </p:txBody>
+      </p:sp>
+    </p:spTree>
+    <p:extLst>
+      <p:ext uri="{BB962C8B-B14F-4D97-AF65-F5344CB8AC3E}">
+        <p14:creationId xmlns:p14="http://schemas.microsoft.com/office/powerpoint/2010/main" val="703602840"/>
+      </p:ext>
+    </p:extLst>
+  </p:cSld>
+  <p:clrMap bg1="lt1" tx1="dk1" bg2="lt2" tx2="dk2" accent1="accent1" accent2="accent2" accent3="accent3" accent4="accent4" accent5="accent5" accent6="accent6" hlink="hlink" folHlink="folHlink"/>
+  <p:hf hdr="0" ftr="0" dt="0"/>
+  <p:notesStyle>
+    <a:lvl1pPr marL="0" algn="l" defTabSz="457200" rtl="0" eaLnBrk="1" latinLnBrk="0" hangingPunct="1">
+      <a:defRPr sz="1200" kern="1200">
+        <a:solidFill>
+          <a:schemeClr val="tx1"/>
+        </a:solidFill>
+        <a:latin typeface="+mn-lt"/>
+        <a:ea typeface="+mn-ea"/>
+        <a:cs typeface="+mn-cs"/>
+      </a:defRPr>
+    </a:lvl1pPr>
+    <a:lvl2pPr marL="457200" algn="l" defTabSz="457200" rtl="0" eaLnBrk="1" latinLnBrk="0" hangingPunct="1">
+      <a:defRPr sz="1200" kern="1200">
+        <a:solidFill>
+          <a:schemeClr val="tx1"/>
+        </a:solidFill>
+        <a:latin typeface="+mn-lt"/>
+        <a:ea typeface="+mn-ea"/>
+        <a:cs typeface="+mn-cs"/>
+      </a:defRPr>
+    </a:lvl2pPr>
+    <a:lvl3pPr marL="914400" algn="l" defTabSz="457200" rtl="0" eaLnBrk="1" latinLnBrk="0" hangingPunct="1">
+      <a:defRPr sz="1200" kern="1200">
+        <a:solidFill>
+          <a:schemeClr val="tx1"/>
+        </a:solidFill>
+        <a:latin typeface="+mn-lt"/>
+        <a:ea typeface="+mn-ea"/>
+        <a:cs typeface="+mn-cs"/>
+      </a:defRPr>
+    </a:lvl3pPr>
+    <a:lvl4pPr marL="1371600" algn="l" defTabSz="457200" rtl="0" eaLnBrk="1" latinLnBrk="0" hangingPunct="1">
+      <a:defRPr sz="1200" kern="1200">
+        <a:solidFill>
+          <a:schemeClr val="tx1"/>
+        </a:solidFill>
+        <a:latin typeface="+mn-lt"/>
+        <a:ea typeface="+mn-ea"/>
+        <a:cs typeface="+mn-cs"/>
+      </a:defRPr>
+    </a:lvl4pPr>
+    <a:lvl5pPr marL="1828800" algn="l" defTabSz="457200" rtl="0" eaLnBrk="1" latinLnBrk="0" hangingPunct="1">
+      <a:defRPr sz="1200" kern="1200">
+        <a:solidFill>
+          <a:schemeClr val="tx1"/>
+        </a:solidFill>
+        <a:latin typeface="+mn-lt"/>
+        <a:ea typeface="+mn-ea"/>
+        <a:cs typeface="+mn-cs"/>
+      </a:defRPr>
+    </a:lvl5pPr>
+    <a:lvl6pPr marL="2286000" algn="l" defTabSz="457200" rtl="0" eaLnBrk="1" latinLnBrk="0" hangingPunct="1">
+      <a:defRPr sz="1200" kern="1200">
+        <a:solidFill>
+          <a:schemeClr val="tx1"/>
+        </a:solidFill>
+        <a:latin typeface="+mn-lt"/>
+        <a:ea typeface="+mn-ea"/>
+        <a:cs typeface="+mn-cs"/>
+      </a:defRPr>
+    </a:lvl6pPr>
+    <a:lvl7pPr marL="2743200" algn="l" defTabSz="457200" rtl="0" eaLnBrk="1" latinLnBrk="0" hangingPunct="1">
+      <a:defRPr sz="1200" kern="1200">
+        <a:solidFill>
+          <a:schemeClr val="tx1"/>
+        </a:solidFill>
+        <a:latin typeface="+mn-lt"/>
+        <a:ea typeface="+mn-ea"/>
+        <a:cs typeface="+mn-cs"/>
+      </a:defRPr>
+    </a:lvl7pPr>
+    <a:lvl8pPr marL="3200400" algn="l" defTabSz="457200" rtl="0" eaLnBrk="1" latinLnBrk="0" hangingPunct="1">
+      <a:defRPr sz="1200" kern="1200">
+        <a:solidFill>
+          <a:schemeClr val="tx1"/>
+        </a:solidFill>
+        <a:latin typeface="+mn-lt"/>
+        <a:ea typeface="+mn-ea"/>
+        <a:cs typeface="+mn-cs"/>
+      </a:defRPr>
+    </a:lvl8pPr>
+    <a:lvl9pPr marL="3657600" algn="l" defTabSz="457200" rtl="0" eaLnBrk="1" latinLnBrk="0" hangingPunct="1">
+      <a:defRPr sz="1200" kern="1200">
+        <a:solidFill>
+          <a:schemeClr val="tx1"/>
+        </a:solidFill>
+        <a:latin typeface="+mn-lt"/>
+        <a:ea typeface="+mn-ea"/>
+        <a:cs typeface="+mn-cs"/>
+      </a:defRPr>
+    </a:lvl9pPr>
+  </p:notesStyle>
+</p:notesMaster>
+</file>
+
+<file path=ppt/notesSlides/notesSlide1.xml><?xml version="1.0" encoding="utf-8"?>
+<p:notes xmlns:a="http://schemas.openxmlformats.org/drawingml/2006/main" xmlns:r="http://schemas.openxmlformats.org/officeDocument/2006/relationships" xmlns:p="http://schemas.openxmlformats.org/presentationml/2006/main">
+  <p:cSld>
+    <p:spTree>
+      <p:nvGrpSpPr>
+        <p:cNvPr id="1" name=""/>
+        <p:cNvGrpSpPr/>
+        <p:nvPr/>
+      </p:nvGrpSpPr>
+      <p:grpSpPr>
+        <a:xfrm>
+          <a:off x="0" y="0"/>
+          <a:ext cx="0" cy="0"/>
+          <a:chOff x="0" y="0"/>
+          <a:chExt cx="0" cy="0"/>
+        </a:xfrm>
+      </p:grpSpPr>
+      <p:sp>
+        <p:nvSpPr>
+          <p:cNvPr id="2" name="Slide Image Placeholder 1"/>
+          <p:cNvSpPr>
+            <a:spLocks noGrp="1" noRot="1" noChangeAspect="1"/>
+          </p:cNvSpPr>
+          <p:nvPr>
+            <p:ph type="sldImg"/>
+          </p:nvPr>
+        </p:nvSpPr>
+        <p:spPr/>
+      </p:sp>
+      <p:sp>
+        <p:nvSpPr>
+          <p:cNvPr id="3" name="Notes Placeholder 2"/>
+          <p:cNvSpPr>
+            <a:spLocks noGrp="1"/>
+          </p:cNvSpPr>
+          <p:nvPr>
+            <p:ph type="body" idx="1"/>
+          </p:nvPr>
+        </p:nvSpPr>
+        <p:spPr/>
+        <p:txBody>
+          <a:bodyPr/>
+          <a:lstStyle/>
+          <a:p>
+            <a:endParaRPr lang="en-US"/>
+          </a:p>
+        </p:txBody>
+      </p:sp>
+      <p:sp>
+        <p:nvSpPr>
+          <p:cNvPr id="4" name="Slide Number Placeholder 3"/>
+          <p:cNvSpPr>
+            <a:spLocks noGrp="1"/>
+          </p:cNvSpPr>
+          <p:nvPr>
+            <p:ph type="sldNum" sz="quarter" idx="10"/>
+          </p:nvPr>
+        </p:nvSpPr>
+        <p:spPr/>
+        <p:txBody>
+          <a:bodyPr/>
+          <a:lstStyle/>
+          <a:p>
+            <a:fld id="{24EFC237-02D5-534B-8234-1802D5F53100}" type="slidenum">
+              <a:rPr lang="en-US" smtClean="0"/>
+              <a:t>6</a:t>
+            </a:fld>
+            <a:endParaRPr lang="en-US"/>
+          </a:p>
+        </p:txBody>
+      </p:sp>
+    </p:spTree>
+    <p:extLst>
+      <p:ext uri="{BB962C8B-B14F-4D97-AF65-F5344CB8AC3E}">
+        <p14:creationId xmlns:p14="http://schemas.microsoft.com/office/powerpoint/2010/main" val="830926650"/>
+      </p:ext>
+    </p:extLst>
+  </p:cSld>
+  <p:clrMapOvr>
+    <a:masterClrMapping/>
+  </p:clrMapOvr>
+</p:notes>
+</file>
+
 <file path=ppt/slideLayouts/slideLayout1.xml><?xml version="1.0" encoding="utf-8"?>
 <p:sldLayout xmlns:a="http://schemas.openxmlformats.org/drawingml/2006/main" xmlns:r="http://schemas.openxmlformats.org/officeDocument/2006/relationships" xmlns:p="http://schemas.openxmlformats.org/presentationml/2006/main" type="title" preserve="1">
   <p:cSld name="Title Slide">
@@ -292,9 +904,9 @@
           <a:bodyPr/>
           <a:lstStyle/>
           <a:p>
-            <a:fld id="{0689BA21-1932-E242-AD9C-C2A63172072A}" type="datetimeFigureOut">
-              <a:rPr lang="en-US" smtClean="0"/>
-              <a:t>10/17/13</a:t>
+            <a:fld id="{B70DB30F-4784-EF47-9BA3-BEEF06E9E02C}" type="datetime1">
+              <a:rPr lang="en-US" smtClean="0"/>
+              <a:t>3/12/14</a:t>
             </a:fld>
             <a:endParaRPr lang="en-US"/>
           </a:p>
@@ -462,9 +1074,9 @@
           <a:bodyPr/>
           <a:lstStyle/>
           <a:p>
-            <a:fld id="{0689BA21-1932-E242-AD9C-C2A63172072A}" type="datetimeFigureOut">
-              <a:rPr lang="en-US" smtClean="0"/>
-              <a:t>10/17/13</a:t>
+            <a:fld id="{816D4DC0-0B9D-A54E-8359-2B0104417767}" type="datetime1">
+              <a:rPr lang="en-US" smtClean="0"/>
+              <a:t>3/12/14</a:t>
             </a:fld>
             <a:endParaRPr lang="en-US"/>
           </a:p>
@@ -642,9 +1254,9 @@
           <a:bodyPr/>
           <a:lstStyle/>
           <a:p>
-            <a:fld id="{0689BA21-1932-E242-AD9C-C2A63172072A}" type="datetimeFigureOut">
-              <a:rPr lang="en-US" smtClean="0"/>
-              <a:t>10/17/13</a:t>
+            <a:fld id="{856A8FCA-27F0-6A4C-9E06-A43F4AA1DA0B}" type="datetime1">
+              <a:rPr lang="en-US" smtClean="0"/>
+              <a:t>3/12/14</a:t>
             </a:fld>
             <a:endParaRPr lang="en-US"/>
           </a:p>
@@ -812,9 +1424,9 @@
           <a:bodyPr/>
           <a:lstStyle/>
           <a:p>
-            <a:fld id="{0689BA21-1932-E242-AD9C-C2A63172072A}" type="datetimeFigureOut">
-              <a:rPr lang="en-US" smtClean="0"/>
-              <a:t>10/17/13</a:t>
+            <a:fld id="{BFADF6ED-B1C8-D948-A600-E6C546B0EC74}" type="datetime1">
+              <a:rPr lang="en-US" smtClean="0"/>
+              <a:t>3/12/14</a:t>
             </a:fld>
             <a:endParaRPr lang="en-US"/>
           </a:p>
@@ -1058,9 +1670,9 @@
           <a:bodyPr/>
           <a:lstStyle/>
           <a:p>
-            <a:fld id="{0689BA21-1932-E242-AD9C-C2A63172072A}" type="datetimeFigureOut">
-              <a:rPr lang="en-US" smtClean="0"/>
-              <a:t>10/17/13</a:t>
+            <a:fld id="{2A39BF1A-42E6-F941-8B0D-E3FD3430E673}" type="datetime1">
+              <a:rPr lang="en-US" smtClean="0"/>
+              <a:t>3/12/14</a:t>
             </a:fld>
             <a:endParaRPr lang="en-US"/>
           </a:p>
@@ -1346,9 +1958,9 @@
           <a:bodyPr/>
           <a:lstStyle/>
           <a:p>
-            <a:fld id="{0689BA21-1932-E242-AD9C-C2A63172072A}" type="datetimeFigureOut">
-              <a:rPr lang="en-US" smtClean="0"/>
-              <a:t>10/17/13</a:t>
+            <a:fld id="{95B08030-5F35-EC47-AD85-5EE30A5D6FAD}" type="datetime1">
+              <a:rPr lang="en-US" smtClean="0"/>
+              <a:t>3/12/14</a:t>
             </a:fld>
             <a:endParaRPr lang="en-US"/>
           </a:p>
@@ -1768,9 +2380,9 @@
           <a:bodyPr/>
           <a:lstStyle/>
           <a:p>
-            <a:fld id="{0689BA21-1932-E242-AD9C-C2A63172072A}" type="datetimeFigureOut">
-              <a:rPr lang="en-US" smtClean="0"/>
-              <a:t>10/17/13</a:t>
+            <a:fld id="{2F5A8964-95A6-F74D-A794-A05915FAEEC1}" type="datetime1">
+              <a:rPr lang="en-US" smtClean="0"/>
+              <a:t>3/12/14</a:t>
             </a:fld>
             <a:endParaRPr lang="en-US"/>
           </a:p>
@@ -1886,9 +2498,9 @@
           <a:bodyPr/>
           <a:lstStyle/>
           <a:p>
-            <a:fld id="{0689BA21-1932-E242-AD9C-C2A63172072A}" type="datetimeFigureOut">
-              <a:rPr lang="en-US" smtClean="0"/>
-              <a:t>10/17/13</a:t>
+            <a:fld id="{CBE1E919-B6B9-3B4B-B09D-97116761E1AC}" type="datetime1">
+              <a:rPr lang="en-US" smtClean="0"/>
+              <a:t>3/12/14</a:t>
             </a:fld>
             <a:endParaRPr lang="en-US"/>
           </a:p>
@@ -1981,9 +2593,9 @@
           <a:bodyPr/>
           <a:lstStyle/>
           <a:p>
-            <a:fld id="{0689BA21-1932-E242-AD9C-C2A63172072A}" type="datetimeFigureOut">
-              <a:rPr lang="en-US" smtClean="0"/>
-              <a:t>10/17/13</a:t>
+            <a:fld id="{F9363E99-0E05-EC47-BCC0-E91FDDCCA8B7}" type="datetime1">
+              <a:rPr lang="en-US" smtClean="0"/>
+              <a:t>3/12/14</a:t>
             </a:fld>
             <a:endParaRPr lang="en-US"/>
           </a:p>
@@ -2258,9 +2870,9 @@
           <a:bodyPr/>
           <a:lstStyle/>
           <a:p>
-            <a:fld id="{0689BA21-1932-E242-AD9C-C2A63172072A}" type="datetimeFigureOut">
-              <a:rPr lang="en-US" smtClean="0"/>
-              <a:t>10/17/13</a:t>
+            <a:fld id="{8459220B-6E41-5244-A91F-1E491E52B031}" type="datetime1">
+              <a:rPr lang="en-US" smtClean="0"/>
+              <a:t>3/12/14</a:t>
             </a:fld>
             <a:endParaRPr lang="en-US"/>
           </a:p>
@@ -2511,9 +3123,9 @@
           <a:bodyPr/>
           <a:lstStyle/>
           <a:p>
-            <a:fld id="{0689BA21-1932-E242-AD9C-C2A63172072A}" type="datetimeFigureOut">
-              <a:rPr lang="en-US" smtClean="0"/>
-              <a:t>10/17/13</a:t>
+            <a:fld id="{AFB6ADB3-88FB-AF4A-89D2-F9DB3096AC7B}" type="datetime1">
+              <a:rPr lang="en-US" smtClean="0"/>
+              <a:t>3/12/14</a:t>
             </a:fld>
             <a:endParaRPr lang="en-US"/>
           </a:p>
@@ -2724,9 +3336,9 @@
             </a:lvl1pPr>
           </a:lstStyle>
           <a:p>
-            <a:fld id="{0689BA21-1932-E242-AD9C-C2A63172072A}" type="datetimeFigureOut">
-              <a:rPr lang="en-US" smtClean="0"/>
-              <a:t>10/17/13</a:t>
+            <a:fld id="{ADCA7099-9EBC-A04D-8D07-3FE1BF80B03E}" type="datetime1">
+              <a:rPr lang="en-US" smtClean="0"/>
+              <a:t>3/12/14</a:t>
             </a:fld>
             <a:endParaRPr lang="en-US"/>
           </a:p>
@@ -2831,6 +3443,7 @@
     <p:sldLayoutId id="2147483658" r:id="rId10"/>
     <p:sldLayoutId id="2147483659" r:id="rId11"/>
   </p:sldLayoutIdLst>
+  <p:hf hdr="0" ftr="0" dt="0"/>
   <p:txStyles>
     <p:titleStyle>
       <a:lvl1pPr algn="ctr" defTabSz="457200" rtl="0" eaLnBrk="1" latinLnBrk="0" hangingPunct="1">
@@ -3141,9 +3754,32 @@
           <a:p>
             <a:r>
               <a:rPr lang="en-US" dirty="0" smtClean="0"/>
-              <a:t>Unix Systems Tracing</a:t>
+              <a:t>Unix Systems “tracing”</a:t>
             </a:r>
             <a:endParaRPr lang="en-US" dirty="0"/>
+          </a:p>
+        </p:txBody>
+      </p:sp>
+      <p:sp>
+        <p:nvSpPr>
+          <p:cNvPr id="4" name="Slide Number Placeholder 3"/>
+          <p:cNvSpPr>
+            <a:spLocks noGrp="1"/>
+          </p:cNvSpPr>
+          <p:nvPr>
+            <p:ph type="sldNum" sz="quarter" idx="12"/>
+          </p:nvPr>
+        </p:nvSpPr>
+        <p:spPr/>
+        <p:txBody>
+          <a:bodyPr/>
+          <a:lstStyle/>
+          <a:p>
+            <a:fld id="{58CD5DA3-AA7D-F043-8F69-43637440C1B1}" type="slidenum">
+              <a:rPr lang="en-US" smtClean="0"/>
+              <a:t>1</a:t>
+            </a:fld>
+            <a:endParaRPr lang="en-US"/>
           </a:p>
         </p:txBody>
       </p:sp>
@@ -3151,6 +3787,470 @@
     <p:extLst>
       <p:ext uri="{BB962C8B-B14F-4D97-AF65-F5344CB8AC3E}">
         <p14:creationId xmlns:p14="http://schemas.microsoft.com/office/powerpoint/2010/main" val="489819796"/>
+      </p:ext>
+    </p:extLst>
+  </p:cSld>
+  <p:clrMapOvr>
+    <a:masterClrMapping/>
+  </p:clrMapOvr>
+</p:sld>
+</file>
+
+<file path=ppt/slides/slide10.xml><?xml version="1.0" encoding="utf-8"?>
+<p:sld xmlns:a="http://schemas.openxmlformats.org/drawingml/2006/main" xmlns:r="http://schemas.openxmlformats.org/officeDocument/2006/relationships" xmlns:p="http://schemas.openxmlformats.org/presentationml/2006/main">
+  <p:cSld>
+    <p:spTree>
+      <p:nvGrpSpPr>
+        <p:cNvPr id="1" name=""/>
+        <p:cNvGrpSpPr/>
+        <p:nvPr/>
+      </p:nvGrpSpPr>
+      <p:grpSpPr>
+        <a:xfrm>
+          <a:off x="0" y="0"/>
+          <a:ext cx="0" cy="0"/>
+          <a:chOff x="0" y="0"/>
+          <a:chExt cx="0" cy="0"/>
+        </a:xfrm>
+      </p:grpSpPr>
+      <p:sp>
+        <p:nvSpPr>
+          <p:cNvPr id="2" name="Title 1"/>
+          <p:cNvSpPr>
+            <a:spLocks noGrp="1"/>
+          </p:cNvSpPr>
+          <p:nvPr>
+            <p:ph type="title"/>
+          </p:nvPr>
+        </p:nvSpPr>
+        <p:spPr/>
+        <p:txBody>
+          <a:bodyPr/>
+          <a:lstStyle/>
+          <a:p>
+            <a:r>
+              <a:rPr lang="en-US" dirty="0" smtClean="0"/>
+              <a:t>Basic Features</a:t>
+            </a:r>
+            <a:endParaRPr lang="en-US" dirty="0"/>
+          </a:p>
+        </p:txBody>
+      </p:sp>
+      <p:sp>
+        <p:nvSpPr>
+          <p:cNvPr id="3" name="Content Placeholder 2"/>
+          <p:cNvSpPr>
+            <a:spLocks noGrp="1"/>
+          </p:cNvSpPr>
+          <p:nvPr>
+            <p:ph idx="1"/>
+          </p:nvPr>
+        </p:nvSpPr>
+        <p:spPr/>
+        <p:txBody>
+          <a:bodyPr/>
+          <a:lstStyle/>
+          <a:p>
+            <a:r>
+              <a:rPr lang="en-US" dirty="0" smtClean="0"/>
+              <a:t>Freeze</a:t>
+            </a:r>
+            <a:endParaRPr lang="en-US" dirty="0"/>
+          </a:p>
+        </p:txBody>
+      </p:sp>
+      <p:sp>
+        <p:nvSpPr>
+          <p:cNvPr id="4" name="Slide Number Placeholder 3"/>
+          <p:cNvSpPr>
+            <a:spLocks noGrp="1"/>
+          </p:cNvSpPr>
+          <p:nvPr>
+            <p:ph type="sldNum" sz="quarter" idx="12"/>
+          </p:nvPr>
+        </p:nvSpPr>
+        <p:spPr/>
+        <p:txBody>
+          <a:bodyPr/>
+          <a:lstStyle/>
+          <a:p>
+            <a:fld id="{58CD5DA3-AA7D-F043-8F69-43637440C1B1}" type="slidenum">
+              <a:rPr lang="en-US" smtClean="0"/>
+              <a:t>10</a:t>
+            </a:fld>
+            <a:endParaRPr lang="en-US"/>
+          </a:p>
+        </p:txBody>
+      </p:sp>
+    </p:spTree>
+    <p:extLst>
+      <p:ext uri="{BB962C8B-B14F-4D97-AF65-F5344CB8AC3E}">
+        <p14:creationId xmlns:p14="http://schemas.microsoft.com/office/powerpoint/2010/main" val="615848010"/>
+      </p:ext>
+    </p:extLst>
+  </p:cSld>
+  <p:clrMapOvr>
+    <a:masterClrMapping/>
+  </p:clrMapOvr>
+</p:sld>
+</file>
+
+<file path=ppt/slides/slide11.xml><?xml version="1.0" encoding="utf-8"?>
+<p:sld xmlns:a="http://schemas.openxmlformats.org/drawingml/2006/main" xmlns:r="http://schemas.openxmlformats.org/officeDocument/2006/relationships" xmlns:p="http://schemas.openxmlformats.org/presentationml/2006/main">
+  <p:cSld>
+    <p:spTree>
+      <p:nvGrpSpPr>
+        <p:cNvPr id="1" name=""/>
+        <p:cNvGrpSpPr/>
+        <p:nvPr/>
+      </p:nvGrpSpPr>
+      <p:grpSpPr>
+        <a:xfrm>
+          <a:off x="0" y="0"/>
+          <a:ext cx="0" cy="0"/>
+          <a:chOff x="0" y="0"/>
+          <a:chExt cx="0" cy="0"/>
+        </a:xfrm>
+      </p:grpSpPr>
+      <p:sp>
+        <p:nvSpPr>
+          <p:cNvPr id="2" name="Title 1"/>
+          <p:cNvSpPr>
+            <a:spLocks noGrp="1"/>
+          </p:cNvSpPr>
+          <p:nvPr>
+            <p:ph type="title"/>
+          </p:nvPr>
+        </p:nvSpPr>
+        <p:spPr/>
+        <p:txBody>
+          <a:bodyPr/>
+          <a:lstStyle/>
+          <a:p>
+            <a:r>
+              <a:rPr lang="en-US" dirty="0" smtClean="0"/>
+              <a:t>Usability</a:t>
+            </a:r>
+            <a:endParaRPr lang="en-US" dirty="0"/>
+          </a:p>
+        </p:txBody>
+      </p:sp>
+      <p:sp>
+        <p:nvSpPr>
+          <p:cNvPr id="3" name="Content Placeholder 2"/>
+          <p:cNvSpPr>
+            <a:spLocks noGrp="1"/>
+          </p:cNvSpPr>
+          <p:nvPr>
+            <p:ph idx="1"/>
+          </p:nvPr>
+        </p:nvSpPr>
+        <p:spPr>
+          <a:xfrm>
+            <a:off x="323273" y="1600200"/>
+            <a:ext cx="8528242" cy="4525963"/>
+          </a:xfrm>
+        </p:spPr>
+        <p:txBody>
+          <a:bodyPr/>
+          <a:lstStyle/>
+          <a:p>
+            <a:r>
+              <a:rPr lang="en-US" dirty="0" smtClean="0"/>
+              <a:t>User space – </a:t>
+            </a:r>
+            <a:r>
+              <a:rPr lang="en-US" dirty="0" err="1" smtClean="0"/>
+              <a:t>mmap</a:t>
+            </a:r>
+            <a:r>
+              <a:rPr lang="en-US" dirty="0" smtClean="0"/>
+              <a:t> file</a:t>
+            </a:r>
+          </a:p>
+          <a:p>
+            <a:r>
+              <a:rPr lang="en-US" sz="2800" dirty="0" smtClean="0"/>
+              <a:t>Kernel module that creates file that user space </a:t>
+            </a:r>
+            <a:r>
+              <a:rPr lang="en-US" sz="2800" dirty="0" err="1" smtClean="0"/>
+              <a:t>mmaps</a:t>
+            </a:r>
+            <a:r>
+              <a:rPr lang="en-US" sz="2800" dirty="0" smtClean="0"/>
+              <a:t>.</a:t>
+            </a:r>
+          </a:p>
+          <a:p>
+            <a:pPr lvl="1"/>
+            <a:r>
+              <a:rPr lang="en-US" sz="2400" dirty="0" smtClean="0"/>
+              <a:t>Currently, </a:t>
+            </a:r>
+            <a:r>
+              <a:rPr lang="en-US" sz="2400" dirty="0" err="1" smtClean="0"/>
+              <a:t>mmap</a:t>
+            </a:r>
+            <a:r>
+              <a:rPr lang="en-US" sz="2400" dirty="0" smtClean="0"/>
+              <a:t> critical section read-only, but </a:t>
+            </a:r>
+            <a:r>
+              <a:rPr lang="en-US" sz="2400" dirty="0" err="1" smtClean="0"/>
+              <a:t>lvl</a:t>
+            </a:r>
+            <a:r>
+              <a:rPr lang="en-US" sz="2400" dirty="0" smtClean="0"/>
+              <a:t> </a:t>
+            </a:r>
+            <a:r>
+              <a:rPr lang="en-US" sz="2400" dirty="0" err="1" smtClean="0"/>
+              <a:t>msk</a:t>
+            </a:r>
+            <a:r>
+              <a:rPr lang="en-US" sz="2400" dirty="0" smtClean="0"/>
+              <a:t> could be scribbled on causing excessive </a:t>
+            </a:r>
+            <a:r>
+              <a:rPr lang="en-US" sz="2400" dirty="0" err="1" smtClean="0"/>
+              <a:t>printk’s</a:t>
+            </a:r>
+            <a:endParaRPr lang="en-US" sz="2400" dirty="0" smtClean="0"/>
+          </a:p>
+          <a:p>
+            <a:pPr lvl="2"/>
+            <a:r>
+              <a:rPr lang="en-US" sz="2000" dirty="0" smtClean="0"/>
+              <a:t>Could disable </a:t>
+            </a:r>
+            <a:r>
+              <a:rPr lang="en-US" sz="2000" dirty="0" err="1" smtClean="0"/>
+              <a:t>printk’s</a:t>
+            </a:r>
+            <a:endParaRPr lang="en-US" sz="2000" dirty="0" smtClean="0"/>
+          </a:p>
+        </p:txBody>
+      </p:sp>
+      <p:sp>
+        <p:nvSpPr>
+          <p:cNvPr id="4" name="Slide Number Placeholder 3"/>
+          <p:cNvSpPr>
+            <a:spLocks noGrp="1"/>
+          </p:cNvSpPr>
+          <p:nvPr>
+            <p:ph type="sldNum" sz="quarter" idx="12"/>
+          </p:nvPr>
+        </p:nvSpPr>
+        <p:spPr/>
+        <p:txBody>
+          <a:bodyPr/>
+          <a:lstStyle/>
+          <a:p>
+            <a:fld id="{58CD5DA3-AA7D-F043-8F69-43637440C1B1}" type="slidenum">
+              <a:rPr lang="en-US" smtClean="0"/>
+              <a:t>11</a:t>
+            </a:fld>
+            <a:endParaRPr lang="en-US"/>
+          </a:p>
+        </p:txBody>
+      </p:sp>
+    </p:spTree>
+    <p:extLst>
+      <p:ext uri="{BB962C8B-B14F-4D97-AF65-F5344CB8AC3E}">
+        <p14:creationId xmlns:p14="http://schemas.microsoft.com/office/powerpoint/2010/main" val="4046839138"/>
+      </p:ext>
+    </p:extLst>
+  </p:cSld>
+  <p:clrMapOvr>
+    <a:masterClrMapping/>
+  </p:clrMapOvr>
+</p:sld>
+</file>
+
+<file path=ppt/slides/slide12.xml><?xml version="1.0" encoding="utf-8"?>
+<p:sld xmlns:a="http://schemas.openxmlformats.org/drawingml/2006/main" xmlns:r="http://schemas.openxmlformats.org/officeDocument/2006/relationships" xmlns:p="http://schemas.openxmlformats.org/presentationml/2006/main">
+  <p:cSld>
+    <p:spTree>
+      <p:nvGrpSpPr>
+        <p:cNvPr id="1" name=""/>
+        <p:cNvGrpSpPr/>
+        <p:nvPr/>
+      </p:nvGrpSpPr>
+      <p:grpSpPr>
+        <a:xfrm>
+          <a:off x="0" y="0"/>
+          <a:ext cx="0" cy="0"/>
+          <a:chOff x="0" y="0"/>
+          <a:chExt cx="0" cy="0"/>
+        </a:xfrm>
+      </p:grpSpPr>
+      <p:sp>
+        <p:nvSpPr>
+          <p:cNvPr id="2" name="Title 1"/>
+          <p:cNvSpPr>
+            <a:spLocks noGrp="1"/>
+          </p:cNvSpPr>
+          <p:nvPr>
+            <p:ph type="title"/>
+          </p:nvPr>
+        </p:nvSpPr>
+        <p:spPr/>
+        <p:txBody>
+          <a:bodyPr/>
+          <a:lstStyle/>
+          <a:p>
+            <a:endParaRPr lang="en-US"/>
+          </a:p>
+        </p:txBody>
+      </p:sp>
+      <p:cxnSp>
+        <p:nvCxnSpPr>
+          <p:cNvPr id="5" name="Straight Connector 4"/>
+          <p:cNvCxnSpPr/>
+          <p:nvPr/>
+        </p:nvCxnSpPr>
+        <p:spPr>
+          <a:xfrm>
+            <a:off x="3378970" y="1955030"/>
+            <a:ext cx="0" cy="3948546"/>
+          </a:xfrm>
+          <a:prstGeom prst="line">
+            <a:avLst/>
+          </a:prstGeom>
+        </p:spPr>
+        <p:style>
+          <a:lnRef idx="2">
+            <a:schemeClr val="accent1"/>
+          </a:lnRef>
+          <a:fillRef idx="0">
+            <a:schemeClr val="accent1"/>
+          </a:fillRef>
+          <a:effectRef idx="1">
+            <a:schemeClr val="accent1"/>
+          </a:effectRef>
+          <a:fontRef idx="minor">
+            <a:schemeClr val="tx1"/>
+          </a:fontRef>
+        </p:style>
+      </p:cxnSp>
+      <p:cxnSp>
+        <p:nvCxnSpPr>
+          <p:cNvPr id="6" name="Straight Connector 5"/>
+          <p:cNvCxnSpPr/>
+          <p:nvPr/>
+        </p:nvCxnSpPr>
+        <p:spPr>
+          <a:xfrm>
+            <a:off x="5909734" y="1955030"/>
+            <a:ext cx="0" cy="3948546"/>
+          </a:xfrm>
+          <a:prstGeom prst="line">
+            <a:avLst/>
+          </a:prstGeom>
+        </p:spPr>
+        <p:style>
+          <a:lnRef idx="2">
+            <a:schemeClr val="accent1"/>
+          </a:lnRef>
+          <a:fillRef idx="0">
+            <a:schemeClr val="accent1"/>
+          </a:fillRef>
+          <a:effectRef idx="1">
+            <a:schemeClr val="accent1"/>
+          </a:effectRef>
+          <a:fontRef idx="minor">
+            <a:schemeClr val="tx1"/>
+          </a:fontRef>
+        </p:style>
+      </p:cxnSp>
+      <p:cxnSp>
+        <p:nvCxnSpPr>
+          <p:cNvPr id="7" name="Straight Connector 6"/>
+          <p:cNvCxnSpPr/>
+          <p:nvPr/>
+        </p:nvCxnSpPr>
+        <p:spPr>
+          <a:xfrm>
+            <a:off x="1177637" y="3786909"/>
+            <a:ext cx="6573212" cy="0"/>
+          </a:xfrm>
+          <a:prstGeom prst="line">
+            <a:avLst/>
+          </a:prstGeom>
+        </p:spPr>
+        <p:style>
+          <a:lnRef idx="2">
+            <a:schemeClr val="accent1"/>
+          </a:lnRef>
+          <a:fillRef idx="0">
+            <a:schemeClr val="accent1"/>
+          </a:fillRef>
+          <a:effectRef idx="1">
+            <a:schemeClr val="accent1"/>
+          </a:effectRef>
+          <a:fontRef idx="minor">
+            <a:schemeClr val="tx1"/>
+          </a:fontRef>
+        </p:style>
+      </p:cxnSp>
+      <p:sp>
+        <p:nvSpPr>
+          <p:cNvPr id="11" name="TextBox 10"/>
+          <p:cNvSpPr txBox="1"/>
+          <p:nvPr/>
+        </p:nvSpPr>
+        <p:spPr>
+          <a:xfrm>
+            <a:off x="4140970" y="2609273"/>
+            <a:ext cx="689048" cy="369332"/>
+          </a:xfrm>
+          <a:prstGeom prst="rect">
+            <a:avLst/>
+          </a:prstGeom>
+          <a:noFill/>
+        </p:spPr>
+        <p:txBody>
+          <a:bodyPr wrap="none" rtlCol="0">
+            <a:spAutoFit/>
+          </a:bodyPr>
+          <a:lstStyle/>
+          <a:p>
+            <a:r>
+              <a:rPr lang="en-US" dirty="0" smtClean="0"/>
+              <a:t>static</a:t>
+            </a:r>
+            <a:endParaRPr lang="en-US" dirty="0"/>
+          </a:p>
+        </p:txBody>
+      </p:sp>
+      <p:sp>
+        <p:nvSpPr>
+          <p:cNvPr id="3" name="Slide Number Placeholder 2"/>
+          <p:cNvSpPr>
+            <a:spLocks noGrp="1"/>
+          </p:cNvSpPr>
+          <p:nvPr>
+            <p:ph type="sldNum" sz="quarter" idx="12"/>
+          </p:nvPr>
+        </p:nvSpPr>
+        <p:spPr/>
+        <p:txBody>
+          <a:bodyPr/>
+          <a:lstStyle/>
+          <a:p>
+            <a:fld id="{58CD5DA3-AA7D-F043-8F69-43637440C1B1}" type="slidenum">
+              <a:rPr lang="en-US" smtClean="0"/>
+              <a:t>12</a:t>
+            </a:fld>
+            <a:endParaRPr lang="en-US"/>
+          </a:p>
+        </p:txBody>
+      </p:sp>
+    </p:spTree>
+    <p:extLst>
+      <p:ext uri="{BB962C8B-B14F-4D97-AF65-F5344CB8AC3E}">
+        <p14:creationId xmlns:p14="http://schemas.microsoft.com/office/powerpoint/2010/main" val="889573167"/>
       </p:ext>
     </p:extLst>
   </p:cSld>
@@ -3278,7 +4378,67 @@
               </a:rPr>
               <a:t>(too) Sophisticated, SLF6 kernel needs patch</a:t>
             </a:r>
-            <a:endParaRPr lang="en-US" dirty="0"/>
+          </a:p>
+          <a:p>
+            <a:pPr lvl="1"/>
+            <a:r>
+              <a:rPr lang="en-US" dirty="0"/>
+              <a:t>﻿</a:t>
+            </a:r>
+            <a:r>
+              <a:rPr lang="en-US" sz="2000" dirty="0"/>
+              <a:t>https://</a:t>
+            </a:r>
+            <a:r>
+              <a:rPr lang="en-US" sz="2000" dirty="0" err="1"/>
+              <a:t>lttng.org</a:t>
+            </a:r>
+            <a:r>
+              <a:rPr lang="en-US" sz="2000" dirty="0"/>
+              <a:t>/files/doc/man-pages/man3/lttng-ust.3.</a:t>
+            </a:r>
+            <a:r>
+              <a:rPr lang="en-US" sz="2000" dirty="0" smtClean="0"/>
+              <a:t>html</a:t>
+            </a:r>
+          </a:p>
+          <a:p>
+            <a:pPr lvl="2"/>
+            <a:r>
+              <a:rPr lang="en-US" sz="1600" dirty="0"/>
+              <a:t>Dated ﻿</a:t>
+            </a:r>
+            <a:r>
+              <a:rPr lang="en-US" sz="1600" dirty="0" smtClean="0"/>
+              <a:t>February </a:t>
+            </a:r>
+            <a:r>
+              <a:rPr lang="en-US" sz="1600" dirty="0"/>
+              <a:t>16, 2012</a:t>
+            </a:r>
+          </a:p>
+        </p:txBody>
+      </p:sp>
+      <p:sp>
+        <p:nvSpPr>
+          <p:cNvPr id="4" name="Slide Number Placeholder 3"/>
+          <p:cNvSpPr>
+            <a:spLocks noGrp="1"/>
+          </p:cNvSpPr>
+          <p:nvPr>
+            <p:ph type="sldNum" sz="quarter" idx="12"/>
+          </p:nvPr>
+        </p:nvSpPr>
+        <p:spPr/>
+        <p:txBody>
+          <a:bodyPr/>
+          <a:lstStyle/>
+          <a:p>
+            <a:fld id="{58CD5DA3-AA7D-F043-8F69-43637440C1B1}" type="slidenum">
+              <a:rPr lang="en-US" smtClean="0"/>
+              <a:t>2</a:t>
+            </a:fld>
+            <a:endParaRPr lang="en-US"/>
           </a:p>
         </p:txBody>
       </p:sp>
@@ -3329,7 +4489,7 @@
           <a:p>
             <a:r>
               <a:rPr lang="en-US" dirty="0" smtClean="0"/>
-              <a:t>Fundamentals</a:t>
+              <a:t>“Recently”</a:t>
             </a:r>
             <a:endParaRPr lang="en-US" dirty="0"/>
           </a:p>
@@ -3351,41 +4511,153 @@
           <a:lstStyle/>
           <a:p>
             <a:r>
+              <a:rPr lang="en-US" dirty="0" err="1"/>
+              <a:t>v</a:t>
+            </a:r>
+            <a:r>
+              <a:rPr lang="en-US" dirty="0" err="1" smtClean="0"/>
+              <a:t>syscall</a:t>
+            </a:r>
+            <a:r>
               <a:rPr lang="en-US" dirty="0" smtClean="0"/>
-              <a:t>Scheduling changes</a:t>
-            </a:r>
-          </a:p>
-          <a:p>
+              <a:t>/</a:t>
+            </a:r>
+            <a:r>
+              <a:rPr lang="en-US" dirty="0" err="1" smtClean="0"/>
+              <a:t>vDSO</a:t>
+            </a:r>
+            <a:endParaRPr lang="en-US" dirty="0" smtClean="0"/>
+          </a:p>
+          <a:p>
+            <a:r>
+              <a:rPr lang="en-US" dirty="0" err="1" smtClean="0"/>
+              <a:t>cmpxchg</a:t>
+            </a:r>
             <a:r>
               <a:rPr lang="en-US" dirty="0" smtClean="0"/>
-              <a:t>Interrupts</a:t>
-            </a:r>
-          </a:p>
-          <a:p>
+              <a:t> – c/</a:t>
+            </a:r>
+            <a:r>
+              <a:rPr lang="en-US" dirty="0" err="1" smtClean="0"/>
+              <a:t>c++</a:t>
+            </a:r>
             <a:r>
               <a:rPr lang="en-US" dirty="0" smtClean="0"/>
-              <a:t>Application points</a:t>
-            </a:r>
-          </a:p>
-          <a:p>
-            <a:r>
+              <a:t>11 atomics</a:t>
+            </a:r>
+            <a:br>
               <a:rPr lang="en-US" dirty="0" smtClean="0"/>
-              <a:t>Timestamps (delta time)</a:t>
-            </a:r>
+            </a:br>
+            <a:endParaRPr lang="en-US" dirty="0" smtClean="0"/>
           </a:p>
           <a:p>
             <a:r>
               <a:rPr lang="en-US" dirty="0" smtClean="0"/>
-              <a:t>Circular buffer</a:t>
+              <a:t>Thread local storage as part of c/</a:t>
+            </a:r>
+            <a:r>
+              <a:rPr lang="en-US" dirty="0" err="1" smtClean="0"/>
+              <a:t>c++</a:t>
+            </a:r>
+            <a:r>
+              <a:rPr lang="en-US" dirty="0" smtClean="0"/>
+              <a:t>11</a:t>
+            </a:r>
+          </a:p>
+          <a:p>
+            <a:r>
+              <a:rPr lang="en-US" dirty="0" smtClean="0"/>
+              <a:t>Kernel event tracing</a:t>
+            </a:r>
+            <a:br>
+              <a:rPr lang="en-US" dirty="0" smtClean="0"/>
+            </a:br>
+            <a:endParaRPr lang="en-US" dirty="0" smtClean="0"/>
+          </a:p>
+          <a:p>
+            <a:pPr lvl="1"/>
+            <a:r>
+              <a:rPr lang="en-US" dirty="0" err="1" smtClean="0"/>
+              <a:t>mmap</a:t>
+            </a:r>
+            <a:r>
+              <a:rPr lang="en-US" dirty="0" smtClean="0"/>
+              <a:t> </a:t>
+            </a:r>
+            <a:r>
+              <a:rPr lang="en-US" dirty="0" err="1" smtClean="0"/>
+              <a:t>readonly</a:t>
+            </a:r>
+            <a:r>
+              <a:rPr lang="en-US" dirty="0" smtClean="0"/>
+              <a:t>, no </a:t>
+            </a:r>
+            <a:r>
+              <a:rPr lang="en-US" dirty="0" err="1" smtClean="0"/>
+              <a:t>printk</a:t>
+            </a:r>
+            <a:r>
+              <a:rPr lang="en-US" dirty="0" smtClean="0"/>
+              <a:t> module option</a:t>
+            </a:r>
+          </a:p>
+          <a:p>
+            <a:pPr lvl="1"/>
+            <a:r>
+              <a:rPr lang="en-US" dirty="0"/>
+              <a:t>n</a:t>
+            </a:r>
+            <a:r>
+              <a:rPr lang="en-US" dirty="0" smtClean="0"/>
+              <a:t>o </a:t>
+            </a:r>
+            <a:r>
+              <a:rPr lang="en-US" dirty="0" err="1" smtClean="0"/>
+              <a:t>syscall</a:t>
+            </a:r>
+            <a:r>
+              <a:rPr lang="en-US" dirty="0" smtClean="0"/>
+              <a:t> (except at </a:t>
+            </a:r>
+            <a:r>
+              <a:rPr lang="en-US" dirty="0" err="1" smtClean="0"/>
+              <a:t>init</a:t>
+            </a:r>
+            <a:r>
+              <a:rPr lang="en-US" dirty="0" smtClean="0"/>
+              <a:t>) tracing</a:t>
             </a:r>
             <a:endParaRPr lang="en-US" dirty="0"/>
+          </a:p>
+        </p:txBody>
+      </p:sp>
+      <p:sp>
+        <p:nvSpPr>
+          <p:cNvPr id="4" name="Slide Number Placeholder 3"/>
+          <p:cNvSpPr>
+            <a:spLocks noGrp="1"/>
+          </p:cNvSpPr>
+          <p:nvPr>
+            <p:ph type="sldNum" sz="quarter" idx="12"/>
+          </p:nvPr>
+        </p:nvSpPr>
+        <p:spPr/>
+        <p:txBody>
+          <a:bodyPr/>
+          <a:lstStyle/>
+          <a:p>
+            <a:fld id="{58CD5DA3-AA7D-F043-8F69-43637440C1B1}" type="slidenum">
+              <a:rPr lang="en-US" smtClean="0"/>
+              <a:t>3</a:t>
+            </a:fld>
+            <a:endParaRPr lang="en-US"/>
           </a:p>
         </p:txBody>
       </p:sp>
     </p:spTree>
     <p:extLst>
       <p:ext uri="{BB962C8B-B14F-4D97-AF65-F5344CB8AC3E}">
-        <p14:creationId xmlns:p14="http://schemas.microsoft.com/office/powerpoint/2010/main" val="3352506969"/>
+        <p14:creationId xmlns:p14="http://schemas.microsoft.com/office/powerpoint/2010/main" val="3390315199"/>
       </p:ext>
     </p:extLst>
   </p:cSld>
@@ -3429,7 +4701,7 @@
           <a:p>
             <a:r>
               <a:rPr lang="en-US" dirty="0" smtClean="0"/>
-              <a:t>Basic Features</a:t>
+              <a:t>TRACE is</a:t>
             </a:r>
             <a:endParaRPr lang="en-US" dirty="0"/>
           </a:p>
@@ -3445,23 +4717,268 @@
             <p:ph idx="1"/>
           </p:nvPr>
         </p:nvSpPr>
+        <p:spPr>
+          <a:xfrm>
+            <a:off x="286537" y="1417639"/>
+            <a:ext cx="8461927" cy="4459818"/>
+          </a:xfrm>
+        </p:spPr>
+        <p:txBody>
+          <a:bodyPr>
+            <a:normAutofit/>
+          </a:bodyPr>
+          <a:lstStyle/>
+          <a:p>
+            <a:r>
+              <a:rPr lang="en-US" dirty="0"/>
+              <a:t>﻿simple ... </a:t>
+            </a:r>
+            <a:r>
+              <a:rPr lang="en-US" sz="2800" dirty="0" smtClean="0"/>
+              <a:t>(and </a:t>
+            </a:r>
+            <a:r>
+              <a:rPr lang="en-US" sz="2800" dirty="0"/>
+              <a:t>complex too </a:t>
+            </a:r>
+            <a:r>
+              <a:rPr lang="en-US" sz="2800" dirty="0" smtClean="0"/>
+              <a:t>- ref. </a:t>
+            </a:r>
+            <a:r>
+              <a:rPr lang="en-US" sz="2800" dirty="0"/>
+              <a:t>trace is </a:t>
+            </a:r>
+            <a:r>
+              <a:rPr lang="en-US" sz="2800" dirty="0" smtClean="0"/>
+              <a:t>controllable)</a:t>
+            </a:r>
+          </a:p>
+          <a:p>
+            <a:pPr lvl="1"/>
+            <a:r>
+              <a:rPr lang="en-US" sz="2000" dirty="0"/>
+              <a:t>﻿</a:t>
+            </a:r>
+            <a:r>
+              <a:rPr lang="en-US" dirty="0"/>
+              <a:t>a </a:t>
+            </a:r>
+            <a:r>
+              <a:rPr lang="en-US" dirty="0" smtClean="0"/>
+              <a:t>header </a:t>
+            </a:r>
+            <a:r>
+              <a:rPr lang="en-US" sz="2000" dirty="0" smtClean="0"/>
+              <a:t>– 2 macros TRACE and TRACE_CNTL</a:t>
+            </a:r>
+          </a:p>
+          <a:p>
+            <a:pPr lvl="2"/>
+            <a:r>
+              <a:rPr lang="en-US" sz="1600" dirty="0"/>
+              <a:t>﻿can default to </a:t>
+            </a:r>
+            <a:r>
+              <a:rPr lang="en-US" sz="1600" dirty="0" err="1"/>
+              <a:t>printf</a:t>
+            </a:r>
+            <a:r>
+              <a:rPr lang="en-US" sz="1600" dirty="0"/>
+              <a:t> (</a:t>
+            </a:r>
+            <a:r>
+              <a:rPr lang="en-US" sz="1600" dirty="0" err="1"/>
+              <a:t>tlvlS</a:t>
+            </a:r>
+            <a:r>
+              <a:rPr lang="en-US" sz="1600" dirty="0"/>
+              <a:t>) (ref </a:t>
+            </a:r>
+            <a:r>
+              <a:rPr lang="en-US" sz="1600" dirty="0" err="1"/>
+              <a:t>printf</a:t>
+            </a:r>
+            <a:r>
+              <a:rPr lang="en-US" sz="1600" dirty="0"/>
+              <a:t> debugging</a:t>
+            </a:r>
+            <a:r>
+              <a:rPr lang="en-US" sz="1600" dirty="0" smtClean="0"/>
+              <a:t>)</a:t>
+            </a:r>
+            <a:endParaRPr lang="en-US" dirty="0"/>
+          </a:p>
+          <a:p>
+            <a:pPr lvl="1"/>
+            <a:r>
+              <a:rPr lang="en-US" dirty="0"/>
+              <a:t>﻿a header </a:t>
+            </a:r>
+            <a:r>
+              <a:rPr lang="en-US" dirty="0" smtClean="0"/>
+              <a:t>+ </a:t>
+            </a:r>
+            <a:r>
+              <a:rPr lang="en-US" dirty="0"/>
+              <a:t>show/control utility </a:t>
+            </a:r>
+            <a:r>
+              <a:rPr lang="en-US" dirty="0" smtClean="0"/>
+              <a:t>+ *</a:t>
+            </a:r>
+            <a:endParaRPr lang="en-US" sz="2000" dirty="0" smtClean="0"/>
+          </a:p>
+          <a:p>
+            <a:pPr lvl="1"/>
+            <a:r>
+              <a:rPr lang="en-US" dirty="0"/>
+              <a:t>﻿</a:t>
+            </a:r>
+            <a:r>
+              <a:rPr lang="en-US" dirty="0" smtClean="0"/>
+              <a:t>above +</a:t>
+            </a:r>
+            <a:r>
+              <a:rPr lang="en-US" dirty="0"/>
+              <a:t> </a:t>
+            </a:r>
+            <a:r>
+              <a:rPr lang="en-US" dirty="0" smtClean="0"/>
+              <a:t>kernel module</a:t>
+            </a:r>
+          </a:p>
+          <a:p>
+            <a:pPr lvl="1"/>
+            <a:r>
+              <a:rPr lang="en-US" dirty="0" err="1" smtClean="0"/>
+              <a:t>libtrace</a:t>
+            </a:r>
+            <a:r>
+              <a:rPr lang="en-US" dirty="0"/>
+              <a:t/>
+            </a:r>
+            <a:br>
+              <a:rPr lang="en-US" dirty="0"/>
+            </a:br>
+            <a:r>
+              <a:rPr lang="en-US" sz="2000" dirty="0" smtClean="0"/>
+              <a:t> </a:t>
+            </a:r>
+            <a:endParaRPr lang="en-US" dirty="0" smtClean="0"/>
+          </a:p>
+          <a:p>
+            <a:r>
+              <a:rPr lang="en-US" sz="2400" dirty="0"/>
+              <a:t>﻿</a:t>
+            </a:r>
+            <a:r>
+              <a:rPr lang="en-US" sz="2400" dirty="0" err="1"/>
+              <a:t>printf</a:t>
+            </a:r>
+            <a:r>
+              <a:rPr lang="en-US" sz="2400" dirty="0"/>
+              <a:t> debugging - or not  (</a:t>
+            </a:r>
+            <a:r>
+              <a:rPr lang="en-US" sz="2400" dirty="0" err="1"/>
+              <a:t>tlvlS</a:t>
+            </a:r>
+            <a:r>
+              <a:rPr lang="en-US" sz="2400" dirty="0"/>
+              <a:t> and TRACE_LOG_FUNCTION</a:t>
+            </a:r>
+            <a:r>
+              <a:rPr lang="en-US" sz="2400" dirty="0" smtClean="0"/>
+              <a:t>)</a:t>
+            </a:r>
+          </a:p>
+          <a:p>
+            <a:pPr lvl="1"/>
+            <a:r>
+              <a:rPr lang="en-US" sz="2000" dirty="0"/>
+              <a:t>a</a:t>
+            </a:r>
+            <a:r>
+              <a:rPr lang="en-US" sz="2000" dirty="0" smtClean="0"/>
+              <a:t>ka console logging  (controllable – timestamps match w/ </a:t>
+            </a:r>
+            <a:r>
+              <a:rPr lang="en-US" sz="2000" dirty="0" err="1" smtClean="0"/>
+              <a:t>mem</a:t>
+            </a:r>
+            <a:r>
+              <a:rPr lang="en-US" sz="2000" dirty="0" smtClean="0"/>
+              <a:t>)</a:t>
+            </a:r>
+          </a:p>
+        </p:txBody>
+      </p:sp>
+      <p:sp>
+        <p:nvSpPr>
+          <p:cNvPr id="4" name="TextBox 3"/>
+          <p:cNvSpPr txBox="1"/>
+          <p:nvPr/>
+        </p:nvSpPr>
+        <p:spPr>
+          <a:xfrm>
+            <a:off x="286537" y="5956370"/>
+            <a:ext cx="6900109" cy="461665"/>
+          </a:xfrm>
+          <a:prstGeom prst="rect">
+            <a:avLst/>
+          </a:prstGeom>
+          <a:noFill/>
+        </p:spPr>
+        <p:txBody>
+          <a:bodyPr wrap="square" rtlCol="0">
+            <a:spAutoFit/>
+          </a:bodyPr>
+          <a:lstStyle/>
+          <a:p>
+            <a:r>
+              <a:rPr lang="en-US" sz="2400" dirty="0" smtClean="0"/>
+              <a:t>* - optionally</a:t>
+            </a:r>
+            <a:r>
+              <a:rPr lang="en-US" sz="2400" dirty="0"/>
+              <a:t>/desirable </a:t>
+            </a:r>
+            <a:r>
+              <a:rPr lang="en-US" sz="2400" dirty="0" err="1"/>
+              <a:t>tdelta</a:t>
+            </a:r>
+            <a:endParaRPr lang="en-US" sz="2400" dirty="0"/>
+          </a:p>
+        </p:txBody>
+      </p:sp>
+      <p:sp>
+        <p:nvSpPr>
+          <p:cNvPr id="5" name="Slide Number Placeholder 4"/>
+          <p:cNvSpPr>
+            <a:spLocks noGrp="1"/>
+          </p:cNvSpPr>
+          <p:nvPr>
+            <p:ph type="sldNum" sz="quarter" idx="12"/>
+          </p:nvPr>
+        </p:nvSpPr>
         <p:spPr/>
         <p:txBody>
           <a:bodyPr/>
           <a:lstStyle/>
           <a:p>
-            <a:r>
-              <a:rPr lang="en-US" dirty="0" smtClean="0"/>
-              <a:t>Freeze</a:t>
-            </a:r>
-            <a:endParaRPr lang="en-US" dirty="0"/>
+            <a:fld id="{58CD5DA3-AA7D-F043-8F69-43637440C1B1}" type="slidenum">
+              <a:rPr lang="en-US" smtClean="0"/>
+              <a:t>4</a:t>
+            </a:fld>
+            <a:endParaRPr lang="en-US"/>
           </a:p>
         </p:txBody>
       </p:sp>
     </p:spTree>
     <p:extLst>
       <p:ext uri="{BB962C8B-B14F-4D97-AF65-F5344CB8AC3E}">
-        <p14:creationId xmlns:p14="http://schemas.microsoft.com/office/powerpoint/2010/main" val="615848010"/>
+        <p14:creationId xmlns:p14="http://schemas.microsoft.com/office/powerpoint/2010/main" val="1979187895"/>
       </p:ext>
     </p:extLst>
   </p:cSld>
@@ -3505,20 +5022,163 @@
           <a:p>
             <a:r>
               <a:rPr lang="en-US" dirty="0" smtClean="0"/>
-              <a:t>Usability</a:t>
+              <a:t>TRACE is </a:t>
+            </a:r>
+            <a:r>
+              <a:rPr lang="en-US" sz="2800" dirty="0" smtClean="0"/>
+              <a:t>(</a:t>
+            </a:r>
+            <a:r>
+              <a:rPr lang="en-US" sz="2800" dirty="0" err="1" smtClean="0"/>
+              <a:t>cont</a:t>
+            </a:r>
+            <a:r>
+              <a:rPr lang="en-US" sz="2800" dirty="0" smtClean="0"/>
+              <a:t>)</a:t>
+            </a:r>
+            <a:endParaRPr lang="en-US" sz="2800" dirty="0"/>
+          </a:p>
+        </p:txBody>
+      </p:sp>
+      <p:sp>
+        <p:nvSpPr>
+          <p:cNvPr id="3" name="Content Placeholder 2"/>
+          <p:cNvSpPr>
+            <a:spLocks noGrp="1"/>
+          </p:cNvSpPr>
+          <p:nvPr>
+            <p:ph idx="1"/>
+          </p:nvPr>
+        </p:nvSpPr>
+        <p:spPr/>
+        <p:txBody>
+          <a:bodyPr>
+            <a:normAutofit/>
+          </a:bodyPr>
+          <a:lstStyle/>
+          <a:p>
+            <a:r>
+              <a:rPr lang="en-US" dirty="0"/>
+              <a:t>﻿everything on 1 line</a:t>
+            </a:r>
+          </a:p>
+          <a:p>
+            <a:pPr lvl="1"/>
+            <a:r>
+              <a:rPr lang="en-US" sz="2000" dirty="0"/>
+              <a:t>﻿</a:t>
+            </a:r>
+            <a:r>
+              <a:rPr lang="en-US" dirty="0"/>
+              <a:t>part of the </a:t>
+            </a:r>
+            <a:r>
+              <a:rPr lang="en-US" dirty="0" err="1"/>
+              <a:t>unix</a:t>
+            </a:r>
+            <a:r>
+              <a:rPr lang="en-US" dirty="0"/>
+              <a:t> philosophy -- filter</a:t>
+            </a:r>
+          </a:p>
+          <a:p>
+            <a:r>
+              <a:rPr lang="en-US" dirty="0"/>
+              <a:t>timing – </a:t>
+            </a:r>
+            <a:r>
+              <a:rPr lang="en-US" dirty="0" err="1"/>
+              <a:t>tdelta</a:t>
             </a:r>
             <a:endParaRPr lang="en-US" dirty="0"/>
           </a:p>
-        </p:txBody>
-      </p:sp>
-      <p:sp>
-        <p:nvSpPr>
-          <p:cNvPr id="3" name="Content Placeholder 2"/>
-          <p:cNvSpPr>
-            <a:spLocks noGrp="1"/>
-          </p:cNvSpPr>
-          <p:nvPr>
-            <p:ph idx="1"/>
+          <a:p>
+            <a:pPr lvl="1"/>
+            <a:r>
+              <a:rPr lang="en-US" sz="2400" dirty="0"/>
+              <a:t>Absolute </a:t>
+            </a:r>
+            <a:r>
+              <a:rPr lang="en-US" sz="2400" dirty="0" err="1"/>
+              <a:t>tod</a:t>
+            </a:r>
+            <a:r>
+              <a:rPr lang="en-US" sz="2400" dirty="0"/>
+              <a:t>; convert, delta, stats with </a:t>
+            </a:r>
+            <a:r>
+              <a:rPr lang="en-US" sz="2400" dirty="0" err="1" smtClean="0"/>
+              <a:t>trace_delta.pl</a:t>
+            </a:r>
+            <a:endParaRPr lang="en-US" sz="2400" dirty="0" smtClean="0"/>
+          </a:p>
+          <a:p>
+            <a:r>
+              <a:rPr lang="en-US" dirty="0" smtClean="0"/>
+              <a:t>fast </a:t>
+            </a:r>
+            <a:r>
+              <a:rPr lang="en-US" dirty="0"/>
+              <a:t>... or slow or somewhere </a:t>
+            </a:r>
+            <a:r>
+              <a:rPr lang="en-US" dirty="0" smtClean="0"/>
+              <a:t>in between</a:t>
+            </a:r>
+          </a:p>
+          <a:p>
+            <a:pPr lvl="1"/>
+            <a:r>
+              <a:rPr lang="en-US" dirty="0"/>
+              <a:t>﻿trace to memory (file) or memories (files</a:t>
+            </a:r>
+            <a:r>
+              <a:rPr lang="en-US" dirty="0" smtClean="0"/>
+              <a:t>)</a:t>
+            </a:r>
+          </a:p>
+          <a:p>
+            <a:pPr lvl="1"/>
+            <a:r>
+              <a:rPr lang="en-US" sz="2400" dirty="0"/>
+              <a:t>﻿I have seen a couple of times where I've wanted to limit the </a:t>
+            </a:r>
+            <a:r>
+              <a:rPr lang="en-US" sz="2400" dirty="0" err="1"/>
+              <a:t>lvlM</a:t>
+            </a:r>
+            <a:r>
+              <a:rPr lang="en-US" sz="2400" dirty="0"/>
+              <a:t> mask.  </a:t>
+            </a:r>
+            <a:r>
+              <a:rPr lang="en-US" sz="2400" dirty="0" smtClean="0"/>
+              <a:t>Never </a:t>
+            </a:r>
+            <a:r>
+              <a:rPr lang="en-US" sz="2400" dirty="0"/>
+              <a:t>seen where only a few levels on </a:t>
+            </a:r>
+            <a:r>
+              <a:rPr lang="en-US" sz="2400" dirty="0" smtClean="0"/>
+              <a:t>noticeably </a:t>
+            </a:r>
+            <a:r>
+              <a:rPr lang="en-US" sz="2400" dirty="0"/>
+              <a:t>effected performance.</a:t>
+            </a:r>
+            <a:endParaRPr lang="en-US" sz="2400" dirty="0" smtClean="0"/>
+          </a:p>
+        </p:txBody>
+      </p:sp>
+      <p:sp>
+        <p:nvSpPr>
+          <p:cNvPr id="4" name="Slide Number Placeholder 3"/>
+          <p:cNvSpPr>
+            <a:spLocks noGrp="1"/>
+          </p:cNvSpPr>
+          <p:nvPr>
+            <p:ph type="sldNum" sz="quarter" idx="12"/>
           </p:nvPr>
         </p:nvSpPr>
         <p:spPr/>
@@ -3526,20 +5186,18 @@
           <a:bodyPr/>
           <a:lstStyle/>
           <a:p>
-            <a:r>
-              <a:rPr lang="en-US" dirty="0" smtClean="0"/>
-              <a:t>Running on Non-TRACE systems</a:t>
-            </a:r>
-          </a:p>
-          <a:p>
-            <a:endParaRPr lang="en-US" dirty="0"/>
+            <a:fld id="{58CD5DA3-AA7D-F043-8F69-43637440C1B1}" type="slidenum">
+              <a:rPr lang="en-US" smtClean="0"/>
+              <a:t>5</a:t>
+            </a:fld>
+            <a:endParaRPr lang="en-US"/>
           </a:p>
         </p:txBody>
       </p:sp>
     </p:spTree>
     <p:extLst>
       <p:ext uri="{BB962C8B-B14F-4D97-AF65-F5344CB8AC3E}">
-        <p14:creationId xmlns:p14="http://schemas.microsoft.com/office/powerpoint/2010/main" val="4046839138"/>
+        <p14:creationId xmlns:p14="http://schemas.microsoft.com/office/powerpoint/2010/main" val="2346288987"/>
       </p:ext>
     </p:extLst>
   </p:cSld>
@@ -3568,7 +5226,7 @@
       </p:grpSpPr>
       <p:sp>
         <p:nvSpPr>
-          <p:cNvPr id="7" name="Title 6"/>
+          <p:cNvPr id="2" name="Title 1"/>
           <p:cNvSpPr>
             <a:spLocks noGrp="1"/>
           </p:cNvSpPr>
@@ -3581,18 +5239,34 @@
           <a:bodyPr/>
           <a:lstStyle/>
           <a:p>
-            <a:endParaRPr lang="en-US"/>
-          </a:p>
-        </p:txBody>
-      </p:sp>
-      <p:sp>
-        <p:nvSpPr>
-          <p:cNvPr id="8" name="Text Placeholder 7"/>
-          <p:cNvSpPr>
-            <a:spLocks noGrp="1"/>
-          </p:cNvSpPr>
-          <p:nvPr>
-            <p:ph type="body" idx="1"/>
+            <a:r>
+              <a:rPr lang="en-US" dirty="0"/>
+              <a:t>TRACE is </a:t>
+            </a:r>
+            <a:r>
+              <a:rPr lang="en-US" sz="2800" dirty="0"/>
+              <a:t>(</a:t>
+            </a:r>
+            <a:r>
+              <a:rPr lang="en-US" sz="2800" dirty="0" err="1"/>
+              <a:t>cont</a:t>
+            </a:r>
+            <a:r>
+              <a:rPr lang="en-US" sz="2800" dirty="0"/>
+              <a:t>)</a:t>
+            </a:r>
+            <a:endParaRPr lang="en-US" dirty="0"/>
+          </a:p>
+        </p:txBody>
+      </p:sp>
+      <p:sp>
+        <p:nvSpPr>
+          <p:cNvPr id="3" name="Content Placeholder 2"/>
+          <p:cNvSpPr>
+            <a:spLocks noGrp="1"/>
+          </p:cNvSpPr>
+          <p:nvPr>
+            <p:ph idx="1"/>
           </p:nvPr>
         </p:nvSpPr>
         <p:spPr/>
@@ -3600,27 +5274,238 @@
           <a:bodyPr/>
           <a:lstStyle/>
           <a:p>
-            <a:pPr algn="ctr"/>
             <a:r>
               <a:rPr lang="en-US" dirty="0"/>
-              <a:t>TRACE </a:t>
+              <a:t>﻿</a:t>
             </a:r>
             <a:r>
               <a:rPr lang="en-US" dirty="0" smtClean="0"/>
-              <a:t>System</a:t>
-            </a:r>
-            <a:endParaRPr lang="en-US" dirty="0"/>
-          </a:p>
-        </p:txBody>
-      </p:sp>
-      <p:sp>
-        <p:nvSpPr>
-          <p:cNvPr id="9" name="Content Placeholder 8"/>
-          <p:cNvSpPr>
-            <a:spLocks noGrp="1"/>
-          </p:cNvSpPr>
-          <p:nvPr>
-            <p:ph sz="half" idx="2"/>
+              <a:t>controllable</a:t>
+            </a:r>
+          </a:p>
+          <a:p>
+            <a:pPr lvl="1"/>
+            <a:r>
+              <a:rPr lang="en-US" dirty="0"/>
+              <a:t>﻿an array of </a:t>
+            </a:r>
+            <a:r>
+              <a:rPr lang="en-US" dirty="0" smtClean="0"/>
+              <a:t>bits</a:t>
+            </a:r>
+            <a:br>
+              <a:rPr lang="en-US" dirty="0" smtClean="0"/>
+            </a:br>
+            <a:r>
+              <a:rPr lang="da-DK" dirty="0"/>
+              <a:t>﻿</a:t>
+            </a:r>
+            <a:r>
+              <a:rPr lang="da-DK" sz="1200" dirty="0">
+                <a:latin typeface="Courier"/>
+                <a:cs typeface="Courier"/>
+              </a:rPr>
+              <a:t>$ TRACE_LVLS=-</a:t>
+            </a:r>
+            <a:r>
+              <a:rPr lang="da-DK" sz="1200" dirty="0" smtClean="0">
+                <a:latin typeface="Courier"/>
+                <a:cs typeface="Courier"/>
+              </a:rPr>
+              <a:t>1 </a:t>
+            </a:r>
+            <a:r>
+              <a:rPr lang="da-DK" sz="1200" dirty="0" err="1" smtClean="0">
+                <a:latin typeface="Courier"/>
+                <a:cs typeface="Courier"/>
+              </a:rPr>
+              <a:t>ttids</a:t>
+            </a:r>
+            <a:r>
+              <a:rPr lang="da-DK" sz="1200" dirty="0" smtClean="0">
+                <a:latin typeface="Courier"/>
+                <a:cs typeface="Courier"/>
+              </a:rPr>
+              <a:t/>
+            </a:r>
+            <a:br>
+              <a:rPr lang="da-DK" sz="1200" dirty="0" smtClean="0">
+                <a:latin typeface="Courier"/>
+                <a:cs typeface="Courier"/>
+              </a:rPr>
+            </a:br>
+            <a:r>
+              <a:rPr lang="da-DK" sz="1200" dirty="0" smtClean="0">
+                <a:latin typeface="Courier"/>
+                <a:cs typeface="Courier"/>
+              </a:rPr>
+              <a:t>mode</a:t>
+            </a:r>
+            <a:r>
+              <a:rPr lang="da-DK" sz="1200" dirty="0">
+                <a:latin typeface="Courier"/>
+                <a:cs typeface="Courier"/>
+              </a:rPr>
+              <a:t>:                               M=0                S=</a:t>
+            </a:r>
+            <a:r>
+              <a:rPr lang="da-DK" sz="1200" dirty="0" smtClean="0">
+                <a:latin typeface="Courier"/>
+                <a:cs typeface="Courier"/>
+              </a:rPr>
+              <a:t>1</a:t>
+            </a:r>
+            <a:br>
+              <a:rPr lang="da-DK" sz="1200" dirty="0" smtClean="0">
+                <a:latin typeface="Courier"/>
+                <a:cs typeface="Courier"/>
+              </a:rPr>
+            </a:br>
+            <a:r>
+              <a:rPr lang="da-DK" sz="1200" dirty="0" smtClean="0">
+                <a:latin typeface="Courier"/>
+                <a:cs typeface="Courier"/>
+              </a:rPr>
+              <a:t>TID             </a:t>
+            </a:r>
+            <a:r>
+              <a:rPr lang="da-DK" sz="1200" dirty="0">
+                <a:latin typeface="Courier"/>
+                <a:cs typeface="Courier"/>
+              </a:rPr>
+              <a:t>NAME              </a:t>
+            </a:r>
+            <a:r>
+              <a:rPr lang="da-DK" sz="1200" dirty="0" err="1">
+                <a:latin typeface="Courier"/>
+                <a:cs typeface="Courier"/>
+              </a:rPr>
+              <a:t>maskM</a:t>
+            </a:r>
+            <a:r>
+              <a:rPr lang="da-DK" sz="1200" dirty="0">
+                <a:latin typeface="Courier"/>
+                <a:cs typeface="Courier"/>
+              </a:rPr>
+              <a:t>              </a:t>
+            </a:r>
+            <a:r>
+              <a:rPr lang="da-DK" sz="1200" dirty="0" err="1">
+                <a:latin typeface="Courier"/>
+                <a:cs typeface="Courier"/>
+              </a:rPr>
+              <a:t>maskS</a:t>
+            </a:r>
+            <a:r>
+              <a:rPr lang="da-DK" sz="1200" dirty="0">
+                <a:latin typeface="Courier"/>
+                <a:cs typeface="Courier"/>
+              </a:rPr>
+              <a:t>              </a:t>
+            </a:r>
+            <a:r>
+              <a:rPr lang="da-DK" sz="1200" dirty="0" err="1" smtClean="0">
+                <a:latin typeface="Courier"/>
+                <a:cs typeface="Courier"/>
+              </a:rPr>
+              <a:t>maskT</a:t>
+            </a:r>
+            <a:r>
+              <a:rPr lang="da-DK" sz="1200" dirty="0" smtClean="0">
+                <a:latin typeface="Courier"/>
+                <a:cs typeface="Courier"/>
+              </a:rPr>
+              <a:t/>
+            </a:r>
+            <a:br>
+              <a:rPr lang="da-DK" sz="1200" dirty="0" smtClean="0">
+                <a:latin typeface="Courier"/>
+                <a:cs typeface="Courier"/>
+              </a:rPr>
+            </a:br>
+            <a:r>
+              <a:rPr lang="da-DK" sz="1200" dirty="0" smtClean="0">
+                <a:latin typeface="Courier"/>
+                <a:cs typeface="Courier"/>
+              </a:rPr>
+              <a:t>-</a:t>
+            </a:r>
+            <a:r>
+              <a:rPr lang="da-DK" sz="1200" dirty="0">
+                <a:latin typeface="Courier"/>
+                <a:cs typeface="Courier"/>
+              </a:rPr>
+              <a:t>-- ---------------- ------------------ ------------------ -----------------</a:t>
+            </a:r>
+            <a:r>
+              <a:rPr lang="da-DK" sz="1200" dirty="0" smtClean="0">
+                <a:latin typeface="Courier"/>
+                <a:cs typeface="Courier"/>
+              </a:rPr>
+              <a:t>-</a:t>
+            </a:r>
+            <a:br>
+              <a:rPr lang="da-DK" sz="1200" dirty="0" smtClean="0">
+                <a:latin typeface="Courier"/>
+                <a:cs typeface="Courier"/>
+              </a:rPr>
+            </a:br>
+            <a:r>
+              <a:rPr lang="da-DK" sz="1200" dirty="0" smtClean="0">
+                <a:latin typeface="Courier"/>
+                <a:cs typeface="Courier"/>
+              </a:rPr>
+              <a:t>  0            </a:t>
+            </a:r>
+            <a:r>
+              <a:rPr lang="da-DK" sz="1200" dirty="0">
+                <a:latin typeface="Courier"/>
+                <a:cs typeface="Courier"/>
+              </a:rPr>
+              <a:t>TRACE 0x0000000000000001 0xffffffffffffffff </a:t>
+            </a:r>
+            <a:r>
+              <a:rPr lang="da-DK" sz="1200" dirty="0" smtClean="0">
+                <a:latin typeface="Courier"/>
+                <a:cs typeface="Courier"/>
+              </a:rPr>
+              <a:t>0x0000000000000000</a:t>
+            </a:r>
+            <a:br>
+              <a:rPr lang="da-DK" sz="1200" dirty="0" smtClean="0">
+                <a:latin typeface="Courier"/>
+                <a:cs typeface="Courier"/>
+              </a:rPr>
+            </a:br>
+            <a:r>
+              <a:rPr lang="da-DK" sz="1200" dirty="0" smtClean="0">
+                <a:latin typeface="Courier"/>
+                <a:cs typeface="Courier"/>
+              </a:rPr>
+              <a:t>  </a:t>
+            </a:r>
+            <a:r>
+              <a:rPr lang="da-DK" sz="1200" dirty="0">
+                <a:latin typeface="Courier"/>
+                <a:cs typeface="Courier"/>
+              </a:rPr>
+              <a:t>1          _TRACE_ 0x0000000000000001 0x0000000000000000 0x0000000000000000</a:t>
+            </a:r>
+            <a:endParaRPr lang="en-US" sz="1200" dirty="0">
+              <a:latin typeface="Courier"/>
+              <a:cs typeface="Courier"/>
+            </a:endParaRPr>
+          </a:p>
+        </p:txBody>
+      </p:sp>
+      <p:sp>
+        <p:nvSpPr>
+          <p:cNvPr id="4" name="Slide Number Placeholder 3"/>
+          <p:cNvSpPr>
+            <a:spLocks noGrp="1"/>
+          </p:cNvSpPr>
+          <p:nvPr>
+            <p:ph type="sldNum" sz="quarter" idx="12"/>
           </p:nvPr>
         </p:nvSpPr>
         <p:spPr/>
@@ -3628,153 +5513,18 @@
           <a:bodyPr/>
           <a:lstStyle/>
           <a:p>
-            <a:r>
-              <a:rPr lang="en-US" dirty="0" err="1"/>
-              <a:t>Env</a:t>
-            </a:r>
-            <a:r>
-              <a:rPr lang="en-US" dirty="0"/>
-              <a:t> vars.</a:t>
-            </a:r>
-          </a:p>
-          <a:p>
-            <a:r>
-              <a:rPr lang="en-US" dirty="0"/>
-              <a:t>App </a:t>
-            </a:r>
-            <a:r>
-              <a:rPr lang="en-US" dirty="0" err="1"/>
-              <a:t>init</a:t>
-            </a:r>
-            <a:r>
-              <a:rPr lang="en-US" dirty="0"/>
-              <a:t>?</a:t>
-            </a:r>
-          </a:p>
-          <a:p>
-            <a:r>
-              <a:rPr lang="en-US" dirty="0" err="1"/>
-              <a:t>Proc</a:t>
-            </a:r>
-            <a:r>
-              <a:rPr lang="en-US" dirty="0"/>
-              <a:t> interface</a:t>
-            </a:r>
-          </a:p>
-          <a:p>
-            <a:r>
-              <a:rPr lang="en-US" dirty="0"/>
-              <a:t>Debugger</a:t>
-            </a:r>
-          </a:p>
-          <a:p>
-            <a:r>
-              <a:rPr lang="en-US" dirty="0"/>
-              <a:t>App thread</a:t>
-            </a:r>
-            <a:r>
-              <a:rPr lang="en-US" dirty="0" smtClean="0"/>
-              <a:t>?</a:t>
-            </a:r>
-            <a:endParaRPr lang="en-US" dirty="0"/>
-          </a:p>
-        </p:txBody>
-      </p:sp>
-      <p:sp>
-        <p:nvSpPr>
-          <p:cNvPr id="10" name="Text Placeholder 9"/>
-          <p:cNvSpPr>
-            <a:spLocks noGrp="1"/>
-          </p:cNvSpPr>
-          <p:nvPr>
-            <p:ph type="body" sz="quarter" idx="3"/>
-          </p:nvPr>
-        </p:nvSpPr>
-        <p:spPr/>
-        <p:txBody>
-          <a:bodyPr/>
-          <a:lstStyle/>
-          <a:p>
-            <a:pPr algn="ctr"/>
-            <a:r>
-              <a:rPr lang="en-US" dirty="0"/>
-              <a:t>Non-TRACE </a:t>
-            </a:r>
-            <a:r>
-              <a:rPr lang="en-US" dirty="0" smtClean="0"/>
-              <a:t>System</a:t>
-            </a:r>
-            <a:endParaRPr lang="en-US" dirty="0"/>
-          </a:p>
-        </p:txBody>
-      </p:sp>
-      <p:sp>
-        <p:nvSpPr>
-          <p:cNvPr id="11" name="Content Placeholder 10"/>
-          <p:cNvSpPr>
-            <a:spLocks noGrp="1"/>
-          </p:cNvSpPr>
-          <p:nvPr>
-            <p:ph sz="quarter" idx="4"/>
-          </p:nvPr>
-        </p:nvSpPr>
-        <p:spPr/>
-        <p:txBody>
-          <a:bodyPr/>
-          <a:lstStyle/>
-          <a:p>
-            <a:r>
-              <a:rPr lang="en-US" dirty="0" err="1"/>
-              <a:t>Env</a:t>
-            </a:r>
-            <a:r>
-              <a:rPr lang="en-US" dirty="0"/>
-              <a:t> vars.</a:t>
-            </a:r>
-          </a:p>
-          <a:p>
-            <a:r>
-              <a:rPr lang="en-US" dirty="0"/>
-              <a:t>App </a:t>
-            </a:r>
-            <a:r>
-              <a:rPr lang="en-US" dirty="0" err="1"/>
-              <a:t>init</a:t>
-            </a:r>
-            <a:r>
-              <a:rPr lang="en-US" dirty="0" smtClean="0"/>
-              <a:t>?</a:t>
-            </a:r>
-          </a:p>
-          <a:p>
-            <a:pPr marL="0" indent="0">
-              <a:buNone/>
-            </a:pPr>
-            <a:endParaRPr lang="en-US" dirty="0"/>
-          </a:p>
-          <a:p>
-            <a:r>
-              <a:rPr lang="en-US" dirty="0"/>
-              <a:t>Debugger</a:t>
-            </a:r>
-          </a:p>
-          <a:p>
-            <a:r>
-              <a:rPr lang="en-US" dirty="0"/>
-              <a:t>App thread</a:t>
-            </a:r>
-            <a:r>
-              <a:rPr lang="en-US" dirty="0" smtClean="0"/>
-              <a:t>?</a:t>
-            </a:r>
-            <a:endParaRPr lang="en-US" dirty="0"/>
+            <a:fld id="{58CD5DA3-AA7D-F043-8F69-43637440C1B1}" type="slidenum">
+              <a:rPr lang="en-US" smtClean="0"/>
+              <a:t>6</a:t>
+            </a:fld>
+            <a:endParaRPr lang="en-US"/>
           </a:p>
         </p:txBody>
       </p:sp>
     </p:spTree>
     <p:extLst>
       <p:ext uri="{BB962C8B-B14F-4D97-AF65-F5344CB8AC3E}">
-        <p14:creationId xmlns:p14="http://schemas.microsoft.com/office/powerpoint/2010/main" val="371378561"/>
+        <p14:creationId xmlns:p14="http://schemas.microsoft.com/office/powerpoint/2010/main" val="3941612706"/>
       </p:ext>
     </p:extLst>
   </p:cSld>
@@ -3803,295 +5553,902 @@
       </p:grpSpPr>
       <p:sp>
         <p:nvSpPr>
-          <p:cNvPr id="6" name="TextBox 5"/>
-          <p:cNvSpPr txBox="1"/>
+          <p:cNvPr id="2" name="Title 1"/>
+          <p:cNvSpPr>
+            <a:spLocks noGrp="1"/>
+          </p:cNvSpPr>
+          <p:nvPr>
+            <p:ph type="title"/>
+          </p:nvPr>
+        </p:nvSpPr>
+        <p:spPr/>
+        <p:txBody>
+          <a:bodyPr/>
+          <a:lstStyle/>
+          <a:p>
+            <a:r>
+              <a:rPr lang="en-US" dirty="0" smtClean="0"/>
+              <a:t>TRACE is NOT</a:t>
+            </a:r>
+            <a:endParaRPr lang="en-US" dirty="0"/>
+          </a:p>
+        </p:txBody>
+      </p:sp>
+      <p:sp>
+        <p:nvSpPr>
+          <p:cNvPr id="3" name="Content Placeholder 2"/>
+          <p:cNvSpPr>
+            <a:spLocks noGrp="1"/>
+          </p:cNvSpPr>
+          <p:nvPr>
+            <p:ph idx="1"/>
+          </p:nvPr>
+        </p:nvSpPr>
+        <p:spPr/>
+        <p:txBody>
+          <a:bodyPr/>
+          <a:lstStyle/>
+          <a:p>
+            <a:r>
+              <a:rPr lang="en-US" dirty="0"/>
+              <a:t>﻿sampling </a:t>
+            </a:r>
+            <a:r>
+              <a:rPr lang="en-US" dirty="0" smtClean="0"/>
+              <a:t>profiler</a:t>
+            </a:r>
+          </a:p>
+          <a:p>
+            <a:r>
+              <a:rPr lang="en-US" dirty="0"/>
+              <a:t>﻿performance </a:t>
+            </a:r>
+            <a:r>
+              <a:rPr lang="en-US" dirty="0" smtClean="0"/>
+              <a:t>counter measurement</a:t>
+            </a:r>
+          </a:p>
+          <a:p>
+            <a:r>
+              <a:rPr lang="en-US" dirty="0"/>
+              <a:t>﻿</a:t>
+            </a:r>
+            <a:r>
+              <a:rPr lang="en-US" dirty="0" smtClean="0"/>
+              <a:t>debugger – breakpoint/</a:t>
+            </a:r>
+            <a:r>
+              <a:rPr lang="en-US" smtClean="0"/>
+              <a:t>single step</a:t>
+            </a:r>
+            <a:endParaRPr lang="en-US" dirty="0"/>
+          </a:p>
+        </p:txBody>
+      </p:sp>
+      <p:sp>
+        <p:nvSpPr>
+          <p:cNvPr id="4" name="Slide Number Placeholder 3"/>
+          <p:cNvSpPr>
+            <a:spLocks noGrp="1"/>
+          </p:cNvSpPr>
+          <p:nvPr>
+            <p:ph type="sldNum" sz="quarter" idx="12"/>
+          </p:nvPr>
+        </p:nvSpPr>
+        <p:spPr/>
+        <p:txBody>
+          <a:bodyPr/>
+          <a:lstStyle/>
+          <a:p>
+            <a:fld id="{58CD5DA3-AA7D-F043-8F69-43637440C1B1}" type="slidenum">
+              <a:rPr lang="en-US" smtClean="0"/>
+              <a:t>7</a:t>
+            </a:fld>
+            <a:endParaRPr lang="en-US"/>
+          </a:p>
+        </p:txBody>
+      </p:sp>
+    </p:spTree>
+    <p:extLst>
+      <p:ext uri="{BB962C8B-B14F-4D97-AF65-F5344CB8AC3E}">
+        <p14:creationId xmlns:p14="http://schemas.microsoft.com/office/powerpoint/2010/main" val="2480108267"/>
+      </p:ext>
+    </p:extLst>
+  </p:cSld>
+  <p:clrMapOvr>
+    <a:masterClrMapping/>
+  </p:clrMapOvr>
+</p:sld>
+</file>
+
+<file path=ppt/slides/slide8.xml><?xml version="1.0" encoding="utf-8"?>
+<p:sld xmlns:a="http://schemas.openxmlformats.org/drawingml/2006/main" xmlns:r="http://schemas.openxmlformats.org/officeDocument/2006/relationships" xmlns:p="http://schemas.openxmlformats.org/presentationml/2006/main">
+  <p:cSld>
+    <p:spTree>
+      <p:nvGrpSpPr>
+        <p:cNvPr id="1" name=""/>
+        <p:cNvGrpSpPr/>
+        <p:nvPr/>
+      </p:nvGrpSpPr>
+      <p:grpSpPr>
+        <a:xfrm>
+          <a:off x="0" y="0"/>
+          <a:ext cx="0" cy="0"/>
+          <a:chOff x="0" y="0"/>
+          <a:chExt cx="0" cy="0"/>
+        </a:xfrm>
+      </p:grpSpPr>
+      <p:sp>
+        <p:nvSpPr>
+          <p:cNvPr id="2" name="Title 1"/>
+          <p:cNvSpPr>
+            <a:spLocks noGrp="1"/>
+          </p:cNvSpPr>
+          <p:nvPr>
+            <p:ph type="title"/>
+          </p:nvPr>
+        </p:nvSpPr>
+        <p:spPr/>
+        <p:txBody>
+          <a:bodyPr/>
+          <a:lstStyle/>
+          <a:p>
+            <a:r>
+              <a:rPr lang="en-US" dirty="0" err="1" smtClean="0"/>
+              <a:t>tshow</a:t>
+            </a:r>
+            <a:endParaRPr lang="en-US" dirty="0"/>
+          </a:p>
+        </p:txBody>
+      </p:sp>
+      <p:sp>
+        <p:nvSpPr>
+          <p:cNvPr id="3" name="Content Placeholder 2"/>
+          <p:cNvSpPr>
+            <a:spLocks noGrp="1"/>
+          </p:cNvSpPr>
+          <p:nvPr>
+            <p:ph idx="1"/>
+          </p:nvPr>
+        </p:nvSpPr>
+        <p:spPr>
+          <a:xfrm>
+            <a:off x="141981" y="1600200"/>
+            <a:ext cx="8684533" cy="4525963"/>
+          </a:xfrm>
+        </p:spPr>
+        <p:txBody>
+          <a:bodyPr>
+            <a:normAutofit/>
+          </a:bodyPr>
+          <a:lstStyle/>
+          <a:p>
+            <a:pPr marL="0" indent="0">
+              <a:buNone/>
+            </a:pPr>
+            <a:r>
+              <a:rPr lang="en-US" dirty="0"/>
+              <a:t>﻿</a:t>
+            </a:r>
+            <a:r>
+              <a:rPr lang="en-US" sz="1400" dirty="0">
+                <a:latin typeface="Courier"/>
+                <a:cs typeface="Courier"/>
+              </a:rPr>
+              <a:t>$ TRACE_SHOW="HTIL" </a:t>
+            </a:r>
+            <a:r>
+              <a:rPr lang="en-US" sz="1400" dirty="0" err="1">
+                <a:latin typeface="Courier"/>
+                <a:cs typeface="Courier"/>
+              </a:rPr>
+              <a:t>tshow</a:t>
+            </a:r>
+            <a:r>
+              <a:rPr lang="en-US" sz="1400" dirty="0">
+                <a:latin typeface="Courier"/>
+                <a:cs typeface="Courier"/>
+              </a:rPr>
+              <a:t> </a:t>
+            </a:r>
+            <a:r>
+              <a:rPr lang="en-US" sz="1400" dirty="0" smtClean="0">
+                <a:latin typeface="Courier"/>
+                <a:cs typeface="Courier"/>
+              </a:rPr>
+              <a:t>10</a:t>
+            </a:r>
+          </a:p>
+          <a:p>
+            <a:pPr marL="0" indent="0">
+              <a:buNone/>
+            </a:pPr>
+            <a:r>
+              <a:rPr lang="en-US" sz="1400" dirty="0" smtClean="0">
+                <a:latin typeface="Courier"/>
+                <a:cs typeface="Courier"/>
+              </a:rPr>
+              <a:t>          </a:t>
+            </a:r>
+            <a:r>
+              <a:rPr lang="en-US" sz="1400" dirty="0" err="1">
+                <a:latin typeface="Courier"/>
+                <a:cs typeface="Courier"/>
+              </a:rPr>
+              <a:t>us_tod</a:t>
+            </a:r>
+            <a:r>
+              <a:rPr lang="en-US" sz="1400" dirty="0">
+                <a:latin typeface="Courier"/>
+                <a:cs typeface="Courier"/>
+              </a:rPr>
+              <a:t> TID lv </a:t>
+            </a:r>
+            <a:r>
+              <a:rPr lang="en-US" sz="1400" dirty="0" err="1" smtClean="0">
+                <a:latin typeface="Courier"/>
+                <a:cs typeface="Courier"/>
+              </a:rPr>
+              <a:t>msg</a:t>
+            </a:r>
+            <a:endParaRPr lang="en-US" sz="1400" dirty="0" smtClean="0">
+              <a:latin typeface="Courier"/>
+              <a:cs typeface="Courier"/>
+            </a:endParaRPr>
+          </a:p>
+          <a:p>
+            <a:pPr marL="0" indent="0">
+              <a:buNone/>
+            </a:pPr>
+            <a:r>
+              <a:rPr lang="en-US" sz="1400" dirty="0" smtClean="0">
+                <a:latin typeface="Courier"/>
+                <a:cs typeface="Courier"/>
+              </a:rPr>
+              <a:t>-</a:t>
+            </a:r>
+            <a:r>
+              <a:rPr lang="en-US" sz="1400" dirty="0">
+                <a:latin typeface="Courier"/>
+                <a:cs typeface="Courier"/>
+              </a:rPr>
+              <a:t>--------------- --- -</a:t>
+            </a:r>
+            <a:r>
+              <a:rPr lang="en-US" sz="1400" dirty="0" smtClean="0">
+                <a:latin typeface="Courier"/>
+                <a:cs typeface="Courier"/>
+              </a:rPr>
+              <a:t>- -----------------------------</a:t>
+            </a:r>
+          </a:p>
+          <a:p>
+            <a:pPr marL="0" indent="0">
+              <a:buNone/>
+            </a:pPr>
+            <a:r>
+              <a:rPr lang="en-US" sz="1400" dirty="0" smtClean="0">
+                <a:latin typeface="Courier"/>
+                <a:cs typeface="Courier"/>
+              </a:rPr>
+              <a:t>1394662919691795  </a:t>
+            </a:r>
+            <a:r>
+              <a:rPr lang="en-US" sz="1400" dirty="0">
+                <a:latin typeface="Courier"/>
+                <a:cs typeface="Courier"/>
+              </a:rPr>
+              <a:t>18  0 back to </a:t>
+            </a:r>
+            <a:r>
+              <a:rPr lang="en-US" sz="1400" dirty="0" err="1" smtClean="0">
+                <a:latin typeface="Courier"/>
+                <a:cs typeface="Courier"/>
+              </a:rPr>
+              <a:t>example_main</a:t>
+            </a:r>
+            <a:endParaRPr lang="en-US" sz="1400" dirty="0" smtClean="0">
+              <a:latin typeface="Courier"/>
+              <a:cs typeface="Courier"/>
+            </a:endParaRPr>
+          </a:p>
+          <a:p>
+            <a:pPr marL="0" indent="0">
+              <a:buNone/>
+            </a:pPr>
+            <a:r>
+              <a:rPr lang="en-US" sz="1400" dirty="0" smtClean="0">
+                <a:latin typeface="Courier"/>
+                <a:cs typeface="Courier"/>
+              </a:rPr>
+              <a:t>1394662919691623  </a:t>
+            </a:r>
+            <a:r>
+              <a:rPr lang="en-US" sz="1400" dirty="0">
+                <a:latin typeface="Courier"/>
+                <a:cs typeface="Courier"/>
+              </a:rPr>
+              <a:t>18  0 hello from example_sub1() after  calling example_sub2(</a:t>
+            </a:r>
+            <a:r>
+              <a:rPr lang="en-US" sz="1400" dirty="0" smtClean="0">
+                <a:latin typeface="Courier"/>
+                <a:cs typeface="Courier"/>
+              </a:rPr>
+              <a:t>)</a:t>
+            </a:r>
+          </a:p>
+          <a:p>
+            <a:pPr marL="0" indent="0">
+              <a:buNone/>
+            </a:pPr>
+            <a:r>
+              <a:rPr lang="en-US" sz="1400" dirty="0" smtClean="0">
+                <a:latin typeface="Courier"/>
+                <a:cs typeface="Courier"/>
+              </a:rPr>
+              <a:t>1394662919691612  </a:t>
+            </a:r>
+            <a:r>
+              <a:rPr lang="en-US" sz="1400" dirty="0">
+                <a:latin typeface="Courier"/>
+                <a:cs typeface="Courier"/>
+              </a:rPr>
+              <a:t>18  0 hello from example_sub1() before calling example_sub2(</a:t>
+            </a:r>
+            <a:r>
+              <a:rPr lang="en-US" sz="1400" dirty="0" smtClean="0">
+                <a:latin typeface="Courier"/>
+                <a:cs typeface="Courier"/>
+              </a:rPr>
+              <a:t>)</a:t>
+            </a:r>
+          </a:p>
+          <a:p>
+            <a:pPr marL="0" indent="0">
+              <a:buNone/>
+            </a:pPr>
+            <a:r>
+              <a:rPr lang="en-US" sz="1400" dirty="0" smtClean="0">
+                <a:latin typeface="Courier"/>
+                <a:cs typeface="Courier"/>
+              </a:rPr>
+              <a:t>1394662919691554  </a:t>
+            </a:r>
+            <a:r>
+              <a:rPr lang="en-US" sz="1400" dirty="0">
+                <a:latin typeface="Courier"/>
+                <a:cs typeface="Courier"/>
+              </a:rPr>
+              <a:t>18  0 hello from example_sub1() after  calling example_sub2(</a:t>
+            </a:r>
+            <a:r>
+              <a:rPr lang="en-US" sz="1400" dirty="0" smtClean="0">
+                <a:latin typeface="Courier"/>
+                <a:cs typeface="Courier"/>
+              </a:rPr>
+              <a:t>)</a:t>
+            </a:r>
+          </a:p>
+          <a:p>
+            <a:pPr marL="0" indent="0">
+              <a:buNone/>
+            </a:pPr>
+            <a:r>
+              <a:rPr lang="en-US" sz="1400" dirty="0" smtClean="0">
+                <a:latin typeface="Courier"/>
+                <a:cs typeface="Courier"/>
+              </a:rPr>
+              <a:t>1394662919691542  </a:t>
+            </a:r>
+            <a:r>
+              <a:rPr lang="en-US" sz="1400" dirty="0">
+                <a:latin typeface="Courier"/>
+                <a:cs typeface="Courier"/>
+              </a:rPr>
+              <a:t>18  0 hello from example_sub1() before calling example_sub2(</a:t>
+            </a:r>
+            <a:r>
+              <a:rPr lang="en-US" sz="1400" dirty="0" smtClean="0">
+                <a:latin typeface="Courier"/>
+                <a:cs typeface="Courier"/>
+              </a:rPr>
+              <a:t>)</a:t>
+            </a:r>
+          </a:p>
+          <a:p>
+            <a:pPr marL="0" indent="0">
+              <a:buNone/>
+            </a:pPr>
+            <a:r>
+              <a:rPr lang="en-US" sz="1400" dirty="0" smtClean="0">
+                <a:latin typeface="Courier"/>
+                <a:cs typeface="Courier"/>
+              </a:rPr>
+              <a:t>1394662919691524  </a:t>
+            </a:r>
+            <a:r>
+              <a:rPr lang="en-US" sz="1400" dirty="0">
+                <a:latin typeface="Courier"/>
+                <a:cs typeface="Courier"/>
+              </a:rPr>
+              <a:t>18  0 hello from example_sub1() after  calling example_sub2(</a:t>
+            </a:r>
+            <a:r>
+              <a:rPr lang="en-US" sz="1400" dirty="0" smtClean="0">
+                <a:latin typeface="Courier"/>
+                <a:cs typeface="Courier"/>
+              </a:rPr>
+              <a:t>)</a:t>
+            </a:r>
+          </a:p>
+          <a:p>
+            <a:pPr marL="0" indent="0">
+              <a:buNone/>
+            </a:pPr>
+            <a:r>
+              <a:rPr lang="en-US" sz="1400" dirty="0" smtClean="0">
+                <a:latin typeface="Courier"/>
+                <a:cs typeface="Courier"/>
+              </a:rPr>
+              <a:t>1394662919691512  </a:t>
+            </a:r>
+            <a:r>
+              <a:rPr lang="en-US" sz="1400" dirty="0">
+                <a:latin typeface="Courier"/>
+                <a:cs typeface="Courier"/>
+              </a:rPr>
+              <a:t>18  0 hello from example_sub1() before calling example_sub2(</a:t>
+            </a:r>
+            <a:r>
+              <a:rPr lang="en-US" sz="1400" dirty="0" smtClean="0">
+                <a:latin typeface="Courier"/>
+                <a:cs typeface="Courier"/>
+              </a:rPr>
+              <a:t>)</a:t>
+            </a:r>
+          </a:p>
+          <a:p>
+            <a:pPr marL="0" indent="0">
+              <a:buNone/>
+            </a:pPr>
+            <a:r>
+              <a:rPr lang="en-US" sz="1400" dirty="0" smtClean="0">
+                <a:latin typeface="Courier"/>
+                <a:cs typeface="Courier"/>
+              </a:rPr>
+              <a:t>1394662919691500  </a:t>
+            </a:r>
+            <a:r>
+              <a:rPr lang="en-US" sz="1400" dirty="0">
+                <a:latin typeface="Courier"/>
+                <a:cs typeface="Courier"/>
+              </a:rPr>
+              <a:t>18  0 hello from example_sub1() after  calling example_sub2(</a:t>
+            </a:r>
+            <a:r>
+              <a:rPr lang="en-US" sz="1400" dirty="0" smtClean="0">
+                <a:latin typeface="Courier"/>
+                <a:cs typeface="Courier"/>
+              </a:rPr>
+              <a:t>)</a:t>
+            </a:r>
+          </a:p>
+          <a:p>
+            <a:pPr marL="0" indent="0">
+              <a:buNone/>
+            </a:pPr>
+            <a:r>
+              <a:rPr lang="en-US" sz="1400" smtClean="0">
+                <a:latin typeface="Courier"/>
+                <a:cs typeface="Courier"/>
+              </a:rPr>
+              <a:t>1394662919691400  </a:t>
+            </a:r>
+            <a:r>
+              <a:rPr lang="en-US" sz="1400" dirty="0">
+                <a:latin typeface="Courier"/>
+                <a:cs typeface="Courier"/>
+              </a:rPr>
+              <a:t>18  0 hello from example_sub1() before calling example_sub2</a:t>
+            </a:r>
+            <a:r>
+              <a:rPr lang="en-US" sz="1400">
+                <a:latin typeface="Courier"/>
+                <a:cs typeface="Courier"/>
+              </a:rPr>
+              <a:t>(</a:t>
+            </a:r>
+            <a:r>
+              <a:rPr lang="en-US" sz="1400" smtClean="0">
+                <a:latin typeface="Courier"/>
+                <a:cs typeface="Courier"/>
+              </a:rPr>
+              <a:t>)</a:t>
+            </a:r>
+          </a:p>
+          <a:p>
+            <a:pPr marL="0" indent="0">
+              <a:buNone/>
+            </a:pPr>
+            <a:r>
+              <a:rPr lang="en-US" sz="1400" smtClean="0">
+                <a:latin typeface="Courier"/>
+                <a:cs typeface="Courier"/>
+              </a:rPr>
+              <a:t>1394662919691213  </a:t>
+            </a:r>
+            <a:r>
+              <a:rPr lang="en-US" sz="1400" dirty="0">
+                <a:latin typeface="Courier"/>
+                <a:cs typeface="Courier"/>
+              </a:rPr>
+              <a:t>18  0 hello from example_sub1() after  calling example_sub2()</a:t>
+            </a:r>
+          </a:p>
+        </p:txBody>
+      </p:sp>
+      <p:sp>
+        <p:nvSpPr>
+          <p:cNvPr id="4" name="Slide Number Placeholder 3"/>
+          <p:cNvSpPr>
+            <a:spLocks noGrp="1"/>
+          </p:cNvSpPr>
+          <p:nvPr>
+            <p:ph type="sldNum" sz="quarter" idx="12"/>
+          </p:nvPr>
+        </p:nvSpPr>
+        <p:spPr/>
+        <p:txBody>
+          <a:bodyPr/>
+          <a:lstStyle/>
+          <a:p>
+            <a:fld id="{58CD5DA3-AA7D-F043-8F69-43637440C1B1}" type="slidenum">
+              <a:rPr lang="en-US" smtClean="0"/>
+              <a:t>8</a:t>
+            </a:fld>
+            <a:endParaRPr lang="en-US"/>
+          </a:p>
+        </p:txBody>
+      </p:sp>
+    </p:spTree>
+    <p:extLst>
+      <p:ext uri="{BB962C8B-B14F-4D97-AF65-F5344CB8AC3E}">
+        <p14:creationId xmlns:p14="http://schemas.microsoft.com/office/powerpoint/2010/main" val="4098198260"/>
+      </p:ext>
+    </p:extLst>
+  </p:cSld>
+  <p:clrMapOvr>
+    <a:masterClrMapping/>
+  </p:clrMapOvr>
+</p:sld>
+</file>
+
+<file path=ppt/slides/slide9.xml><?xml version="1.0" encoding="utf-8"?>
+<p:sld xmlns:a="http://schemas.openxmlformats.org/drawingml/2006/main" xmlns:r="http://schemas.openxmlformats.org/officeDocument/2006/relationships" xmlns:p="http://schemas.openxmlformats.org/presentationml/2006/main">
+  <p:cSld>
+    <p:spTree>
+      <p:nvGrpSpPr>
+        <p:cNvPr id="1" name=""/>
+        <p:cNvGrpSpPr/>
+        <p:nvPr/>
+      </p:nvGrpSpPr>
+      <p:grpSpPr>
+        <a:xfrm>
+          <a:off x="0" y="0"/>
+          <a:ext cx="0" cy="0"/>
+          <a:chOff x="0" y="0"/>
+          <a:chExt cx="0" cy="0"/>
+        </a:xfrm>
+      </p:grpSpPr>
+      <p:sp>
+        <p:nvSpPr>
+          <p:cNvPr id="2" name="Title 1"/>
+          <p:cNvSpPr>
+            <a:spLocks noGrp="1"/>
+          </p:cNvSpPr>
+          <p:nvPr>
+            <p:ph type="title"/>
+          </p:nvPr>
+        </p:nvSpPr>
+        <p:spPr/>
+        <p:txBody>
+          <a:bodyPr/>
+          <a:lstStyle/>
+          <a:p>
+            <a:r>
+              <a:rPr lang="en-US" dirty="0" smtClean="0"/>
+              <a:t>Fundamentals</a:t>
+            </a:r>
+            <a:endParaRPr lang="en-US" dirty="0"/>
+          </a:p>
+        </p:txBody>
+      </p:sp>
+      <p:sp>
+        <p:nvSpPr>
+          <p:cNvPr id="3" name="Content Placeholder 2"/>
+          <p:cNvSpPr>
+            <a:spLocks noGrp="1"/>
+          </p:cNvSpPr>
+          <p:nvPr>
+            <p:ph idx="1"/>
+          </p:nvPr>
+        </p:nvSpPr>
+        <p:spPr>
+          <a:xfrm>
+            <a:off x="457200" y="1600202"/>
+            <a:ext cx="8229600" cy="2025072"/>
+          </a:xfrm>
+        </p:spPr>
+        <p:txBody>
+          <a:bodyPr/>
+          <a:lstStyle/>
+          <a:p>
+            <a:r>
+              <a:rPr lang="en-US" dirty="0" smtClean="0"/>
+              <a:t>Application points</a:t>
+            </a:r>
+          </a:p>
+          <a:p>
+            <a:r>
+              <a:rPr lang="en-US" dirty="0" smtClean="0"/>
+              <a:t>Timestamps (delta time)</a:t>
+            </a:r>
+          </a:p>
+          <a:p>
+            <a:r>
+              <a:rPr lang="en-US" dirty="0" smtClean="0"/>
+              <a:t>Circular buffer</a:t>
+            </a:r>
+            <a:endParaRPr lang="en-US" dirty="0"/>
+          </a:p>
+        </p:txBody>
+      </p:sp>
+      <p:sp>
+        <p:nvSpPr>
+          <p:cNvPr id="4" name="Content Placeholder 2"/>
+          <p:cNvSpPr txBox="1">
+            <a:spLocks/>
+          </p:cNvSpPr>
           <p:nvPr/>
         </p:nvSpPr>
         <p:spPr>
-          <a:xfrm rot="20082213">
-            <a:off x="1437334" y="1372797"/>
-            <a:ext cx="1581829" cy="1015663"/>
+          <a:xfrm>
+            <a:off x="457200" y="4702850"/>
+            <a:ext cx="8229600" cy="1403153"/>
           </a:xfrm>
           <a:prstGeom prst="rect">
             <a:avLst/>
           </a:prstGeom>
-          <a:noFill/>
         </p:spPr>
         <p:txBody>
-          <a:bodyPr wrap="square" rtlCol="0">
-            <a:spAutoFit/>
+          <a:bodyPr vert="horz" lIns="91440" tIns="45720" rIns="91440" bIns="45720" rtlCol="0">
+            <a:normAutofit/>
           </a:bodyPr>
-          <a:lstStyle/>
+          <a:lstStyle>
+            <a:lvl1pPr marL="342900" indent="-342900" algn="l" defTabSz="457200" rtl="0" eaLnBrk="1" latinLnBrk="0" hangingPunct="1">
+              <a:spcBef>
+                <a:spcPct val="20000"/>
+              </a:spcBef>
+              <a:buFont typeface="Arial"/>
+              <a:buChar char="•"/>
+              <a:defRPr sz="3200" kern="1200">
+                <a:solidFill>
+                  <a:schemeClr val="tx1"/>
+                </a:solidFill>
+                <a:latin typeface="+mn-lt"/>
+                <a:ea typeface="+mn-ea"/>
+                <a:cs typeface="+mn-cs"/>
+              </a:defRPr>
+            </a:lvl1pPr>
+            <a:lvl2pPr marL="742950" indent="-285750" algn="l" defTabSz="457200" rtl="0" eaLnBrk="1" latinLnBrk="0" hangingPunct="1">
+              <a:spcBef>
+                <a:spcPct val="20000"/>
+              </a:spcBef>
+              <a:buFont typeface="Arial"/>
+              <a:buChar char="–"/>
+              <a:defRPr sz="2800" kern="1200">
+                <a:solidFill>
+                  <a:schemeClr val="tx1"/>
+                </a:solidFill>
+                <a:latin typeface="+mn-lt"/>
+                <a:ea typeface="+mn-ea"/>
+                <a:cs typeface="+mn-cs"/>
+              </a:defRPr>
+            </a:lvl2pPr>
+            <a:lvl3pPr marL="1143000" indent="-228600" algn="l" defTabSz="457200" rtl="0" eaLnBrk="1" latinLnBrk="0" hangingPunct="1">
+              <a:spcBef>
+                <a:spcPct val="20000"/>
+              </a:spcBef>
+              <a:buFont typeface="Arial"/>
+              <a:buChar char="•"/>
+              <a:defRPr sz="2400" kern="1200">
+                <a:solidFill>
+                  <a:schemeClr val="tx1"/>
+                </a:solidFill>
+                <a:latin typeface="+mn-lt"/>
+                <a:ea typeface="+mn-ea"/>
+                <a:cs typeface="+mn-cs"/>
+              </a:defRPr>
+            </a:lvl3pPr>
+            <a:lvl4pPr marL="1600200" indent="-228600" algn="l" defTabSz="457200" rtl="0" eaLnBrk="1" latinLnBrk="0" hangingPunct="1">
+              <a:spcBef>
+                <a:spcPct val="20000"/>
+              </a:spcBef>
+              <a:buFont typeface="Arial"/>
+              <a:buChar char="–"/>
+              <a:defRPr sz="2000" kern="1200">
+                <a:solidFill>
+                  <a:schemeClr val="tx1"/>
+                </a:solidFill>
+                <a:latin typeface="+mn-lt"/>
+                <a:ea typeface="+mn-ea"/>
+                <a:cs typeface="+mn-cs"/>
+              </a:defRPr>
+            </a:lvl4pPr>
+            <a:lvl5pPr marL="2057400" indent="-228600" algn="l" defTabSz="457200" rtl="0" eaLnBrk="1" latinLnBrk="0" hangingPunct="1">
+              <a:spcBef>
+                <a:spcPct val="20000"/>
+              </a:spcBef>
+              <a:buFont typeface="Arial"/>
+              <a:buChar char="»"/>
+              <a:defRPr sz="2000" kern="1200">
+                <a:solidFill>
+                  <a:schemeClr val="tx1"/>
+                </a:solidFill>
+                <a:latin typeface="+mn-lt"/>
+                <a:ea typeface="+mn-ea"/>
+                <a:cs typeface="+mn-cs"/>
+              </a:defRPr>
+            </a:lvl5pPr>
+            <a:lvl6pPr marL="2514600" indent="-228600" algn="l" defTabSz="457200" rtl="0" eaLnBrk="1" latinLnBrk="0" hangingPunct="1">
+              <a:spcBef>
+                <a:spcPct val="20000"/>
+              </a:spcBef>
+              <a:buFont typeface="Arial"/>
+              <a:buChar char="•"/>
+              <a:defRPr sz="2000" kern="1200">
+                <a:solidFill>
+                  <a:schemeClr val="tx1"/>
+                </a:solidFill>
+                <a:latin typeface="+mn-lt"/>
+                <a:ea typeface="+mn-ea"/>
+                <a:cs typeface="+mn-cs"/>
+              </a:defRPr>
+            </a:lvl6pPr>
+            <a:lvl7pPr marL="2971800" indent="-228600" algn="l" defTabSz="457200" rtl="0" eaLnBrk="1" latinLnBrk="0" hangingPunct="1">
+              <a:spcBef>
+                <a:spcPct val="20000"/>
+              </a:spcBef>
+              <a:buFont typeface="Arial"/>
+              <a:buChar char="•"/>
+              <a:defRPr sz="2000" kern="1200">
+                <a:solidFill>
+                  <a:schemeClr val="tx1"/>
+                </a:solidFill>
+                <a:latin typeface="+mn-lt"/>
+                <a:ea typeface="+mn-ea"/>
+                <a:cs typeface="+mn-cs"/>
+              </a:defRPr>
+            </a:lvl7pPr>
+            <a:lvl8pPr marL="3429000" indent="-228600" algn="l" defTabSz="457200" rtl="0" eaLnBrk="1" latinLnBrk="0" hangingPunct="1">
+              <a:spcBef>
+                <a:spcPct val="20000"/>
+              </a:spcBef>
+              <a:buFont typeface="Arial"/>
+              <a:buChar char="•"/>
+              <a:defRPr sz="2000" kern="1200">
+                <a:solidFill>
+                  <a:schemeClr val="tx1"/>
+                </a:solidFill>
+                <a:latin typeface="+mn-lt"/>
+                <a:ea typeface="+mn-ea"/>
+                <a:cs typeface="+mn-cs"/>
+              </a:defRPr>
+            </a:lvl8pPr>
+            <a:lvl9pPr marL="3886200" indent="-228600" algn="l" defTabSz="457200" rtl="0" eaLnBrk="1" latinLnBrk="0" hangingPunct="1">
+              <a:spcBef>
+                <a:spcPct val="20000"/>
+              </a:spcBef>
+              <a:buFont typeface="Arial"/>
+              <a:buChar char="•"/>
+              <a:defRPr sz="2000" kern="1200">
+                <a:solidFill>
+                  <a:schemeClr val="tx1"/>
+                </a:solidFill>
+                <a:latin typeface="+mn-lt"/>
+                <a:ea typeface="+mn-ea"/>
+                <a:cs typeface="+mn-cs"/>
+              </a:defRPr>
+            </a:lvl9pPr>
+          </a:lstStyle>
           <a:p>
             <a:r>
               <a:rPr lang="en-US" dirty="0" smtClean="0"/>
-              <a:t>Control/status</a:t>
-            </a:r>
-          </a:p>
-          <a:p>
-            <a:r>
-              <a:rPr lang="en-US" sz="1400" dirty="0" smtClean="0"/>
-              <a:t>Level set</a:t>
-            </a:r>
-          </a:p>
-          <a:p>
-            <a:r>
-              <a:rPr lang="en-US" sz="1400" dirty="0"/>
-              <a:t> </a:t>
-            </a:r>
-            <a:r>
-              <a:rPr lang="en-US" sz="1400" dirty="0" smtClean="0"/>
-              <a:t>    name=[</a:t>
-            </a:r>
-            <a:r>
-              <a:rPr lang="en-US" sz="1400" dirty="0" err="1" smtClean="0"/>
-              <a:t>lvl</a:t>
-            </a:r>
-            <a:r>
-              <a:rPr lang="en-US" sz="1400" dirty="0" smtClean="0"/>
-              <a:t>,]&lt;</a:t>
-            </a:r>
-            <a:r>
-              <a:rPr lang="en-US" sz="1400" dirty="0" err="1" smtClean="0"/>
-              <a:t>lvl</a:t>
-            </a:r>
-            <a:r>
-              <a:rPr lang="en-US" sz="1400" dirty="0" smtClean="0"/>
-              <a:t>&gt;</a:t>
-            </a:r>
-          </a:p>
-          <a:p>
-            <a:r>
-              <a:rPr lang="en-US" sz="1400" dirty="0" smtClean="0"/>
-              <a:t>OR just [</a:t>
-            </a:r>
-            <a:r>
-              <a:rPr lang="en-US" sz="1400" dirty="0" err="1" smtClean="0"/>
-              <a:t>lvl</a:t>
-            </a:r>
-            <a:r>
-              <a:rPr lang="en-US" sz="1400" dirty="0" smtClean="0"/>
-              <a:t>,]&lt;</a:t>
-            </a:r>
-            <a:r>
-              <a:rPr lang="en-US" sz="1400" dirty="0" err="1" smtClean="0"/>
-              <a:t>lvl</a:t>
-            </a:r>
-            <a:r>
-              <a:rPr lang="en-US" sz="1400" dirty="0" smtClean="0"/>
-              <a:t>&gt;</a:t>
-            </a:r>
-          </a:p>
-        </p:txBody>
-      </p:sp>
-      <p:sp>
-        <p:nvSpPr>
-          <p:cNvPr id="7" name="TextBox 6"/>
-          <p:cNvSpPr txBox="1"/>
+              <a:t>Scheduling changes</a:t>
+            </a:r>
+          </a:p>
+          <a:p>
+            <a:r>
+              <a:rPr lang="en-US" dirty="0" smtClean="0"/>
+              <a:t>Interrupts</a:t>
+            </a:r>
+          </a:p>
+        </p:txBody>
+      </p:sp>
+      <p:sp>
+        <p:nvSpPr>
+          <p:cNvPr id="5" name="Title 1"/>
+          <p:cNvSpPr txBox="1">
+            <a:spLocks/>
+          </p:cNvSpPr>
           <p:nvPr/>
         </p:nvSpPr>
         <p:spPr>
           <a:xfrm>
-            <a:off x="5483168" y="3840632"/>
-            <a:ext cx="3254492" cy="800219"/>
+            <a:off x="455660" y="3925457"/>
+            <a:ext cx="8229600" cy="777393"/>
           </a:xfrm>
           <a:prstGeom prst="rect">
             <a:avLst/>
           </a:prstGeom>
-          <a:noFill/>
         </p:spPr>
         <p:txBody>
-          <a:bodyPr wrap="none" rtlCol="0">
-            <a:spAutoFit/>
+          <a:bodyPr vert="horz" lIns="91440" tIns="45720" rIns="91440" bIns="45720" rtlCol="0" anchor="ctr">
+            <a:normAutofit/>
           </a:bodyPr>
-          <a:lstStyle/>
-          <a:p>
-            <a:r>
-              <a:rPr lang="en-US" dirty="0" smtClean="0"/>
-              <a:t>Buffer insert/control</a:t>
-            </a:r>
-          </a:p>
-          <a:p>
-            <a:r>
-              <a:rPr lang="en-US" sz="1400" dirty="0" smtClean="0"/>
-              <a:t>Trigger – post trigger </a:t>
-            </a:r>
-            <a:r>
-              <a:rPr lang="en-US" sz="1400" dirty="0" smtClean="0"/>
-              <a:t>count or if/when full</a:t>
-            </a:r>
-          </a:p>
-          <a:p>
-            <a:r>
-              <a:rPr lang="en-US" sz="1400" dirty="0" smtClean="0"/>
-              <a:t>Reset</a:t>
-            </a:r>
-            <a:endParaRPr lang="en-US" sz="1400" dirty="0"/>
-          </a:p>
-        </p:txBody>
-      </p:sp>
-      <p:sp>
-        <p:nvSpPr>
-          <p:cNvPr id="9" name="TextBox 8"/>
-          <p:cNvSpPr txBox="1"/>
-          <p:nvPr/>
-        </p:nvSpPr>
-        <p:spPr>
-          <a:xfrm>
-            <a:off x="1087508" y="5209570"/>
-            <a:ext cx="3810079" cy="646331"/>
-          </a:xfrm>
-          <a:prstGeom prst="rect">
-            <a:avLst/>
-          </a:prstGeom>
-          <a:noFill/>
-        </p:spPr>
-        <p:txBody>
-          <a:bodyPr wrap="square" rtlCol="0">
-            <a:spAutoFit/>
-          </a:bodyPr>
-          <a:lstStyle/>
-          <a:p>
-            <a:r>
-              <a:rPr lang="en-US" dirty="0" smtClean="0"/>
-              <a:t>Process “</a:t>
-            </a:r>
-            <a:r>
-              <a:rPr lang="en-US" dirty="0" err="1" smtClean="0"/>
-              <a:t>globals</a:t>
-            </a:r>
-            <a:r>
-              <a:rPr lang="en-US" dirty="0" smtClean="0"/>
-              <a:t>”/process </a:t>
-            </a:r>
-            <a:r>
-              <a:rPr lang="en-US" dirty="0" err="1" smtClean="0"/>
-              <a:t>initialiation</a:t>
-            </a:r>
-            <a:endParaRPr lang="en-US" dirty="0" smtClean="0"/>
-          </a:p>
-          <a:p>
-            <a:endParaRPr lang="en-US" dirty="0"/>
-          </a:p>
-        </p:txBody>
-      </p:sp>
-      <p:sp>
-        <p:nvSpPr>
-          <p:cNvPr id="10" name="TextBox 9"/>
-          <p:cNvSpPr txBox="1"/>
-          <p:nvPr/>
-        </p:nvSpPr>
-        <p:spPr>
-          <a:xfrm>
-            <a:off x="5483168" y="807447"/>
-            <a:ext cx="1543805" cy="1200329"/>
-          </a:xfrm>
-          <a:prstGeom prst="rect">
-            <a:avLst/>
-          </a:prstGeom>
-          <a:noFill/>
-        </p:spPr>
-        <p:txBody>
-          <a:bodyPr wrap="square" rtlCol="0">
-            <a:spAutoFit/>
-          </a:bodyPr>
-          <a:lstStyle/>
-          <a:p>
-            <a:r>
-              <a:rPr lang="en-US" dirty="0" smtClean="0"/>
-              <a:t>Packaging</a:t>
-            </a:r>
-          </a:p>
-          <a:p>
-            <a:r>
-              <a:rPr lang="en-US" dirty="0"/>
-              <a:t> </a:t>
-            </a:r>
-            <a:r>
-              <a:rPr lang="en-US" dirty="0" smtClean="0"/>
-              <a:t>  - header files</a:t>
-            </a:r>
-          </a:p>
-          <a:p>
-            <a:r>
-              <a:rPr lang="en-US" dirty="0"/>
-              <a:t> </a:t>
-            </a:r>
-            <a:r>
-              <a:rPr lang="en-US" dirty="0" smtClean="0"/>
-              <a:t> - library???</a:t>
-            </a:r>
-          </a:p>
-          <a:p>
-            <a:endParaRPr lang="en-US" dirty="0"/>
-          </a:p>
-        </p:txBody>
-      </p:sp>
-      <p:sp>
-        <p:nvSpPr>
-          <p:cNvPr id="11" name="TextBox 10"/>
-          <p:cNvSpPr txBox="1"/>
-          <p:nvPr/>
-        </p:nvSpPr>
-        <p:spPr>
-          <a:xfrm>
-            <a:off x="2699757" y="3026874"/>
-            <a:ext cx="3049584" cy="1754327"/>
-          </a:xfrm>
-          <a:prstGeom prst="rect">
-            <a:avLst/>
-          </a:prstGeom>
-          <a:noFill/>
-        </p:spPr>
-        <p:txBody>
-          <a:bodyPr wrap="square" rtlCol="0">
-            <a:spAutoFit/>
-          </a:bodyPr>
-          <a:lstStyle/>
-          <a:p>
-            <a:r>
-              <a:rPr lang="en-US" dirty="0" smtClean="0"/>
-              <a:t>User space vs. kernel</a:t>
-            </a:r>
-          </a:p>
-          <a:p>
-            <a:r>
-              <a:rPr lang="en-US" dirty="0" smtClean="0"/>
-              <a:t>(use, not control)</a:t>
-            </a:r>
-          </a:p>
-          <a:p>
-            <a:r>
-              <a:rPr lang="en-US" dirty="0" err="1" smtClean="0"/>
-              <a:t>Init_check</a:t>
-            </a:r>
-            <a:endParaRPr lang="en-US" dirty="0" smtClean="0"/>
-          </a:p>
-          <a:p>
-            <a:r>
-              <a:rPr lang="en-US" dirty="0" smtClean="0"/>
-              <a:t>TRACE                         TRACE</a:t>
-            </a:r>
-          </a:p>
-          <a:p>
-            <a:r>
-              <a:rPr lang="en-US" dirty="0" smtClean="0"/>
-              <a:t>Freeze                        freeze</a:t>
-            </a:r>
-          </a:p>
-          <a:p>
-            <a:r>
-              <a:rPr lang="en-US" dirty="0" smtClean="0"/>
-              <a:t>Set level</a:t>
-            </a:r>
-            <a:endParaRPr lang="en-US" dirty="0"/>
+          <a:lstStyle>
+            <a:lvl1pPr algn="ctr" defTabSz="457200" rtl="0" eaLnBrk="1" latinLnBrk="0" hangingPunct="1">
+              <a:spcBef>
+                <a:spcPct val="0"/>
+              </a:spcBef>
+              <a:buNone/>
+              <a:defRPr sz="4400" kern="1200">
+                <a:solidFill>
+                  <a:schemeClr val="tx1"/>
+                </a:solidFill>
+                <a:latin typeface="+mj-lt"/>
+                <a:ea typeface="+mj-ea"/>
+                <a:cs typeface="+mj-cs"/>
+              </a:defRPr>
+            </a:lvl1pPr>
+          </a:lstStyle>
+          <a:p>
+            <a:r>
+              <a:rPr lang="en-US" sz="3200" dirty="0" smtClean="0"/>
+              <a:t>Module Adds</a:t>
+            </a:r>
+            <a:endParaRPr lang="en-US" sz="3200" dirty="0"/>
+          </a:p>
+        </p:txBody>
+      </p:sp>
+      <p:sp>
+        <p:nvSpPr>
+          <p:cNvPr id="6" name="Slide Number Placeholder 5"/>
+          <p:cNvSpPr>
+            <a:spLocks noGrp="1"/>
+          </p:cNvSpPr>
+          <p:nvPr>
+            <p:ph type="sldNum" sz="quarter" idx="12"/>
+          </p:nvPr>
+        </p:nvSpPr>
+        <p:spPr/>
+        <p:txBody>
+          <a:bodyPr/>
+          <a:lstStyle/>
+          <a:p>
+            <a:fld id="{58CD5DA3-AA7D-F043-8F69-43637440C1B1}" type="slidenum">
+              <a:rPr lang="en-US" smtClean="0"/>
+              <a:t>9</a:t>
+            </a:fld>
+            <a:endParaRPr lang="en-US"/>
           </a:p>
         </p:txBody>
       </p:sp>
     </p:spTree>
     <p:extLst>
       <p:ext uri="{BB962C8B-B14F-4D97-AF65-F5344CB8AC3E}">
-        <p14:creationId xmlns:p14="http://schemas.microsoft.com/office/powerpoint/2010/main" val="2503619743"/>
+        <p14:creationId xmlns:p14="http://schemas.microsoft.com/office/powerpoint/2010/main" val="3352506969"/>
       </p:ext>
     </p:extLst>
   </p:cSld>
@@ -4419,4 +6776,644 @@
   </a:objectDefaults>
   <a:extraClrSchemeLst/>
 </a:theme>
+</file>
+
+<file path=ppt/theme/theme2.xml><?xml version="1.0" encoding="utf-8"?>
+<a:theme xmlns:a="http://schemas.openxmlformats.org/drawingml/2006/main" name="Office Theme">
+  <a:themeElements>
+    <a:clrScheme name="Office">
+      <a:dk1>
+        <a:sysClr val="windowText" lastClr="000000"/>
+      </a:dk1>
+      <a:lt1>
+        <a:sysClr val="window" lastClr="FFFFFF"/>
+      </a:lt1>
+      <a:dk2>
+        <a:srgbClr val="1F497D"/>
+      </a:dk2>
+      <a:lt2>
+        <a:srgbClr val="EEECE1"/>
+      </a:lt2>
+      <a:accent1>
+        <a:srgbClr val="4F81BD"/>
+      </a:accent1>
+      <a:accent2>
+        <a:srgbClr val="C0504D"/>
+      </a:accent2>
+      <a:accent3>
+        <a:srgbClr val="9BBB59"/>
+      </a:accent3>
+      <a:accent4>
+        <a:srgbClr val="8064A2"/>
+      </a:accent4>
+      <a:accent5>
+        <a:srgbClr val="4BACC6"/>
+      </a:accent5>
+      <a:accent6>
+        <a:srgbClr val="F79646"/>
+      </a:accent6>
+      <a:hlink>
+        <a:srgbClr val="0000FF"/>
+      </a:hlink>
+      <a:folHlink>
+        <a:srgbClr val="800080"/>
+      </a:folHlink>
+    </a:clrScheme>
+    <a:fontScheme name="Office">
+      <a:majorFont>
+        <a:latin typeface="Calibri"/>
+        <a:ea typeface=""/>
+        <a:cs typeface=""/>
+        <a:font script="Jpan" typeface="ＭＳ Ｐゴシック"/>
+        <a:font script="Hang" typeface="맑은 고딕"/>
+        <a:font script="Hans" typeface="宋体"/>
+        <a:font script="Hant" typeface="新細明體"/>
+        <a:font script="Arab" typeface="Times New Roman"/>
+        <a:font script="Hebr" typeface="Times New Roman"/>
+        <a:font script="Thai" typeface="Angsana New"/>
+        <a:font script="Ethi" typeface="Nyala"/>
+        <a:font script="Beng" typeface="Vrinda"/>
+        <a:font script="Gujr" typeface="Shruti"/>
+        <a:font script="Khmr" typeface="MoolBoran"/>
+        <a:font script="Knda" typeface="Tunga"/>
+        <a:font script="Guru" typeface="Raavi"/>
+        <a:font script="Cans" typeface="Euphemia"/>
+        <a:font script="Cher" typeface="Plantagenet Cherokee"/>
+        <a:font script="Yiii" typeface="Microsoft Yi Baiti"/>
+        <a:font script="Tibt" typeface="Microsoft Himalaya"/>
+        <a:font script="Thaa" typeface="MV Boli"/>
+        <a:font script="Deva" typeface="Mangal"/>
+        <a:font script="Telu" typeface="Gautami"/>
+        <a:font script="Taml" typeface="Latha"/>
+        <a:font script="Syrc" typeface="Estrangelo Edessa"/>
+        <a:font script="Orya" typeface="Kalinga"/>
+        <a:font script="Mlym" typeface="Kartika"/>
+        <a:font script="Laoo" typeface="DokChampa"/>
+        <a:font script="Sinh" typeface="Iskoola Pota"/>
+        <a:font script="Mong" typeface="Mongolian Baiti"/>
+        <a:font script="Viet" typeface="Times New Roman"/>
+        <a:font script="Uigh" typeface="Microsoft Uighur"/>
+        <a:font script="Geor" typeface="Sylfaen"/>
+      </a:majorFont>
+      <a:minorFont>
+        <a:latin typeface="Calibri"/>
+        <a:ea typeface=""/>
+        <a:cs typeface=""/>
+        <a:font script="Jpan" typeface="ＭＳ Ｐゴシック"/>
+        <a:font script="Hang" typeface="맑은 고딕"/>
+        <a:font script="Hans" typeface="宋体"/>
+        <a:font script="Hant" typeface="新細明體"/>
+        <a:font script="Arab" typeface="Arial"/>
+        <a:font script="Hebr" typeface="Arial"/>
+        <a:font script="Thai" typeface="Cordia New"/>
+        <a:font script="Ethi" typeface="Nyala"/>
+        <a:font script="Beng" typeface="Vrinda"/>
+        <a:font script="Gujr" typeface="Shruti"/>
+        <a:font script="Khmr" typeface="DaunPenh"/>
+        <a:font script="Knda" typeface="Tunga"/>
+        <a:font script="Guru" typeface="Raavi"/>
+        <a:font script="Cans" typeface="Euphemia"/>
+        <a:font script="Cher" typeface="Plantagenet Cherokee"/>
+        <a:font script="Yiii" typeface="Microsoft Yi Baiti"/>
+        <a:font script="Tibt" typeface="Microsoft Himalaya"/>
+        <a:font script="Thaa" typeface="MV Boli"/>
+        <a:font script="Deva" typeface="Mangal"/>
+        <a:font script="Telu" typeface="Gautami"/>
+        <a:font script="Taml" typeface="Latha"/>
+        <a:font script="Syrc" typeface="Estrangelo Edessa"/>
+        <a:font script="Orya" typeface="Kalinga"/>
+        <a:font script="Mlym" typeface="Kartika"/>
+        <a:font script="Laoo" typeface="DokChampa"/>
+        <a:font script="Sinh" typeface="Iskoola Pota"/>
+        <a:font script="Mong" typeface="Mongolian Baiti"/>
+        <a:font script="Viet" typeface="Arial"/>
+        <a:font script="Uigh" typeface="Microsoft Uighur"/>
+        <a:font script="Geor" typeface="Sylfaen"/>
+      </a:minorFont>
+    </a:fontScheme>
+    <a:fmtScheme name="Office">
+      <a:fillStyleLst>
+        <a:solidFill>
+          <a:schemeClr val="phClr"/>
+        </a:solidFill>
+        <a:gradFill rotWithShape="1">
+          <a:gsLst>
+            <a:gs pos="0">
+              <a:schemeClr val="phClr">
+                <a:tint val="50000"/>
+                <a:satMod val="300000"/>
+              </a:schemeClr>
+            </a:gs>
+            <a:gs pos="35000">
+              <a:schemeClr val="phClr">
+                <a:tint val="37000"/>
+                <a:satMod val="300000"/>
+              </a:schemeClr>
+            </a:gs>
+            <a:gs pos="100000">
+              <a:schemeClr val="phClr">
+                <a:tint val="15000"/>
+                <a:satMod val="350000"/>
+              </a:schemeClr>
+            </a:gs>
+          </a:gsLst>
+          <a:lin ang="16200000" scaled="1"/>
+        </a:gradFill>
+        <a:gradFill rotWithShape="1">
+          <a:gsLst>
+            <a:gs pos="0">
+              <a:schemeClr val="phClr">
+                <a:tint val="100000"/>
+                <a:shade val="100000"/>
+                <a:satMod val="130000"/>
+              </a:schemeClr>
+            </a:gs>
+            <a:gs pos="100000">
+              <a:schemeClr val="phClr">
+                <a:tint val="50000"/>
+                <a:shade val="100000"/>
+                <a:satMod val="350000"/>
+              </a:schemeClr>
+            </a:gs>
+          </a:gsLst>
+          <a:lin ang="16200000" scaled="0"/>
+        </a:gradFill>
+      </a:fillStyleLst>
+      <a:lnStyleLst>
+        <a:ln w="9525" cap="flat" cmpd="sng" algn="ctr">
+          <a:solidFill>
+            <a:schemeClr val="phClr">
+              <a:shade val="95000"/>
+              <a:satMod val="105000"/>
+            </a:schemeClr>
+          </a:solidFill>
+          <a:prstDash val="solid"/>
+        </a:ln>
+        <a:ln w="25400" cap="flat" cmpd="sng" algn="ctr">
+          <a:solidFill>
+            <a:schemeClr val="phClr"/>
+          </a:solidFill>
+          <a:prstDash val="solid"/>
+        </a:ln>
+        <a:ln w="38100" cap="flat" cmpd="sng" algn="ctr">
+          <a:solidFill>
+            <a:schemeClr val="phClr"/>
+          </a:solidFill>
+          <a:prstDash val="solid"/>
+        </a:ln>
+      </a:lnStyleLst>
+      <a:effectStyleLst>
+        <a:effectStyle>
+          <a:effectLst>
+            <a:outerShdw blurRad="40000" dist="20000" dir="5400000" rotWithShape="0">
+              <a:srgbClr val="000000">
+                <a:alpha val="38000"/>
+              </a:srgbClr>
+            </a:outerShdw>
+          </a:effectLst>
+        </a:effectStyle>
+        <a:effectStyle>
+          <a:effectLst>
+            <a:outerShdw blurRad="40000" dist="23000" dir="5400000" rotWithShape="0">
+              <a:srgbClr val="000000">
+                <a:alpha val="35000"/>
+              </a:srgbClr>
+            </a:outerShdw>
+          </a:effectLst>
+        </a:effectStyle>
+        <a:effectStyle>
+          <a:effectLst>
+            <a:outerShdw blurRad="40000" dist="23000" dir="5400000" rotWithShape="0">
+              <a:srgbClr val="000000">
+                <a:alpha val="35000"/>
+              </a:srgbClr>
+            </a:outerShdw>
+          </a:effectLst>
+          <a:scene3d>
+            <a:camera prst="orthographicFront">
+              <a:rot lat="0" lon="0" rev="0"/>
+            </a:camera>
+            <a:lightRig rig="threePt" dir="t">
+              <a:rot lat="0" lon="0" rev="1200000"/>
+            </a:lightRig>
+          </a:scene3d>
+          <a:sp3d>
+            <a:bevelT w="63500" h="25400"/>
+          </a:sp3d>
+        </a:effectStyle>
+      </a:effectStyleLst>
+      <a:bgFillStyleLst>
+        <a:solidFill>
+          <a:schemeClr val="phClr"/>
+        </a:solidFill>
+        <a:gradFill rotWithShape="1">
+          <a:gsLst>
+            <a:gs pos="0">
+              <a:schemeClr val="phClr">
+                <a:tint val="40000"/>
+                <a:satMod val="350000"/>
+              </a:schemeClr>
+            </a:gs>
+            <a:gs pos="40000">
+              <a:schemeClr val="phClr">
+                <a:tint val="45000"/>
+                <a:shade val="99000"/>
+                <a:satMod val="350000"/>
+              </a:schemeClr>
+            </a:gs>
+            <a:gs pos="100000">
+              <a:schemeClr val="phClr">
+                <a:shade val="20000"/>
+                <a:satMod val="255000"/>
+              </a:schemeClr>
+            </a:gs>
+          </a:gsLst>
+          <a:path path="circle">
+            <a:fillToRect l="50000" t="-80000" r="50000" b="180000"/>
+          </a:path>
+        </a:gradFill>
+        <a:gradFill rotWithShape="1">
+          <a:gsLst>
+            <a:gs pos="0">
+              <a:schemeClr val="phClr">
+                <a:tint val="80000"/>
+                <a:satMod val="300000"/>
+              </a:schemeClr>
+            </a:gs>
+            <a:gs pos="100000">
+              <a:schemeClr val="phClr">
+                <a:shade val="30000"/>
+                <a:satMod val="200000"/>
+              </a:schemeClr>
+            </a:gs>
+          </a:gsLst>
+          <a:path path="circle">
+            <a:fillToRect l="50000" t="50000" r="50000" b="50000"/>
+          </a:path>
+        </a:gradFill>
+      </a:bgFillStyleLst>
+    </a:fmtScheme>
+  </a:themeElements>
+  <a:objectDefaults>
+    <a:spDef>
+      <a:spPr/>
+      <a:bodyPr/>
+      <a:lstStyle/>
+      <a:style>
+        <a:lnRef idx="1">
+          <a:schemeClr val="accent1"/>
+        </a:lnRef>
+        <a:fillRef idx="3">
+          <a:schemeClr val="accent1"/>
+        </a:fillRef>
+        <a:effectRef idx="2">
+          <a:schemeClr val="accent1"/>
+        </a:effectRef>
+        <a:fontRef idx="minor">
+          <a:schemeClr val="lt1"/>
+        </a:fontRef>
+      </a:style>
+    </a:spDef>
+    <a:lnDef>
+      <a:spPr/>
+      <a:bodyPr/>
+      <a:lstStyle/>
+      <a:style>
+        <a:lnRef idx="2">
+          <a:schemeClr val="accent1"/>
+        </a:lnRef>
+        <a:fillRef idx="0">
+          <a:schemeClr val="accent1"/>
+        </a:fillRef>
+        <a:effectRef idx="1">
+          <a:schemeClr val="accent1"/>
+        </a:effectRef>
+        <a:fontRef idx="minor">
+          <a:schemeClr val="tx1"/>
+        </a:fontRef>
+      </a:style>
+    </a:lnDef>
+  </a:objectDefaults>
+  <a:extraClrSchemeLst/>
+</a:theme>
+</file>
+
+<file path=ppt/theme/theme3.xml><?xml version="1.0" encoding="utf-8"?>
+<a:theme xmlns:a="http://schemas.openxmlformats.org/drawingml/2006/main" name="Office Theme">
+  <a:themeElements>
+    <a:clrScheme name="Office">
+      <a:dk1>
+        <a:sysClr val="windowText" lastClr="000000"/>
+      </a:dk1>
+      <a:lt1>
+        <a:sysClr val="window" lastClr="FFFFFF"/>
+      </a:lt1>
+      <a:dk2>
+        <a:srgbClr val="1F497D"/>
+      </a:dk2>
+      <a:lt2>
+        <a:srgbClr val="EEECE1"/>
+      </a:lt2>
+      <a:accent1>
+        <a:srgbClr val="4F81BD"/>
+      </a:accent1>
+      <a:accent2>
+        <a:srgbClr val="C0504D"/>
+      </a:accent2>
+      <a:accent3>
+        <a:srgbClr val="9BBB59"/>
+      </a:accent3>
+      <a:accent4>
+        <a:srgbClr val="8064A2"/>
+      </a:accent4>
+      <a:accent5>
+        <a:srgbClr val="4BACC6"/>
+      </a:accent5>
+      <a:accent6>
+        <a:srgbClr val="F79646"/>
+      </a:accent6>
+      <a:hlink>
+        <a:srgbClr val="0000FF"/>
+      </a:hlink>
+      <a:folHlink>
+        <a:srgbClr val="800080"/>
+      </a:folHlink>
+    </a:clrScheme>
+    <a:fontScheme name="Office">
+      <a:majorFont>
+        <a:latin typeface="Calibri"/>
+        <a:ea typeface=""/>
+        <a:cs typeface=""/>
+        <a:font script="Jpan" typeface="ＭＳ Ｐゴシック"/>
+        <a:font script="Hang" typeface="맑은 고딕"/>
+        <a:font script="Hans" typeface="宋体"/>
+        <a:font script="Hant" typeface="新細明體"/>
+        <a:font script="Arab" typeface="Times New Roman"/>
+        <a:font script="Hebr" typeface="Times New Roman"/>
+        <a:font script="Thai" typeface="Angsana New"/>
+        <a:font script="Ethi" typeface="Nyala"/>
+        <a:font script="Beng" typeface="Vrinda"/>
+        <a:font script="Gujr" typeface="Shruti"/>
+        <a:font script="Khmr" typeface="MoolBoran"/>
+        <a:font script="Knda" typeface="Tunga"/>
+        <a:font script="Guru" typeface="Raavi"/>
+        <a:font script="Cans" typeface="Euphemia"/>
+        <a:font script="Cher" typeface="Plantagenet Cherokee"/>
+        <a:font script="Yiii" typeface="Microsoft Yi Baiti"/>
+        <a:font script="Tibt" typeface="Microsoft Himalaya"/>
+        <a:font script="Thaa" typeface="MV Boli"/>
+        <a:font script="Deva" typeface="Mangal"/>
+        <a:font script="Telu" typeface="Gautami"/>
+        <a:font script="Taml" typeface="Latha"/>
+        <a:font script="Syrc" typeface="Estrangelo Edessa"/>
+        <a:font script="Orya" typeface="Kalinga"/>
+        <a:font script="Mlym" typeface="Kartika"/>
+        <a:font script="Laoo" typeface="DokChampa"/>
+        <a:font script="Sinh" typeface="Iskoola Pota"/>
+        <a:font script="Mong" typeface="Mongolian Baiti"/>
+        <a:font script="Viet" typeface="Times New Roman"/>
+        <a:font script="Uigh" typeface="Microsoft Uighur"/>
+        <a:font script="Geor" typeface="Sylfaen"/>
+      </a:majorFont>
+      <a:minorFont>
+        <a:latin typeface="Calibri"/>
+        <a:ea typeface=""/>
+        <a:cs typeface=""/>
+        <a:font script="Jpan" typeface="ＭＳ Ｐゴシック"/>
+        <a:font script="Hang" typeface="맑은 고딕"/>
+        <a:font script="Hans" typeface="宋体"/>
+        <a:font script="Hant" typeface="新細明體"/>
+        <a:font script="Arab" typeface="Arial"/>
+        <a:font script="Hebr" typeface="Arial"/>
+        <a:font script="Thai" typeface="Cordia New"/>
+        <a:font script="Ethi" typeface="Nyala"/>
+        <a:font script="Beng" typeface="Vrinda"/>
+        <a:font script="Gujr" typeface="Shruti"/>
+        <a:font script="Khmr" typeface="DaunPenh"/>
+        <a:font script="Knda" typeface="Tunga"/>
+        <a:font script="Guru" typeface="Raavi"/>
+        <a:font script="Cans" typeface="Euphemia"/>
+        <a:font script="Cher" typeface="Plantagenet Cherokee"/>
+        <a:font script="Yiii" typeface="Microsoft Yi Baiti"/>
+        <a:font script="Tibt" typeface="Microsoft Himalaya"/>
+        <a:font script="Thaa" typeface="MV Boli"/>
+        <a:font script="Deva" typeface="Mangal"/>
+        <a:font script="Telu" typeface="Gautami"/>
+        <a:font script="Taml" typeface="Latha"/>
+        <a:font script="Syrc" typeface="Estrangelo Edessa"/>
+        <a:font script="Orya" typeface="Kalinga"/>
+        <a:font script="Mlym" typeface="Kartika"/>
+        <a:font script="Laoo" typeface="DokChampa"/>
+        <a:font script="Sinh" typeface="Iskoola Pota"/>
+        <a:font script="Mong" typeface="Mongolian Baiti"/>
+        <a:font script="Viet" typeface="Arial"/>
+        <a:font script="Uigh" typeface="Microsoft Uighur"/>
+        <a:font script="Geor" typeface="Sylfaen"/>
+      </a:minorFont>
+    </a:fontScheme>
+    <a:fmtScheme name="Office">
+      <a:fillStyleLst>
+        <a:solidFill>
+          <a:schemeClr val="phClr"/>
+        </a:solidFill>
+        <a:gradFill rotWithShape="1">
+          <a:gsLst>
+            <a:gs pos="0">
+              <a:schemeClr val="phClr">
+                <a:tint val="50000"/>
+                <a:satMod val="300000"/>
+              </a:schemeClr>
+            </a:gs>
+            <a:gs pos="35000">
+              <a:schemeClr val="phClr">
+                <a:tint val="37000"/>
+                <a:satMod val="300000"/>
+              </a:schemeClr>
+            </a:gs>
+            <a:gs pos="100000">
+              <a:schemeClr val="phClr">
+                <a:tint val="15000"/>
+                <a:satMod val="350000"/>
+              </a:schemeClr>
+            </a:gs>
+          </a:gsLst>
+          <a:lin ang="16200000" scaled="1"/>
+        </a:gradFill>
+        <a:gradFill rotWithShape="1">
+          <a:gsLst>
+            <a:gs pos="0">
+              <a:schemeClr val="phClr">
+                <a:tint val="100000"/>
+                <a:shade val="100000"/>
+                <a:satMod val="130000"/>
+              </a:schemeClr>
+            </a:gs>
+            <a:gs pos="100000">
+              <a:schemeClr val="phClr">
+                <a:tint val="50000"/>
+                <a:shade val="100000"/>
+                <a:satMod val="350000"/>
+              </a:schemeClr>
+            </a:gs>
+          </a:gsLst>
+          <a:lin ang="16200000" scaled="0"/>
+        </a:gradFill>
+      </a:fillStyleLst>
+      <a:lnStyleLst>
+        <a:ln w="9525" cap="flat" cmpd="sng" algn="ctr">
+          <a:solidFill>
+            <a:schemeClr val="phClr">
+              <a:shade val="95000"/>
+              <a:satMod val="105000"/>
+            </a:schemeClr>
+          </a:solidFill>
+          <a:prstDash val="solid"/>
+        </a:ln>
+        <a:ln w="25400" cap="flat" cmpd="sng" algn="ctr">
+          <a:solidFill>
+            <a:schemeClr val="phClr"/>
+          </a:solidFill>
+          <a:prstDash val="solid"/>
+        </a:ln>
+        <a:ln w="38100" cap="flat" cmpd="sng" algn="ctr">
+          <a:solidFill>
+            <a:schemeClr val="phClr"/>
+          </a:solidFill>
+          <a:prstDash val="solid"/>
+        </a:ln>
+      </a:lnStyleLst>
+      <a:effectStyleLst>
+        <a:effectStyle>
+          <a:effectLst>
+            <a:outerShdw blurRad="40000" dist="20000" dir="5400000" rotWithShape="0">
+              <a:srgbClr val="000000">
+                <a:alpha val="38000"/>
+              </a:srgbClr>
+            </a:outerShdw>
+          </a:effectLst>
+        </a:effectStyle>
+        <a:effectStyle>
+          <a:effectLst>
+            <a:outerShdw blurRad="40000" dist="23000" dir="5400000" rotWithShape="0">
+              <a:srgbClr val="000000">
+                <a:alpha val="35000"/>
+              </a:srgbClr>
+            </a:outerShdw>
+          </a:effectLst>
+        </a:effectStyle>
+        <a:effectStyle>
+          <a:effectLst>
+            <a:outerShdw blurRad="40000" dist="23000" dir="5400000" rotWithShape="0">
+              <a:srgbClr val="000000">
+                <a:alpha val="35000"/>
+              </a:srgbClr>
+            </a:outerShdw>
+          </a:effectLst>
+          <a:scene3d>
+            <a:camera prst="orthographicFront">
+              <a:rot lat="0" lon="0" rev="0"/>
+            </a:camera>
+            <a:lightRig rig="threePt" dir="t">
+              <a:rot lat="0" lon="0" rev="1200000"/>
+            </a:lightRig>
+          </a:scene3d>
+          <a:sp3d>
+            <a:bevelT w="63500" h="25400"/>
+          </a:sp3d>
+        </a:effectStyle>
+      </a:effectStyleLst>
+      <a:bgFillStyleLst>
+        <a:solidFill>
+          <a:schemeClr val="phClr"/>
+        </a:solidFill>
+        <a:gradFill rotWithShape="1">
+          <a:gsLst>
+            <a:gs pos="0">
+              <a:schemeClr val="phClr">
+                <a:tint val="40000"/>
+                <a:satMod val="350000"/>
+              </a:schemeClr>
+            </a:gs>
+            <a:gs pos="40000">
+              <a:schemeClr val="phClr">
+                <a:tint val="45000"/>
+                <a:shade val="99000"/>
+                <a:satMod val="350000"/>
+              </a:schemeClr>
+            </a:gs>
+            <a:gs pos="100000">
+              <a:schemeClr val="phClr">
+                <a:shade val="20000"/>
+                <a:satMod val="255000"/>
+              </a:schemeClr>
+            </a:gs>
+          </a:gsLst>
+          <a:path path="circle">
+            <a:fillToRect l="50000" t="-80000" r="50000" b="180000"/>
+          </a:path>
+        </a:gradFill>
+        <a:gradFill rotWithShape="1">
+          <a:gsLst>
+            <a:gs pos="0">
+              <a:schemeClr val="phClr">
+                <a:tint val="80000"/>
+                <a:satMod val="300000"/>
+              </a:schemeClr>
+            </a:gs>
+            <a:gs pos="100000">
+              <a:schemeClr val="phClr">
+                <a:shade val="30000"/>
+                <a:satMod val="200000"/>
+              </a:schemeClr>
+            </a:gs>
+          </a:gsLst>
+          <a:path path="circle">
+            <a:fillToRect l="50000" t="50000" r="50000" b="50000"/>
+          </a:path>
+        </a:gradFill>
+      </a:bgFillStyleLst>
+    </a:fmtScheme>
+  </a:themeElements>
+  <a:objectDefaults>
+    <a:spDef>
+      <a:spPr/>
+      <a:bodyPr/>
+      <a:lstStyle/>
+      <a:style>
+        <a:lnRef idx="1">
+          <a:schemeClr val="accent1"/>
+        </a:lnRef>
+        <a:fillRef idx="3">
+          <a:schemeClr val="accent1"/>
+        </a:fillRef>
+        <a:effectRef idx="2">
+          <a:schemeClr val="accent1"/>
+        </a:effectRef>
+        <a:fontRef idx="minor">
+          <a:schemeClr val="lt1"/>
+        </a:fontRef>
+      </a:style>
+    </a:spDef>
+    <a:lnDef>
+      <a:spPr/>
+      <a:bodyPr/>
+      <a:lstStyle/>
+      <a:style>
+        <a:lnRef idx="2">
+          <a:schemeClr val="accent1"/>
+        </a:lnRef>
+        <a:fillRef idx="0">
+          <a:schemeClr val="accent1"/>
+        </a:fillRef>
+        <a:effectRef idx="1">
+          <a:schemeClr val="accent1"/>
+        </a:effectRef>
+        <a:fontRef idx="minor">
+          <a:schemeClr val="tx1"/>
+        </a:fontRef>
+      </a:style>
+    </a:lnDef>
+  </a:objectDefaults>
+  <a:extraClrSchemeLst/>
+</a:theme>
 </file>
</xml_diff>

<commit_message>
doc presented at Neat Topics
git-svn-id: svn+ssh://cdcvs.fnal.gov/cvs/projects/trace-svn/trunk@239 f0fafde3-ccc7-4eb4-bb98-6daa41875d3e
</commit_message>
<xml_diff>
--- a/trace/doc/trace.pptx
+++ b/trace/doc/trace.pptx
@@ -209,7 +209,7 @@
           <a:p>
             <a:fld id="{A2FEBFDB-231B-674F-910D-B890E9DE9DBA}" type="datetimeFigureOut">
               <a:rPr lang="en-US" smtClean="0"/>
-              <a:t>3/12/14</a:t>
+              <a:t>3/13/14</a:t>
             </a:fld>
             <a:endParaRPr lang="en-US"/>
           </a:p>
@@ -375,7 +375,7 @@
           <a:p>
             <a:fld id="{D5EAA2E6-C9CE-534C-9D4C-804D2B58C141}" type="datetimeFigureOut">
               <a:rPr lang="en-US" smtClean="0"/>
-              <a:t>3/12/14</a:t>
+              <a:t>3/13/14</a:t>
             </a:fld>
             <a:endParaRPr lang="en-US"/>
           </a:p>
@@ -909,7 +909,7 @@
           <a:p>
             <a:fld id="{B70DB30F-4784-EF47-9BA3-BEEF06E9E02C}" type="datetime1">
               <a:rPr lang="en-US" smtClean="0"/>
-              <a:t>3/12/14</a:t>
+              <a:t>3/13/14</a:t>
             </a:fld>
             <a:endParaRPr lang="en-US"/>
           </a:p>
@@ -1079,7 +1079,7 @@
           <a:p>
             <a:fld id="{816D4DC0-0B9D-A54E-8359-2B0104417767}" type="datetime1">
               <a:rPr lang="en-US" smtClean="0"/>
-              <a:t>3/12/14</a:t>
+              <a:t>3/13/14</a:t>
             </a:fld>
             <a:endParaRPr lang="en-US"/>
           </a:p>
@@ -1259,7 +1259,7 @@
           <a:p>
             <a:fld id="{856A8FCA-27F0-6A4C-9E06-A43F4AA1DA0B}" type="datetime1">
               <a:rPr lang="en-US" smtClean="0"/>
-              <a:t>3/12/14</a:t>
+              <a:t>3/13/14</a:t>
             </a:fld>
             <a:endParaRPr lang="en-US"/>
           </a:p>
@@ -1429,7 +1429,7 @@
           <a:p>
             <a:fld id="{BFADF6ED-B1C8-D948-A600-E6C546B0EC74}" type="datetime1">
               <a:rPr lang="en-US" smtClean="0"/>
-              <a:t>3/12/14</a:t>
+              <a:t>3/13/14</a:t>
             </a:fld>
             <a:endParaRPr lang="en-US"/>
           </a:p>
@@ -1675,7 +1675,7 @@
           <a:p>
             <a:fld id="{2A39BF1A-42E6-F941-8B0D-E3FD3430E673}" type="datetime1">
               <a:rPr lang="en-US" smtClean="0"/>
-              <a:t>3/12/14</a:t>
+              <a:t>3/13/14</a:t>
             </a:fld>
             <a:endParaRPr lang="en-US"/>
           </a:p>
@@ -1963,7 +1963,7 @@
           <a:p>
             <a:fld id="{95B08030-5F35-EC47-AD85-5EE30A5D6FAD}" type="datetime1">
               <a:rPr lang="en-US" smtClean="0"/>
-              <a:t>3/12/14</a:t>
+              <a:t>3/13/14</a:t>
             </a:fld>
             <a:endParaRPr lang="en-US"/>
           </a:p>
@@ -2385,7 +2385,7 @@
           <a:p>
             <a:fld id="{2F5A8964-95A6-F74D-A794-A05915FAEEC1}" type="datetime1">
               <a:rPr lang="en-US" smtClean="0"/>
-              <a:t>3/12/14</a:t>
+              <a:t>3/13/14</a:t>
             </a:fld>
             <a:endParaRPr lang="en-US"/>
           </a:p>
@@ -2503,7 +2503,7 @@
           <a:p>
             <a:fld id="{CBE1E919-B6B9-3B4B-B09D-97116761E1AC}" type="datetime1">
               <a:rPr lang="en-US" smtClean="0"/>
-              <a:t>3/12/14</a:t>
+              <a:t>3/13/14</a:t>
             </a:fld>
             <a:endParaRPr lang="en-US"/>
           </a:p>
@@ -2598,7 +2598,7 @@
           <a:p>
             <a:fld id="{F9363E99-0E05-EC47-BCC0-E91FDDCCA8B7}" type="datetime1">
               <a:rPr lang="en-US" smtClean="0"/>
-              <a:t>3/12/14</a:t>
+              <a:t>3/13/14</a:t>
             </a:fld>
             <a:endParaRPr lang="en-US"/>
           </a:p>
@@ -2875,7 +2875,7 @@
           <a:p>
             <a:fld id="{8459220B-6E41-5244-A91F-1E491E52B031}" type="datetime1">
               <a:rPr lang="en-US" smtClean="0"/>
-              <a:t>3/12/14</a:t>
+              <a:t>3/13/14</a:t>
             </a:fld>
             <a:endParaRPr lang="en-US"/>
           </a:p>
@@ -3128,7 +3128,7 @@
           <a:p>
             <a:fld id="{AFB6ADB3-88FB-AF4A-89D2-F9DB3096AC7B}" type="datetime1">
               <a:rPr lang="en-US" smtClean="0"/>
-              <a:t>3/12/14</a:t>
+              <a:t>3/13/14</a:t>
             </a:fld>
             <a:endParaRPr lang="en-US"/>
           </a:p>
@@ -3341,7 +3341,7 @@
           <a:p>
             <a:fld id="{ADCA7099-9EBC-A04D-8D07-3FE1BF80B03E}" type="datetime1">
               <a:rPr lang="en-US" smtClean="0"/>
-              <a:t>3/12/14</a:t>
+              <a:t>3/13/14</a:t>
             </a:fld>
             <a:endParaRPr lang="en-US"/>
           </a:p>
@@ -3757,9 +3757,22 @@
           <a:p>
             <a:r>
               <a:rPr lang="en-US" dirty="0" smtClean="0"/>
-              <a:t>Unix Systems “tracing”</a:t>
-            </a:r>
+              <a:t>Unix Systems “tracing</a:t>
+            </a:r>
+            <a:r>
+              <a:rPr lang="en-US" dirty="0" smtClean="0"/>
+              <a:t>”</a:t>
+            </a:r>
+          </a:p>
+          <a:p>
             <a:endParaRPr lang="en-US" dirty="0"/>
+          </a:p>
+          <a:p>
+            <a:r>
+              <a:rPr lang="en-US" sz="2800" dirty="0" smtClean="0"/>
+              <a:t>2014.03.13</a:t>
+            </a:r>
+            <a:endParaRPr lang="en-US" sz="2800" dirty="0"/>
           </a:p>
         </p:txBody>
       </p:sp>
@@ -3796,6 +3809,13 @@
   <p:clrMapOvr>
     <a:masterClrMapping/>
   </p:clrMapOvr>
+  <p:timing>
+    <p:tnLst>
+      <p:par>
+        <p:cTn xmlns:p14="http://schemas.microsoft.com/office/powerpoint/2010/main" id="1" dur="indefinite" restart="never" nodeType="tmRoot"/>
+      </p:par>
+    </p:tnLst>
+  </p:timing>
 </p:sld>
 </file>
 
@@ -3908,21 +3928,34 @@
           <a:p>
             <a:r>
               <a:rPr lang="en-US" dirty="0"/>
-              <a:t>c</a:t>
-            </a:r>
-            <a:r>
-              <a:rPr lang="en-US" dirty="0" smtClean="0"/>
-              <a:t>ompact</a:t>
-            </a:r>
-          </a:p>
-          <a:p>
-            <a:r>
-              <a:rPr lang="en-US" dirty="0"/>
-              <a:t>s</a:t>
-            </a:r>
-            <a:r>
-              <a:rPr lang="en-US" dirty="0" smtClean="0"/>
-              <a:t>trings – replaced to show address</a:t>
+              <a:t>m</a:t>
+            </a:r>
+            <a:r>
+              <a:rPr lang="en-US" dirty="0" smtClean="0"/>
+              <a:t>ore c</a:t>
+            </a:r>
+            <a:r>
+              <a:rPr lang="en-US" dirty="0" smtClean="0"/>
+              <a:t>ompact specification </a:t>
+            </a:r>
+            <a:r>
+              <a:rPr lang="en-US" sz="1600" dirty="0" smtClean="0"/>
+              <a:t>(at least 1 less (%d, vs. “&lt;&lt;“))</a:t>
+            </a:r>
+            <a:endParaRPr lang="en-US" sz="1600" dirty="0" smtClean="0"/>
+          </a:p>
+          <a:p>
+            <a:r>
+              <a:rPr lang="en-US" dirty="0" smtClean="0"/>
+              <a:t>Strings (%s) </a:t>
+            </a:r>
+            <a:r>
+              <a:rPr lang="en-US" dirty="0" smtClean="0"/>
+              <a:t>– replaced to show </a:t>
+            </a:r>
+            <a:r>
+              <a:rPr lang="en-US" dirty="0" smtClean="0"/>
+              <a:t>address %p</a:t>
             </a:r>
             <a:endParaRPr lang="en-US" dirty="0"/>
           </a:p>
@@ -3961,6 +3994,13 @@
   <p:clrMapOvr>
     <a:masterClrMapping/>
   </p:clrMapOvr>
+  <p:timing>
+    <p:tnLst>
+      <p:par>
+        <p:cTn xmlns:p14="http://schemas.microsoft.com/office/powerpoint/2010/main" id="1" dur="indefinite" restart="never" nodeType="tmRoot"/>
+      </p:par>
+    </p:tnLst>
+  </p:timing>
 </p:sld>
 </file>
 
@@ -4289,6 +4329,13 @@
   <p:clrMapOvr>
     <a:masterClrMapping/>
   </p:clrMapOvr>
+  <p:timing>
+    <p:tnLst>
+      <p:par>
+        <p:cTn xmlns:p14="http://schemas.microsoft.com/office/powerpoint/2010/main" id="1" dur="indefinite" restart="never" nodeType="tmRoot"/>
+      </p:par>
+    </p:tnLst>
+  </p:timing>
 </p:sld>
 </file>
 
@@ -4348,22 +4395,57 @@
           <a:lstStyle/>
           <a:p>
             <a:r>
-              <a:rPr lang="en-US" dirty="0" smtClean="0"/>
-              <a:t>No check on field width </a:t>
+              <a:rPr lang="en-US" dirty="0"/>
+              <a:t>n</a:t>
+            </a:r>
+            <a:r>
+              <a:rPr lang="en-US" dirty="0" smtClean="0"/>
+              <a:t>o </a:t>
+            </a:r>
+            <a:r>
+              <a:rPr lang="en-US" dirty="0" smtClean="0"/>
+              <a:t>check on field width </a:t>
             </a:r>
             <a:r>
               <a:rPr lang="en-US" dirty="0" smtClean="0">
                 <a:sym typeface="Wingdings"/>
               </a:rPr>
-              <a:t> user can specify %200000s</a:t>
-            </a:r>
-          </a:p>
-          <a:p>
+              <a:t> user can specify %</a:t>
+            </a:r>
             <a:r>
               <a:rPr lang="en-US" dirty="0" smtClean="0">
                 <a:sym typeface="Wingdings"/>
               </a:rPr>
-              <a:t>No check on </a:t>
+              <a:t>200000s  </a:t>
+            </a:r>
+            <a:r>
+              <a:rPr lang="en-US" sz="1800" dirty="0" smtClean="0">
+                <a:sym typeface="Wingdings"/>
+              </a:rPr>
+              <a:t>(what can one really do about this?)</a:t>
+            </a:r>
+            <a:endParaRPr lang="en-US" sz="1800" dirty="0" smtClean="0">
+              <a:sym typeface="Wingdings"/>
+            </a:endParaRPr>
+          </a:p>
+          <a:p>
+            <a:r>
+              <a:rPr lang="en-US" dirty="0">
+                <a:sym typeface="Wingdings"/>
+              </a:rPr>
+              <a:t>n</a:t>
+            </a:r>
+            <a:r>
+              <a:rPr lang="en-US" dirty="0" smtClean="0">
+                <a:sym typeface="Wingdings"/>
+              </a:rPr>
+              <a:t>o </a:t>
+            </a:r>
+            <a:r>
+              <a:rPr lang="en-US" dirty="0" smtClean="0">
+                <a:sym typeface="Wingdings"/>
+              </a:rPr>
+              <a:t>check on </a:t>
             </a:r>
             <a:r>
               <a:rPr lang="en-US" dirty="0" err="1" smtClean="0">
@@ -4413,10 +4495,42 @@
           </a:p>
           <a:p>
             <a:r>
+              <a:rPr lang="en-US" dirty="0">
+                <a:sym typeface="Wingdings"/>
+              </a:rPr>
+              <a:t>b</a:t>
+            </a:r>
+            <a:r>
               <a:rPr lang="en-US" dirty="0" smtClean="0">
                 <a:sym typeface="Wingdings"/>
               </a:rPr>
-              <a:t>Bit masks are problematic for some.</a:t>
+              <a:t>it </a:t>
+            </a:r>
+            <a:r>
+              <a:rPr lang="en-US" dirty="0" smtClean="0">
+                <a:sym typeface="Wingdings"/>
+              </a:rPr>
+              <a:t>masks are problematic for some</a:t>
+            </a:r>
+            <a:r>
+              <a:rPr lang="en-US" dirty="0" smtClean="0">
+                <a:sym typeface="Wingdings"/>
+              </a:rPr>
+              <a:t>.</a:t>
+            </a:r>
+          </a:p>
+          <a:p>
+            <a:r>
+              <a:rPr lang="en-US" dirty="0">
+                <a:sym typeface="Wingdings"/>
+              </a:rPr>
+              <a:t>u</a:t>
+            </a:r>
+            <a:r>
+              <a:rPr lang="en-US" dirty="0" smtClean="0">
+                <a:sym typeface="Wingdings"/>
+              </a:rPr>
+              <a:t>pdated mf integration</a:t>
             </a:r>
             <a:endParaRPr lang="en-US" dirty="0"/>
           </a:p>
@@ -4455,6 +4569,13 @@
   <p:clrMapOvr>
     <a:masterClrMapping/>
   </p:clrMapOvr>
+  <p:timing>
+    <p:tnLst>
+      <p:par>
+        <p:cTn xmlns:p14="http://schemas.microsoft.com/office/powerpoint/2010/main" id="1" dur="indefinite" restart="never" nodeType="tmRoot"/>
+      </p:par>
+    </p:tnLst>
+  </p:timing>
 </p:sld>
 </file>
 
@@ -4789,6 +4910,13 @@
   <p:clrMapOvr>
     <a:masterClrMapping/>
   </p:clrMapOvr>
+  <p:timing>
+    <p:tnLst>
+      <p:par>
+        <p:cTn xmlns:p14="http://schemas.microsoft.com/office/powerpoint/2010/main" id="1" dur="indefinite" restart="never" nodeType="tmRoot"/>
+      </p:par>
+    </p:tnLst>
+  </p:timing>
 </p:sld>
 </file>
 
@@ -4888,6 +5016,13 @@
   <p:clrMapOvr>
     <a:masterClrMapping/>
   </p:clrMapOvr>
+  <p:timing>
+    <p:tnLst>
+      <p:par>
+        <p:cTn xmlns:p14="http://schemas.microsoft.com/office/powerpoint/2010/main" id="1" dur="indefinite" restart="never" nodeType="tmRoot"/>
+      </p:par>
+    </p:tnLst>
+  </p:timing>
 </p:sld>
 </file>
 
@@ -5114,34 +5249,29 @@
             <p:ph idx="1"/>
           </p:nvPr>
         </p:nvSpPr>
-        <p:spPr/>
-        <p:txBody>
-          <a:bodyPr/>
-          <a:lstStyle/>
-          <a:p>
-            <a:r>
-              <a:rPr lang="en-US" dirty="0" smtClean="0"/>
-              <a:t>28 </a:t>
-            </a:r>
-            <a:r>
-              <a:rPr lang="en-US" dirty="0" smtClean="0"/>
-              <a:t>years </a:t>
+        <p:spPr>
+          <a:xfrm>
+            <a:off x="457200" y="1600200"/>
+            <a:ext cx="8229600" cy="4912238"/>
+          </a:xfrm>
+        </p:spPr>
+        <p:txBody>
+          <a:bodyPr>
+            <a:normAutofit lnSpcReduction="10000"/>
+          </a:bodyPr>
+          <a:lstStyle/>
+          <a:p>
+            <a:r>
+              <a:rPr lang="en-US" dirty="0" smtClean="0"/>
+              <a:t>28 years </a:t>
             </a:r>
             <a:r>
               <a:rPr lang="en-US" sz="2400" dirty="0" smtClean="0"/>
-              <a:t>(as of </a:t>
-            </a:r>
-            <a:r>
-              <a:rPr lang="en-US" sz="2400" dirty="0" smtClean="0"/>
-              <a:t>2014) of </a:t>
-            </a:r>
-            <a:r>
-              <a:rPr lang="en-US" dirty="0" smtClean="0"/>
-              <a:t>“</a:t>
-            </a:r>
-            <a:r>
-              <a:rPr lang="en-US" dirty="0" smtClean="0"/>
-              <a:t>trace”</a:t>
+              <a:t>(as of 2014) of </a:t>
+            </a:r>
+            <a:r>
+              <a:rPr lang="en-US" dirty="0" smtClean="0"/>
+              <a:t>“trace”</a:t>
             </a:r>
           </a:p>
           <a:p>
@@ -5167,11 +5297,7 @@
             <a:pPr lvl="1"/>
             <a:r>
               <a:rPr lang="en-US" dirty="0" smtClean="0"/>
-              <a:t>OS </a:t>
-            </a:r>
-            <a:r>
-              <a:rPr lang="en-US" dirty="0" smtClean="0"/>
-              <a:t>interactions (</a:t>
+              <a:t>OS interactions (</a:t>
             </a:r>
             <a:r>
               <a:rPr lang="en-US" dirty="0" err="1" smtClean="0"/>
@@ -5202,17 +5328,28 @@
             </a:r>
             <a:r>
               <a:rPr lang="en-US" dirty="0" smtClean="0"/>
-              <a:t> change (</a:t>
-            </a:r>
-            <a:r>
-              <a:rPr lang="en-US" dirty="0" err="1" smtClean="0"/>
+              <a:t> change </a:t>
+            </a:r>
+            <a:r>
+              <a:rPr lang="en-US" sz="2200" dirty="0" smtClean="0"/>
+              <a:t>(</a:t>
+            </a:r>
+            <a:r>
+              <a:rPr lang="en-US" sz="2200" dirty="0" err="1" smtClean="0"/>
               <a:t>i.e</a:t>
             </a:r>
             <a:r>
-              <a:rPr lang="en-US" dirty="0" smtClean="0"/>
-              <a:t> separate interrupt)</a:t>
-            </a:r>
-            <a:endParaRPr lang="en-US" dirty="0" smtClean="0"/>
+              <a:rPr lang="en-US" sz="2200" dirty="0" smtClean="0"/>
+              <a:t> </a:t>
+            </a:r>
+            <a:r>
+              <a:rPr lang="en-US" sz="2200" dirty="0" smtClean="0"/>
+              <a:t>use separate </a:t>
+            </a:r>
+            <a:r>
+              <a:rPr lang="en-US" sz="2200" dirty="0" smtClean="0"/>
+              <a:t>interrupt)</a:t>
+            </a:r>
           </a:p>
           <a:p>
             <a:r>
@@ -5244,46 +5381,107 @@
               <a:rPr lang="en-US" dirty="0" smtClean="0">
                 <a:sym typeface="Wingdings"/>
               </a:rPr>
-              <a:t>(too) Sophisticated, SLF6 kernel needs patch</a:t>
-            </a:r>
-          </a:p>
-          <a:p>
-            <a:pPr lvl="1"/>
+              <a:t>(too) Sophisticated, SLF6 kernel needs </a:t>
+            </a:r>
+            <a:r>
+              <a:rPr lang="en-US" dirty="0" smtClean="0">
+                <a:sym typeface="Wingdings"/>
+              </a:rPr>
+              <a:t>patch</a:t>
+            </a:r>
+          </a:p>
+          <a:p>
+            <a:pPr lvl="2"/>
+            <a:r>
+              <a:rPr lang="en-US" dirty="0" smtClean="0">
+                <a:sym typeface="Wingdings"/>
+              </a:rPr>
+              <a:t>Maybe it will get “simple”</a:t>
+            </a:r>
+            <a:endParaRPr lang="en-US" dirty="0" smtClean="0">
+              <a:sym typeface="Wingdings"/>
+            </a:endParaRPr>
+          </a:p>
+          <a:p>
+            <a:pPr lvl="2"/>
             <a:r>
               <a:rPr lang="en-US" dirty="0"/>
               <a:t>﻿</a:t>
             </a:r>
             <a:r>
-              <a:rPr lang="en-US" sz="2000" dirty="0"/>
+              <a:rPr lang="en-US" sz="1600" dirty="0"/>
               <a:t>https://</a:t>
             </a:r>
             <a:r>
-              <a:rPr lang="en-US" sz="2000" dirty="0" err="1"/>
+              <a:rPr lang="en-US" sz="1600" dirty="0" err="1"/>
               <a:t>lttng.org</a:t>
             </a:r>
             <a:r>
-              <a:rPr lang="en-US" sz="2000" dirty="0"/>
+              <a:rPr lang="en-US" sz="1600" dirty="0"/>
               <a:t>/files/doc/man-pages/man3/lttng-ust.3.</a:t>
             </a:r>
             <a:r>
-              <a:rPr lang="en-US" sz="2000" dirty="0" smtClean="0"/>
+              <a:rPr lang="en-US" sz="1600" dirty="0" smtClean="0"/>
               <a:t>html</a:t>
             </a:r>
           </a:p>
           <a:p>
+            <a:pPr lvl="3"/>
+            <a:r>
+              <a:rPr lang="en-US" sz="1200" dirty="0"/>
+              <a:t>Dated ﻿</a:t>
+            </a:r>
+            <a:r>
+              <a:rPr lang="en-US" sz="1200" dirty="0" smtClean="0"/>
+              <a:t>February </a:t>
+            </a:r>
+            <a:r>
+              <a:rPr lang="en-US" sz="1200" dirty="0"/>
+              <a:t>16, </a:t>
+            </a:r>
+            <a:r>
+              <a:rPr lang="en-US" sz="1200" dirty="0" smtClean="0"/>
+              <a:t>2012</a:t>
+            </a:r>
+          </a:p>
+          <a:p>
+            <a:pPr lvl="1"/>
+            <a:r>
+              <a:rPr lang="en-US" dirty="0" smtClean="0"/>
+              <a:t>But, significant parts of TRACE are “general </a:t>
+            </a:r>
+            <a:r>
+              <a:rPr lang="en-US" dirty="0" err="1" smtClean="0"/>
+              <a:t>unix</a:t>
+            </a:r>
+            <a:r>
+              <a:rPr lang="en-US" dirty="0" smtClean="0"/>
+              <a:t>”</a:t>
+            </a:r>
+          </a:p>
+          <a:p>
             <a:pPr lvl="2"/>
             <a:r>
-              <a:rPr lang="en-US" sz="1600" dirty="0"/>
-              <a:t>Dated ﻿</a:t>
-            </a:r>
-            <a:r>
-              <a:rPr lang="en-US" sz="1600" dirty="0" smtClean="0"/>
-              <a:t>February </a:t>
-            </a:r>
-            <a:r>
-              <a:rPr lang="en-US" sz="1600" dirty="0"/>
-              <a:t>16, 2012</a:t>
-            </a:r>
+              <a:rPr lang="en-US" dirty="0"/>
+              <a:t>r</a:t>
+            </a:r>
+            <a:r>
+              <a:rPr lang="en-US" dirty="0" smtClean="0"/>
+              <a:t>ecently </a:t>
+            </a:r>
+            <a:r>
+              <a:rPr lang="en-US" dirty="0" err="1" smtClean="0"/>
+              <a:t>TRACE’d</a:t>
+            </a:r>
+            <a:r>
+              <a:rPr lang="en-US" dirty="0" smtClean="0"/>
+              <a:t> on SUNOS (</a:t>
+            </a:r>
+            <a:r>
+              <a:rPr lang="en-US" smtClean="0"/>
+              <a:t>user space)</a:t>
+            </a:r>
+            <a:endParaRPr lang="en-US" dirty="0"/>
           </a:p>
         </p:txBody>
       </p:sp>
@@ -5320,6 +5518,13 @@
   <p:clrMapOvr>
     <a:masterClrMapping/>
   </p:clrMapOvr>
+  <p:timing>
+    <p:tnLst>
+      <p:par>
+        <p:cTn xmlns:p14="http://schemas.microsoft.com/office/powerpoint/2010/main" id="1" dur="indefinite" restart="never" nodeType="tmRoot"/>
+      </p:par>
+    </p:tnLst>
+  </p:timing>
 </p:sld>
 </file>
 
@@ -5453,8 +5658,8 @@
               <a:t> </a:t>
             </a:r>
             <a:r>
-              <a:rPr lang="en-US" dirty="0" err="1" smtClean="0"/>
-              <a:t>readonly</a:t>
+              <a:rPr lang="en-US" dirty="0" smtClean="0"/>
+              <a:t>read-only</a:t>
             </a:r>
             <a:r>
               <a:rPr lang="en-US" dirty="0" smtClean="0"/>
@@ -5532,6 +5737,13 @@
   <p:clrMapOvr>
     <a:masterClrMapping/>
   </p:clrMapOvr>
+  <p:timing>
+    <p:tnLst>
+      <p:par>
+        <p:cTn xmlns:p14="http://schemas.microsoft.com/office/powerpoint/2010/main" id="1" dur="indefinite" restart="never" nodeType="tmRoot"/>
+      </p:par>
+    </p:tnLst>
+  </p:timing>
 </p:sld>
 </file>
 
@@ -5587,8 +5799,8 @@
         </p:nvSpPr>
         <p:spPr>
           <a:xfrm>
-            <a:off x="286537" y="1417639"/>
-            <a:ext cx="8461927" cy="4459818"/>
+            <a:off x="518863" y="1417639"/>
+            <a:ext cx="8224373" cy="3724167"/>
           </a:xfrm>
         </p:spPr>
         <p:txBody>
@@ -5602,25 +5814,22 @@
               <a:t>﻿simple ... </a:t>
             </a:r>
             <a:r>
-              <a:rPr lang="en-US" sz="2000" dirty="0" smtClean="0"/>
+              <a:rPr lang="en-US" sz="1800" dirty="0" smtClean="0"/>
               <a:t>(and complex/sophisticated </a:t>
             </a:r>
             <a:r>
-              <a:rPr lang="en-US" sz="2000" dirty="0"/>
+              <a:rPr lang="en-US" sz="1800" dirty="0"/>
               <a:t>too </a:t>
             </a:r>
             <a:r>
-              <a:rPr lang="en-US" sz="2000" dirty="0" smtClean="0"/>
+              <a:rPr lang="en-US" sz="1800" dirty="0" smtClean="0"/>
               <a:t>– details, </a:t>
             </a:r>
             <a:r>
-              <a:rPr lang="en-US" sz="2000" dirty="0" err="1" smtClean="0"/>
-              <a:t>controllablity</a:t>
-            </a:r>
-            <a:r>
-              <a:rPr lang="en-US" sz="2000" dirty="0" smtClean="0"/>
-              <a:t>)</a:t>
-            </a:r>
+              <a:rPr lang="en-US" sz="1800" dirty="0" smtClean="0"/>
+              <a:t>controllability)</a:t>
+            </a:r>
+            <a:endParaRPr lang="en-US" sz="1800" dirty="0" smtClean="0"/>
           </a:p>
           <a:p>
             <a:pPr lvl="1"/>
@@ -5641,8 +5850,21 @@
             </a:r>
             <a:r>
               <a:rPr lang="en-US" sz="1600" dirty="0" smtClean="0"/>
-              <a:t>– 2 macros TRACE and TRACE_CNTL</a:t>
-            </a:r>
+              <a:t>– 2 </a:t>
+            </a:r>
+            <a:r>
+              <a:rPr lang="en-US" sz="1600" dirty="0" smtClean="0"/>
+              <a:t>macros: </a:t>
+            </a:r>
+            <a:r>
+              <a:rPr lang="en-US" sz="1600" dirty="0" smtClean="0"/>
+              <a:t>TRACE and </a:t>
+            </a:r>
+            <a:r>
+              <a:rPr lang="en-US" sz="1600" dirty="0" smtClean="0"/>
+              <a:t>TRACE_CNTL (advanced usage)</a:t>
+            </a:r>
+            <a:endParaRPr lang="en-US" sz="1600" dirty="0" smtClean="0"/>
           </a:p>
           <a:p>
             <a:pPr lvl="3"/>
@@ -5722,66 +5944,14 @@
           <a:p>
             <a:pPr lvl="2"/>
             <a:r>
+              <a:rPr lang="en-US" dirty="0" err="1"/>
+              <a:t>l</a:t>
+            </a:r>
+            <a:r>
               <a:rPr lang="en-US" dirty="0" err="1" smtClean="0"/>
-              <a:t>libtrace</a:t>
-            </a:r>
-            <a:r>
-              <a:rPr lang="en-US" dirty="0"/>
-              <a:t/>
-            </a:r>
-            <a:br>
-              <a:rPr lang="en-US" dirty="0"/>
-            </a:br>
-            <a:r>
-              <a:rPr lang="en-US" sz="1600" dirty="0" smtClean="0"/>
-              <a:t> </a:t>
+              <a:t>ibtrace</a:t>
             </a:r>
             <a:endParaRPr lang="en-US" dirty="0" smtClean="0"/>
-          </a:p>
-          <a:p>
-            <a:r>
-              <a:rPr lang="en-US" sz="2400" dirty="0"/>
-              <a:t>﻿</a:t>
-            </a:r>
-            <a:r>
-              <a:rPr lang="en-US" sz="2400" dirty="0" err="1"/>
-              <a:t>printf</a:t>
-            </a:r>
-            <a:r>
-              <a:rPr lang="en-US" sz="2400" dirty="0"/>
-              <a:t> debugging - or not  (</a:t>
-            </a:r>
-            <a:r>
-              <a:rPr lang="en-US" sz="2400" dirty="0" err="1"/>
-              <a:t>tlvlS</a:t>
-            </a:r>
-            <a:r>
-              <a:rPr lang="en-US" sz="2400" dirty="0"/>
-              <a:t> and TRACE_LOG_FUNCTION</a:t>
-            </a:r>
-            <a:r>
-              <a:rPr lang="en-US" sz="2400" dirty="0" smtClean="0"/>
-              <a:t>)</a:t>
-            </a:r>
-          </a:p>
-          <a:p>
-            <a:pPr lvl="1"/>
-            <a:r>
-              <a:rPr lang="en-US" sz="2000" dirty="0"/>
-              <a:t>a</a:t>
-            </a:r>
-            <a:r>
-              <a:rPr lang="en-US" sz="2000" dirty="0" smtClean="0"/>
-              <a:t>ka console logging  (controllable – timestamps match w/ </a:t>
-            </a:r>
-            <a:r>
-              <a:rPr lang="en-US" sz="2000" dirty="0" err="1" smtClean="0"/>
-              <a:t>mem</a:t>
-            </a:r>
-            <a:r>
-              <a:rPr lang="en-US" sz="2000" dirty="0" smtClean="0"/>
-              <a:t>)</a:t>
-            </a:r>
           </a:p>
         </p:txBody>
       </p:sp>
@@ -5856,6 +6026,13 @@
   <p:clrMapOvr>
     <a:masterClrMapping/>
   </p:clrMapOvr>
+  <p:timing>
+    <p:tnLst>
+      <p:par>
+        <p:cTn xmlns:p14="http://schemas.microsoft.com/office/powerpoint/2010/main" id="1" dur="indefinite" restart="never" nodeType="tmRoot"/>
+      </p:par>
+    </p:tnLst>
+  </p:timing>
 </p:sld>
 </file>
 
@@ -5921,7 +6098,12 @@
             <p:ph idx="1"/>
           </p:nvPr>
         </p:nvSpPr>
-        <p:spPr/>
+        <p:spPr>
+          <a:xfrm>
+            <a:off x="457200" y="1259478"/>
+            <a:ext cx="8229600" cy="5376859"/>
+          </a:xfrm>
+        </p:spPr>
         <p:txBody>
           <a:bodyPr>
             <a:normAutofit fontScale="77500" lnSpcReduction="20000"/>
@@ -5969,8 +6151,24 @@
             </a:r>
             <a:r>
               <a:rPr lang="en-US" dirty="0" smtClean="0"/>
-              <a:t>(just possible contention)</a:t>
-            </a:r>
+              <a:t>(just possible contention</a:t>
+            </a:r>
+            <a:r>
+              <a:rPr lang="en-US" dirty="0" smtClean="0"/>
+              <a:t>)</a:t>
+            </a:r>
+          </a:p>
+          <a:p>
+            <a:pPr lvl="2"/>
+            <a:r>
+              <a:rPr lang="en-US" dirty="0"/>
+              <a:t>n</a:t>
+            </a:r>
+            <a:r>
+              <a:rPr lang="en-US" dirty="0" smtClean="0"/>
+              <a:t>o loss, no overwrite with “trigger” functionality</a:t>
+            </a:r>
+            <a:endParaRPr lang="en-US" dirty="0" smtClean="0"/>
           </a:p>
           <a:p>
             <a:pPr lvl="1"/>
@@ -5989,6 +6187,38 @@
             <a:r>
               <a:rPr lang="en-US" dirty="0" err="1" smtClean="0"/>
               <a:t>show’d</a:t>
+            </a:r>
+            <a:endParaRPr lang="en-US" dirty="0" smtClean="0"/>
+          </a:p>
+          <a:p>
+            <a:pPr lvl="2"/>
+            <a:r>
+              <a:rPr lang="en-US" dirty="0"/>
+              <a:t>n</a:t>
+            </a:r>
+            <a:r>
+              <a:rPr lang="en-US" dirty="0" smtClean="0"/>
+              <a:t>o string arguments – they must be “formatted in” (</a:t>
+            </a:r>
+            <a:r>
+              <a:rPr lang="en-US" dirty="0" err="1" smtClean="0"/>
+              <a:t>ie</a:t>
+            </a:r>
+            <a:r>
+              <a:rPr lang="en-US" dirty="0" smtClean="0"/>
+              <a:t>. </a:t>
+            </a:r>
+            <a:r>
+              <a:rPr lang="en-US" dirty="0" err="1"/>
+              <a:t>s</a:t>
+            </a:r>
+            <a:r>
+              <a:rPr lang="en-US" dirty="0" err="1" smtClean="0"/>
+              <a:t>printf</a:t>
+            </a:r>
+            <a:r>
+              <a:rPr lang="en-US" dirty="0" smtClean="0"/>
+              <a:t>)</a:t>
             </a:r>
             <a:endParaRPr lang="en-US" dirty="0" smtClean="0"/>
           </a:p>
@@ -6058,19 +6288,7 @@
               <a:rPr lang="en-US" sz="1700" dirty="0" smtClean="0">
                 <a:sym typeface="Wingdings"/>
               </a:rPr>
-              <a:t>(and also, to a </a:t>
-            </a:r>
-            <a:r>
-              <a:rPr lang="en-US" sz="1700" smtClean="0">
-                <a:sym typeface="Wingdings"/>
-              </a:rPr>
-              <a:t>smaller degree, </a:t>
-            </a:r>
-            <a:r>
-              <a:rPr lang="en-US" sz="1700" dirty="0" smtClean="0">
-                <a:sym typeface="Wingdings"/>
-              </a:rPr>
-              <a:t>configuration parameters)</a:t>
+              <a:t>(and also, to a smaller degree, configuration parameters)</a:t>
             </a:r>
           </a:p>
           <a:p>
@@ -6085,12 +6303,20 @@
           </a:p>
           <a:p>
             <a:r>
-              <a:rPr lang="en-US" dirty="0" smtClean="0"/>
-              <a:t>Slow</a:t>
+              <a:rPr lang="en-US" dirty="0"/>
+              <a:t>s</a:t>
+            </a:r>
+            <a:r>
+              <a:rPr lang="en-US" dirty="0" smtClean="0"/>
+              <a:t>low</a:t>
             </a:r>
             <a:r>
               <a:rPr lang="en-US" sz="2400" dirty="0" smtClean="0"/>
-              <a:t> – aka </a:t>
+              <a:t> </a:t>
+            </a:r>
+            <a:r>
+              <a:rPr lang="en-US" sz="2400" dirty="0" smtClean="0"/>
+              <a:t>– aka </a:t>
             </a:r>
             <a:r>
               <a:rPr lang="en-US" sz="2400" dirty="0" err="1" smtClean="0"/>
@@ -6183,6 +6409,13 @@
   <p:clrMapOvr>
     <a:masterClrMapping/>
   </p:clrMapOvr>
+  <p:timing>
+    <p:tnLst>
+      <p:par>
+        <p:cTn xmlns:p14="http://schemas.microsoft.com/office/powerpoint/2010/main" id="1" dur="indefinite" restart="never" nodeType="tmRoot"/>
+      </p:par>
+    </p:tnLst>
+  </p:timing>
 </p:sld>
 </file>
 
@@ -6256,7 +6489,7 @@
         </p:spPr>
         <p:txBody>
           <a:bodyPr>
-            <a:normAutofit fontScale="92500" lnSpcReduction="20000"/>
+            <a:normAutofit/>
           </a:bodyPr>
           <a:lstStyle/>
           <a:p>
@@ -6334,157 +6567,13 @@
             </a:r>
             <a:r>
               <a:rPr lang="en-US" dirty="0"/>
-              <a:t> philosophy -- filter</a:t>
-            </a:r>
-          </a:p>
-          <a:p>
-            <a:r>
-              <a:rPr lang="en-US" dirty="0" smtClean="0"/>
-              <a:t>fast </a:t>
-            </a:r>
-            <a:r>
-              <a:rPr lang="en-US" sz="2200" dirty="0"/>
-              <a:t>... f</a:t>
-            </a:r>
-            <a:r>
-              <a:rPr lang="en-US" sz="2200" dirty="0" smtClean="0"/>
-              <a:t>or the most part; there are always limits </a:t>
-            </a:r>
-            <a:r>
-              <a:rPr lang="en-US" sz="2200" dirty="0" smtClean="0">
-                <a:sym typeface="Wingdings"/>
-              </a:rPr>
-              <a:t></a:t>
-            </a:r>
-            <a:endParaRPr lang="en-US" sz="2200" dirty="0" smtClean="0"/>
-          </a:p>
-          <a:p>
-            <a:pPr lvl="1"/>
-            <a:r>
-              <a:rPr lang="en-US" dirty="0"/>
-              <a:t>﻿trace to memory (file) or memories (files</a:t>
-            </a:r>
-            <a:r>
-              <a:rPr lang="en-US" dirty="0" smtClean="0"/>
-              <a:t>)</a:t>
-            </a:r>
-          </a:p>
-          <a:p>
-            <a:pPr lvl="2"/>
-            <a:r>
-              <a:rPr lang="en-US" dirty="0"/>
-              <a:t>c</a:t>
-            </a:r>
-            <a:r>
-              <a:rPr lang="en-US" dirty="0" smtClean="0"/>
-              <a:t>ircular – no back pressure (just possible contention)</a:t>
-            </a:r>
-          </a:p>
-          <a:p>
-            <a:pPr lvl="1"/>
-            <a:r>
-              <a:rPr lang="en-US" dirty="0" smtClean="0"/>
-              <a:t>arguments/</a:t>
-            </a:r>
-            <a:r>
-              <a:rPr lang="en-US" dirty="0" err="1" smtClean="0"/>
-              <a:t>fmt</a:t>
-            </a:r>
-            <a:r>
-              <a:rPr lang="en-US" dirty="0" smtClean="0"/>
-              <a:t> saved – formatted when </a:t>
-            </a:r>
-            <a:r>
-              <a:rPr lang="en-US" dirty="0" err="1" smtClean="0"/>
-              <a:t>show’d</a:t>
-            </a:r>
-            <a:endParaRPr lang="en-US" dirty="0" smtClean="0"/>
-          </a:p>
-          <a:p>
-            <a:pPr lvl="1"/>
-            <a:r>
-              <a:rPr lang="en-US" sz="2400" dirty="0"/>
-              <a:t>﻿</a:t>
-            </a:r>
-            <a:r>
-              <a:rPr lang="en-US" sz="2200" dirty="0"/>
-              <a:t>I have seen a couple of times where I've wanted to limit the </a:t>
-            </a:r>
-            <a:r>
-              <a:rPr lang="en-US" sz="2200" dirty="0" err="1"/>
-              <a:t>lvlM</a:t>
-            </a:r>
-            <a:r>
-              <a:rPr lang="en-US" sz="2200" dirty="0"/>
-              <a:t> mask.  </a:t>
-            </a:r>
-            <a:r>
-              <a:rPr lang="en-US" sz="2200" dirty="0" smtClean="0"/>
-              <a:t>Never </a:t>
-            </a:r>
-            <a:r>
-              <a:rPr lang="en-US" sz="2200" dirty="0"/>
-              <a:t>seen where only a few levels on </a:t>
-            </a:r>
-            <a:r>
-              <a:rPr lang="en-US" sz="2200" dirty="0" smtClean="0"/>
-              <a:t>noticeably </a:t>
-            </a:r>
-            <a:r>
-              <a:rPr lang="en-US" sz="2200" dirty="0"/>
-              <a:t>effected performance.</a:t>
-            </a:r>
-          </a:p>
-          <a:p>
-            <a:pPr lvl="1"/>
-            <a:r>
-              <a:rPr lang="en-US" dirty="0" smtClean="0"/>
-              <a:t>10 to 50 K </a:t>
-            </a:r>
-            <a:r>
-              <a:rPr lang="en-US" dirty="0" err="1" smtClean="0"/>
-              <a:t>msgs</a:t>
-            </a:r>
-            <a:r>
-              <a:rPr lang="en-US" dirty="0" smtClean="0"/>
-              <a:t>/s </a:t>
-            </a:r>
-            <a:r>
-              <a:rPr lang="en-US" dirty="0" smtClean="0">
-                <a:sym typeface="Wingdings"/>
-              </a:rPr>
-              <a:t> &lt;1% </a:t>
-            </a:r>
-            <a:r>
-              <a:rPr lang="en-US" dirty="0" err="1" smtClean="0">
-                <a:sym typeface="Wingdings"/>
-              </a:rPr>
-              <a:t>cpu</a:t>
-            </a:r>
-            <a:r>
-              <a:rPr lang="en-US" dirty="0" smtClean="0">
-                <a:sym typeface="Wingdings"/>
-              </a:rPr>
-              <a:t>, memory bus bandwidth</a:t>
-            </a:r>
-            <a:br>
-              <a:rPr lang="en-US" dirty="0" smtClean="0">
-                <a:sym typeface="Wingdings"/>
-              </a:rPr>
-            </a:br>
-            <a:r>
-              <a:rPr lang="en-US" dirty="0" smtClean="0">
-                <a:sym typeface="Wingdings"/>
-              </a:rPr>
-              <a:t>depending upon contention </a:t>
-            </a:r>
-            <a:r>
-              <a:rPr lang="en-US" sz="1700" dirty="0" smtClean="0">
-                <a:sym typeface="Wingdings"/>
-              </a:rPr>
-              <a:t>(and also configuration parameters)</a:t>
-            </a:r>
-            <a:endParaRPr lang="en-US" sz="1700" dirty="0" smtClean="0"/>
+              <a:t> philosophy -- </a:t>
+            </a:r>
+            <a:r>
+              <a:rPr lang="en-US" dirty="0" smtClean="0"/>
+              <a:t>filter</a:t>
+            </a:r>
+            <a:endParaRPr lang="en-US" dirty="0"/>
           </a:p>
         </p:txBody>
       </p:sp>
@@ -6521,6 +6610,13 @@
   <p:clrMapOvr>
     <a:masterClrMapping/>
   </p:clrMapOvr>
+  <p:timing>
+    <p:tnLst>
+      <p:par>
+        <p:cTn xmlns:p14="http://schemas.microsoft.com/office/powerpoint/2010/main" id="1" dur="indefinite" restart="never" nodeType="tmRoot"/>
+      </p:par>
+    </p:tnLst>
+  </p:timing>
 </p:sld>
 </file>
 
@@ -6916,6 +7012,13 @@
   <p:clrMapOvr>
     <a:masterClrMapping/>
   </p:clrMapOvr>
+  <p:timing>
+    <p:tnLst>
+      <p:par>
+        <p:cTn xmlns:p14="http://schemas.microsoft.com/office/powerpoint/2010/main" id="1" dur="indefinite" restart="never" nodeType="tmRoot"/>
+      </p:par>
+    </p:tnLst>
+  </p:timing>
 </p:sld>
 </file>
 
@@ -7000,11 +7103,7 @@
             </a:r>
             <a:r>
               <a:rPr lang="en-US" dirty="0" smtClean="0"/>
-              <a:t>debugger – breakpoint/single </a:t>
-            </a:r>
-            <a:r>
-              <a:rPr lang="en-US" dirty="0" smtClean="0"/>
-              <a:t>step</a:t>
+              <a:t>debugger – breakpoint/single step</a:t>
             </a:r>
           </a:p>
           <a:p>
@@ -7055,6 +7154,13 @@
   <p:clrMapOvr>
     <a:masterClrMapping/>
   </p:clrMapOvr>
+  <p:timing>
+    <p:tnLst>
+      <p:par>
+        <p:cTn xmlns:p14="http://schemas.microsoft.com/office/powerpoint/2010/main" id="1" dur="indefinite" restart="never" nodeType="tmRoot"/>
+      </p:par>
+    </p:tnLst>
+  </p:timing>
 </p:sld>
 </file>
 
@@ -7511,6 +7617,13 @@
   <p:clrMapOvr>
     <a:masterClrMapping/>
   </p:clrMapOvr>
+  <p:timing>
+    <p:tnLst>
+      <p:par>
+        <p:cTn xmlns:p14="http://schemas.microsoft.com/office/powerpoint/2010/main" id="1" dur="indefinite" restart="never" nodeType="tmRoot"/>
+      </p:par>
+    </p:tnLst>
+  </p:timing>
 </p:sld>
 </file>
 

</xml_diff>

<commit_message>
add to 5-in-1 slide
git-svn-id: svn+ssh://cdcvs.fnal.gov/cvs/projects/trace-svn/trunk@388 f0fafde3-ccc7-4eb4-bb98-6daa41875d3e
</commit_message>
<xml_diff>
--- a/trace/doc/trace.pptx
+++ b/trace/doc/trace.pptx
@@ -209,7 +209,7 @@
           <a:p>
             <a:fld id="{A2FEBFDB-231B-674F-910D-B890E9DE9DBA}" type="datetimeFigureOut">
               <a:rPr lang="en-US" smtClean="0"/>
-              <a:t>4/22/15</a:t>
+              <a:t>5/8/15</a:t>
             </a:fld>
             <a:endParaRPr lang="en-US"/>
           </a:p>
@@ -375,7 +375,7 @@
           <a:p>
             <a:fld id="{D5EAA2E6-C9CE-534C-9D4C-804D2B58C141}" type="datetimeFigureOut">
               <a:rPr lang="en-US" smtClean="0"/>
-              <a:t>4/22/15</a:t>
+              <a:t>5/8/15</a:t>
             </a:fld>
             <a:endParaRPr lang="en-US"/>
           </a:p>
@@ -909,7 +909,7 @@
           <a:p>
             <a:fld id="{B70DB30F-4784-EF47-9BA3-BEEF06E9E02C}" type="datetime1">
               <a:rPr lang="en-US" smtClean="0"/>
-              <a:t>4/22/15</a:t>
+              <a:t>5/8/15</a:t>
             </a:fld>
             <a:endParaRPr lang="en-US"/>
           </a:p>
@@ -1079,7 +1079,7 @@
           <a:p>
             <a:fld id="{816D4DC0-0B9D-A54E-8359-2B0104417767}" type="datetime1">
               <a:rPr lang="en-US" smtClean="0"/>
-              <a:t>4/22/15</a:t>
+              <a:t>5/8/15</a:t>
             </a:fld>
             <a:endParaRPr lang="en-US"/>
           </a:p>
@@ -1259,7 +1259,7 @@
           <a:p>
             <a:fld id="{856A8FCA-27F0-6A4C-9E06-A43F4AA1DA0B}" type="datetime1">
               <a:rPr lang="en-US" smtClean="0"/>
-              <a:t>4/22/15</a:t>
+              <a:t>5/8/15</a:t>
             </a:fld>
             <a:endParaRPr lang="en-US"/>
           </a:p>
@@ -1429,7 +1429,7 @@
           <a:p>
             <a:fld id="{BFADF6ED-B1C8-D948-A600-E6C546B0EC74}" type="datetime1">
               <a:rPr lang="en-US" smtClean="0"/>
-              <a:t>4/22/15</a:t>
+              <a:t>5/8/15</a:t>
             </a:fld>
             <a:endParaRPr lang="en-US"/>
           </a:p>
@@ -1675,7 +1675,7 @@
           <a:p>
             <a:fld id="{2A39BF1A-42E6-F941-8B0D-E3FD3430E673}" type="datetime1">
               <a:rPr lang="en-US" smtClean="0"/>
-              <a:t>4/22/15</a:t>
+              <a:t>5/8/15</a:t>
             </a:fld>
             <a:endParaRPr lang="en-US"/>
           </a:p>
@@ -1963,7 +1963,7 @@
           <a:p>
             <a:fld id="{95B08030-5F35-EC47-AD85-5EE30A5D6FAD}" type="datetime1">
               <a:rPr lang="en-US" smtClean="0"/>
-              <a:t>4/22/15</a:t>
+              <a:t>5/8/15</a:t>
             </a:fld>
             <a:endParaRPr lang="en-US"/>
           </a:p>
@@ -2385,7 +2385,7 @@
           <a:p>
             <a:fld id="{2F5A8964-95A6-F74D-A794-A05915FAEEC1}" type="datetime1">
               <a:rPr lang="en-US" smtClean="0"/>
-              <a:t>4/22/15</a:t>
+              <a:t>5/8/15</a:t>
             </a:fld>
             <a:endParaRPr lang="en-US"/>
           </a:p>
@@ -2503,7 +2503,7 @@
           <a:p>
             <a:fld id="{CBE1E919-B6B9-3B4B-B09D-97116761E1AC}" type="datetime1">
               <a:rPr lang="en-US" smtClean="0"/>
-              <a:t>4/22/15</a:t>
+              <a:t>5/8/15</a:t>
             </a:fld>
             <a:endParaRPr lang="en-US"/>
           </a:p>
@@ -2598,7 +2598,7 @@
           <a:p>
             <a:fld id="{F9363E99-0E05-EC47-BCC0-E91FDDCCA8B7}" type="datetime1">
               <a:rPr lang="en-US" smtClean="0"/>
-              <a:t>4/22/15</a:t>
+              <a:t>5/8/15</a:t>
             </a:fld>
             <a:endParaRPr lang="en-US"/>
           </a:p>
@@ -2875,7 +2875,7 @@
           <a:p>
             <a:fld id="{8459220B-6E41-5244-A91F-1E491E52B031}" type="datetime1">
               <a:rPr lang="en-US" smtClean="0"/>
-              <a:t>4/22/15</a:t>
+              <a:t>5/8/15</a:t>
             </a:fld>
             <a:endParaRPr lang="en-US"/>
           </a:p>
@@ -3128,7 +3128,7 @@
           <a:p>
             <a:fld id="{AFB6ADB3-88FB-AF4A-89D2-F9DB3096AC7B}" type="datetime1">
               <a:rPr lang="en-US" smtClean="0"/>
-              <a:t>4/22/15</a:t>
+              <a:t>5/8/15</a:t>
             </a:fld>
             <a:endParaRPr lang="en-US"/>
           </a:p>
@@ -3341,7 +3341,7 @@
           <a:p>
             <a:fld id="{ADCA7099-9EBC-A04D-8D07-3FE1BF80B03E}" type="datetime1">
               <a:rPr lang="en-US" smtClean="0"/>
-              <a:t>4/22/15</a:t>
+              <a:t>5/8/15</a:t>
             </a:fld>
             <a:endParaRPr lang="en-US"/>
           </a:p>
@@ -4038,9 +4038,9 @@
           <p:nvPr/>
         </p:nvCxnSpPr>
         <p:spPr>
-          <a:xfrm>
-            <a:off x="3378970" y="1955030"/>
-            <a:ext cx="0" cy="3948546"/>
+          <a:xfrm flipH="1">
+            <a:off x="3378969" y="1385452"/>
+            <a:ext cx="1" cy="4702599"/>
           </a:xfrm>
           <a:prstGeom prst="line">
             <a:avLst/>
@@ -4069,8 +4069,8 @@
         </p:nvCxnSpPr>
         <p:spPr>
           <a:xfrm>
-            <a:off x="5909734" y="1955030"/>
-            <a:ext cx="0" cy="3948546"/>
+            <a:off x="5447916" y="1385452"/>
+            <a:ext cx="0" cy="4702599"/>
           </a:xfrm>
           <a:prstGeom prst="line">
             <a:avLst/>
@@ -4099,7 +4099,7 @@
         </p:nvCxnSpPr>
         <p:spPr>
           <a:xfrm>
-            <a:off x="1177637" y="3786909"/>
+            <a:off x="1177637" y="3217331"/>
             <a:ext cx="6573212" cy="0"/>
           </a:xfrm>
           <a:prstGeom prst="line">
@@ -4129,7 +4129,7 @@
         </p:nvSpPr>
         <p:spPr>
           <a:xfrm>
-            <a:off x="4140970" y="2609273"/>
+            <a:off x="4025515" y="2039695"/>
             <a:ext cx="689048" cy="369332"/>
           </a:xfrm>
           <a:prstGeom prst="rect">
@@ -4161,7 +4161,12 @@
             <p:ph type="sldNum" sz="quarter" idx="12"/>
           </p:nvPr>
         </p:nvSpPr>
-        <p:spPr/>
+        <p:spPr>
+          <a:xfrm>
+            <a:off x="6553200" y="5786772"/>
+            <a:ext cx="2133600" cy="365125"/>
+          </a:xfrm>
+        </p:spPr>
         <p:txBody>
           <a:bodyPr/>
           <a:lstStyle/>
@@ -4182,8 +4187,8 @@
         </p:nvSpPr>
         <p:spPr>
           <a:xfrm>
-            <a:off x="5909734" y="4771282"/>
-            <a:ext cx="1954381" cy="923330"/>
+            <a:off x="5892884" y="3490154"/>
+            <a:ext cx="1557049" cy="923330"/>
           </a:xfrm>
           <a:prstGeom prst="rect">
             <a:avLst/>
@@ -4211,9 +4216,12 @@
             <a:pPr algn="ctr"/>
             <a:r>
               <a:rPr lang="en-US" dirty="0"/>
-              <a:t>﻿#define TRACE_LIB</a:t>
-            </a:r>
-            <a:endParaRPr lang="en-US" dirty="0"/>
+              <a:t>﻿</a:t>
+            </a:r>
+            <a:r>
+              <a:rPr lang="en-US" sz="1400" dirty="0"/>
+              <a:t>#define TRACE_LIB</a:t>
+            </a:r>
           </a:p>
         </p:txBody>
       </p:sp>
@@ -4225,7 +4233,94 @@
         </p:nvSpPr>
         <p:spPr>
           <a:xfrm>
-            <a:off x="1232228" y="4767853"/>
+            <a:off x="1450236" y="3490154"/>
+            <a:ext cx="1710725" cy="923330"/>
+          </a:xfrm>
+          <a:prstGeom prst="rect">
+            <a:avLst/>
+          </a:prstGeom>
+          <a:noFill/>
+        </p:spPr>
+        <p:txBody>
+          <a:bodyPr wrap="none" rtlCol="0">
+            <a:spAutoFit/>
+          </a:bodyPr>
+          <a:lstStyle/>
+          <a:p>
+            <a:pPr algn="ctr"/>
+            <a:r>
+              <a:rPr lang="en-US" dirty="0"/>
+              <a:t>k</a:t>
+            </a:r>
+            <a:r>
+              <a:rPr lang="en-US" dirty="0" smtClean="0"/>
+              <a:t>ernel main</a:t>
+            </a:r>
+          </a:p>
+          <a:p>
+            <a:pPr algn="ctr"/>
+            <a:endParaRPr lang="en-US" dirty="0"/>
+          </a:p>
+          <a:p>
+            <a:r>
+              <a:rPr lang="en-US" dirty="0"/>
+              <a:t>﻿</a:t>
+            </a:r>
+            <a:r>
+              <a:rPr lang="en-US" sz="1400" dirty="0"/>
+              <a:t>#define </a:t>
+            </a:r>
+            <a:r>
+              <a:rPr lang="en-US" sz="1400" dirty="0" smtClean="0"/>
+              <a:t>TRACE_IMPL</a:t>
+            </a:r>
+            <a:endParaRPr lang="en-US" sz="1400" dirty="0"/>
+          </a:p>
+        </p:txBody>
+      </p:sp>
+      <p:sp>
+        <p:nvSpPr>
+          <p:cNvPr id="10" name="TextBox 9"/>
+          <p:cNvSpPr txBox="1"/>
+          <p:nvPr/>
+        </p:nvSpPr>
+        <p:spPr>
+          <a:xfrm>
+            <a:off x="1779673" y="2039695"/>
+            <a:ext cx="1233105" cy="369332"/>
+          </a:xfrm>
+          <a:prstGeom prst="rect">
+            <a:avLst/>
+          </a:prstGeom>
+          <a:noFill/>
+        </p:spPr>
+        <p:txBody>
+          <a:bodyPr wrap="none" rtlCol="0">
+            <a:spAutoFit/>
+          </a:bodyPr>
+          <a:lstStyle/>
+          <a:p>
+            <a:r>
+              <a:rPr lang="en-US" dirty="0"/>
+              <a:t>k</a:t>
+            </a:r>
+            <a:r>
+              <a:rPr lang="en-US" dirty="0" smtClean="0"/>
+              <a:t>ernel user</a:t>
+            </a:r>
+            <a:endParaRPr lang="en-US" dirty="0"/>
+          </a:p>
+        </p:txBody>
+      </p:sp>
+      <p:sp>
+        <p:nvSpPr>
+          <p:cNvPr id="12" name="TextBox 11"/>
+          <p:cNvSpPr txBox="1"/>
+          <p:nvPr/>
+        </p:nvSpPr>
+        <p:spPr>
+          <a:xfrm>
+            <a:off x="5604107" y="2039695"/>
             <a:ext cx="2146742" cy="923330"/>
           </a:xfrm>
           <a:prstGeom prst="rect">
@@ -4241,16 +4336,8 @@
           <a:p>
             <a:pPr algn="ctr"/>
             <a:r>
-              <a:rPr lang="en-US" dirty="0"/>
-              <a:t>k</a:t>
-            </a:r>
-            <a:r>
-              <a:rPr lang="en-US" dirty="0" smtClean="0"/>
-              <a:t>ernel </a:t>
-            </a:r>
-            <a:r>
-              <a:rPr lang="en-US" dirty="0" smtClean="0"/>
-              <a:t>main</a:t>
+              <a:rPr lang="en-US" dirty="0" smtClean="0"/>
+              <a:t>Lib user</a:t>
             </a:r>
           </a:p>
           <a:p>
@@ -4261,22 +4348,21 @@
             <a:pPr algn="ctr"/>
             <a:r>
               <a:rPr lang="en-US" dirty="0"/>
-              <a:t>﻿#define TRACE_IMPL</a:t>
-            </a:r>
-            <a:endParaRPr lang="en-US" dirty="0"/>
-          </a:p>
-        </p:txBody>
-      </p:sp>
-      <p:sp>
-        <p:nvSpPr>
-          <p:cNvPr id="10" name="TextBox 9"/>
+              <a:t>﻿#define TRACE_DECL</a:t>
+            </a:r>
+          </a:p>
+        </p:txBody>
+      </p:sp>
+      <p:sp>
+        <p:nvSpPr>
+          <p:cNvPr id="4" name="TextBox 3"/>
           <p:cNvSpPr txBox="1"/>
           <p:nvPr/>
         </p:nvSpPr>
         <p:spPr>
           <a:xfrm>
-            <a:off x="1779673" y="2609273"/>
-            <a:ext cx="1233105" cy="369332"/>
+            <a:off x="1293090" y="4564557"/>
+            <a:ext cx="2085879" cy="769441"/>
           </a:xfrm>
           <a:prstGeom prst="rect">
             <a:avLst/>
@@ -4284,33 +4370,57 @@
           <a:noFill/>
         </p:spPr>
         <p:txBody>
-          <a:bodyPr wrap="none" rtlCol="0">
+          <a:bodyPr wrap="square" rtlCol="0">
             <a:spAutoFit/>
           </a:bodyPr>
           <a:lstStyle/>
           <a:p>
             <a:r>
-              <a:rPr lang="en-US" dirty="0"/>
-              <a:t>k</a:t>
-            </a:r>
-            <a:r>
-              <a:rPr lang="en-US" dirty="0" smtClean="0"/>
-              <a:t>ernel user</a:t>
-            </a:r>
-            <a:endParaRPr lang="en-US" dirty="0"/>
-          </a:p>
-        </p:txBody>
-      </p:sp>
-      <p:sp>
-        <p:nvSpPr>
-          <p:cNvPr id="12" name="TextBox 11"/>
+              <a:rPr lang="en-US" sz="1400" dirty="0" err="1"/>
+              <a:t>t</a:t>
+            </a:r>
+            <a:r>
+              <a:rPr lang="en-US" sz="1400" dirty="0" err="1" smtClean="0"/>
+              <a:t>race_.c</a:t>
+            </a:r>
+            <a:r>
+              <a:rPr lang="en-US" sz="1400" dirty="0" smtClean="0"/>
+              <a:t> defines:</a:t>
+            </a:r>
+          </a:p>
+          <a:p>
+            <a:r>
+              <a:rPr lang="en-US" sz="1000" dirty="0" err="1" smtClean="0"/>
+              <a:t>traceControl_p</a:t>
+            </a:r>
+            <a:endParaRPr lang="en-US" sz="1000" dirty="0" smtClean="0"/>
+          </a:p>
+          <a:p>
+            <a:r>
+              <a:rPr lang="en-US" sz="1000" dirty="0" err="1" smtClean="0"/>
+              <a:t>traceEntries_p</a:t>
+            </a:r>
+            <a:endParaRPr lang="en-US" sz="1000" dirty="0" smtClean="0"/>
+          </a:p>
+          <a:p>
+            <a:r>
+              <a:rPr lang="en-US" sz="1000" dirty="0" err="1" smtClean="0"/>
+              <a:t>traceNamLvls_p</a:t>
+            </a:r>
+            <a:endParaRPr lang="en-US" sz="1000" dirty="0"/>
+          </a:p>
+        </p:txBody>
+      </p:sp>
+      <p:sp>
+        <p:nvSpPr>
+          <p:cNvPr id="13" name="TextBox 12"/>
           <p:cNvSpPr txBox="1"/>
           <p:nvPr/>
         </p:nvSpPr>
         <p:spPr>
           <a:xfrm>
-            <a:off x="5909734" y="2609273"/>
-            <a:ext cx="2146742" cy="923330"/>
+            <a:off x="5434061" y="4456835"/>
+            <a:ext cx="3709939" cy="1631216"/>
           </a:xfrm>
           <a:prstGeom prst="rect">
             <a:avLst/>
@@ -4318,32 +4428,344 @@
           <a:noFill/>
         </p:spPr>
         <p:txBody>
-          <a:bodyPr wrap="none" rtlCol="0">
+          <a:bodyPr wrap="square" rtlCol="0">
             <a:spAutoFit/>
           </a:bodyPr>
           <a:lstStyle/>
           <a:p>
-            <a:pPr algn="ctr"/>
-            <a:r>
-              <a:rPr lang="en-US" dirty="0" smtClean="0"/>
-              <a:t>Lib </a:t>
-            </a:r>
-            <a:r>
-              <a:rPr lang="en-US" dirty="0" smtClean="0"/>
-              <a:t>user</a:t>
-            </a:r>
-          </a:p>
-          <a:p>
-            <a:pPr algn="ctr"/>
-            <a:endParaRPr lang="en-US" dirty="0"/>
-          </a:p>
-          <a:p>
-            <a:pPr algn="ctr"/>
-            <a:r>
-              <a:rPr lang="en-US" dirty="0"/>
-              <a:t>﻿#define TRACE_DECL</a:t>
-            </a:r>
-            <a:endParaRPr lang="en-US" dirty="0"/>
+            <a:r>
+              <a:rPr lang="en-US" sz="1400" dirty="0" err="1" smtClean="0"/>
+              <a:t>tracelib.c</a:t>
+            </a:r>
+            <a:r>
+              <a:rPr lang="en-US" sz="1400" dirty="0" smtClean="0"/>
+              <a:t> defines:</a:t>
+            </a:r>
+          </a:p>
+          <a:p>
+            <a:r>
+              <a:rPr lang="en-US" sz="1400" dirty="0"/>
+              <a:t>﻿</a:t>
+            </a:r>
+            <a:r>
+              <a:rPr lang="en-US" sz="800" dirty="0" err="1"/>
+              <a:t>struct</a:t>
+            </a:r>
+            <a:r>
+              <a:rPr lang="en-US" sz="800" dirty="0"/>
+              <a:t> </a:t>
+            </a:r>
+            <a:r>
+              <a:rPr lang="en-US" sz="800" dirty="0" err="1" smtClean="0"/>
+              <a:t>traceNamLvls_s</a:t>
+            </a:r>
+            <a:r>
+              <a:rPr lang="en-US" sz="800" dirty="0" smtClean="0"/>
+              <a:t>                                       </a:t>
+            </a:r>
+            <a:r>
+              <a:rPr lang="en-US" sz="800" dirty="0" err="1" smtClean="0"/>
+              <a:t>traceNamLvls</a:t>
+            </a:r>
+            <a:r>
+              <a:rPr lang="en-US" sz="800" dirty="0"/>
+              <a:t>[TRACE_DISABLE_NAM_SZ]</a:t>
+            </a:r>
+            <a:r>
+              <a:rPr lang="en-US" sz="800" dirty="0" smtClean="0"/>
+              <a:t>;</a:t>
+            </a:r>
+          </a:p>
+          <a:p>
+            <a:r>
+              <a:rPr lang="en-US" sz="800" dirty="0" smtClean="0"/>
+              <a:t>TRACE_THREAD_LOCAL </a:t>
+            </a:r>
+            <a:r>
+              <a:rPr lang="en-US" sz="800" dirty="0" err="1"/>
+              <a:t>struct</a:t>
+            </a:r>
+            <a:r>
+              <a:rPr lang="en-US" sz="800" dirty="0"/>
+              <a:t> </a:t>
+            </a:r>
+            <a:r>
+              <a:rPr lang="en-US" sz="800" dirty="0" err="1"/>
+              <a:t>traceNamLvls_s</a:t>
+            </a:r>
+            <a:r>
+              <a:rPr lang="en-US" sz="800" dirty="0"/>
+              <a:t>  *</a:t>
+            </a:r>
+            <a:r>
+              <a:rPr lang="en-US" sz="800" dirty="0" err="1"/>
+              <a:t>traceNamLvls_p</a:t>
+            </a:r>
+            <a:r>
+              <a:rPr lang="en-US" sz="800" dirty="0"/>
+              <a:t>=&amp;</a:t>
+            </a:r>
+            <a:r>
+              <a:rPr lang="en-US" sz="800" dirty="0" err="1"/>
+              <a:t>traceNamLvls</a:t>
+            </a:r>
+            <a:r>
+              <a:rPr lang="en-US" sz="800" dirty="0"/>
+              <a:t>[0]</a:t>
+            </a:r>
+            <a:r>
+              <a:rPr lang="en-US" sz="800" dirty="0" smtClean="0"/>
+              <a:t>;</a:t>
+            </a:r>
+          </a:p>
+          <a:p>
+            <a:r>
+              <a:rPr lang="en-US" sz="800" dirty="0" smtClean="0"/>
+              <a:t>TRACE_THREAD_LOCAL </a:t>
+            </a:r>
+            <a:r>
+              <a:rPr lang="en-US" sz="800" dirty="0" err="1"/>
+              <a:t>struct</a:t>
+            </a:r>
+            <a:r>
+              <a:rPr lang="en-US" sz="800" dirty="0"/>
+              <a:t> </a:t>
+            </a:r>
+            <a:r>
+              <a:rPr lang="en-US" sz="800" dirty="0" err="1"/>
+              <a:t>traceEntryHdr_s</a:t>
+            </a:r>
+            <a:r>
+              <a:rPr lang="en-US" sz="800" dirty="0"/>
+              <a:t> *</a:t>
+            </a:r>
+            <a:r>
+              <a:rPr lang="en-US" sz="800" dirty="0" err="1"/>
+              <a:t>traceEntries_p</a:t>
+            </a:r>
+            <a:r>
+              <a:rPr lang="en-US" sz="800" dirty="0" smtClean="0"/>
+              <a:t>;</a:t>
+            </a:r>
+          </a:p>
+          <a:p>
+            <a:r>
+              <a:rPr lang="en-US" sz="800" dirty="0" smtClean="0"/>
+              <a:t>TRACE_THREAD_LOCAL </a:t>
+            </a:r>
+            <a:r>
+              <a:rPr lang="en-US" sz="800" dirty="0" err="1"/>
+              <a:t>struct</a:t>
+            </a:r>
+            <a:r>
+              <a:rPr lang="en-US" sz="800" dirty="0"/>
+              <a:t> </a:t>
+            </a:r>
+            <a:r>
+              <a:rPr lang="en-US" sz="800" dirty="0" err="1"/>
+              <a:t>traceControl_s</a:t>
+            </a:r>
+            <a:r>
+              <a:rPr lang="en-US" sz="800" dirty="0"/>
+              <a:t>  </a:t>
+            </a:r>
+            <a:r>
+              <a:rPr lang="en-US" sz="800" dirty="0" smtClean="0"/>
+              <a:t>  *</a:t>
+            </a:r>
+            <a:r>
+              <a:rPr lang="en-US" sz="800" dirty="0" err="1"/>
+              <a:t>traceControl_p</a:t>
+            </a:r>
+            <a:r>
+              <a:rPr lang="en-US" sz="800" dirty="0"/>
+              <a:t>=NULL</a:t>
+            </a:r>
+            <a:r>
+              <a:rPr lang="en-US" sz="800" dirty="0" smtClean="0"/>
+              <a:t>;</a:t>
+            </a:r>
+          </a:p>
+          <a:p>
+            <a:r>
+              <a:rPr lang="en-US" sz="800" dirty="0" smtClean="0"/>
+              <a:t>TRACE_THREAD_LOCAL </a:t>
+            </a:r>
+            <a:r>
+              <a:rPr lang="en-US" sz="800" dirty="0" err="1"/>
+              <a:t>const</a:t>
+            </a:r>
+            <a:r>
+              <a:rPr lang="en-US" sz="800" dirty="0"/>
+              <a:t> char </a:t>
+            </a:r>
+            <a:r>
+              <a:rPr lang="en-US" sz="800" dirty="0" smtClean="0"/>
+              <a:t>*                      </a:t>
+            </a:r>
+            <a:r>
+              <a:rPr lang="en-US" sz="800" dirty="0" err="1" smtClean="0"/>
+              <a:t>traceFile</a:t>
+            </a:r>
+            <a:r>
+              <a:rPr lang="en-US" sz="800" dirty="0"/>
+              <a:t>="/</a:t>
+            </a:r>
+            <a:r>
+              <a:rPr lang="en-US" sz="800" dirty="0" err="1"/>
+              <a:t>tmp</a:t>
+            </a:r>
+            <a:r>
+              <a:rPr lang="en-US" sz="800" dirty="0"/>
+              <a:t>/</a:t>
+            </a:r>
+            <a:r>
+              <a:rPr lang="en-US" sz="800" dirty="0" err="1"/>
+              <a:t>trace_buffer_%</a:t>
+            </a:r>
+            <a:r>
+              <a:rPr lang="en-US" sz="800" dirty="0" err="1" smtClean="0"/>
+              <a:t>s</a:t>
+            </a:r>
+            <a:r>
+              <a:rPr lang="en-US" sz="800" dirty="0" smtClean="0"/>
+              <a:t>”;</a:t>
+            </a:r>
+          </a:p>
+          <a:p>
+            <a:r>
+              <a:rPr lang="en-US" sz="800" dirty="0" smtClean="0"/>
+              <a:t>TRACE_THREAD_LOCAL </a:t>
+            </a:r>
+            <a:r>
+              <a:rPr lang="en-US" sz="800" dirty="0" err="1"/>
+              <a:t>const</a:t>
+            </a:r>
+            <a:r>
+              <a:rPr lang="en-US" sz="800" dirty="0"/>
+              <a:t> char </a:t>
+            </a:r>
+            <a:r>
+              <a:rPr lang="en-US" sz="800" dirty="0" smtClean="0"/>
+              <a:t>*                      </a:t>
+            </a:r>
+            <a:r>
+              <a:rPr lang="en-US" sz="800" dirty="0" err="1" smtClean="0"/>
+              <a:t>traceName</a:t>
+            </a:r>
+            <a:r>
+              <a:rPr lang="en-US" sz="800" dirty="0"/>
+              <a:t>="TRACE"</a:t>
+            </a:r>
+            <a:r>
+              <a:rPr lang="en-US" sz="800" dirty="0" smtClean="0"/>
+              <a:t>;</a:t>
+            </a:r>
+          </a:p>
+          <a:p>
+            <a:r>
+              <a:rPr lang="en-US" sz="800" dirty="0" err="1"/>
+              <a:t>i</a:t>
+            </a:r>
+            <a:r>
+              <a:rPr lang="en-US" sz="800" dirty="0" err="1" smtClean="0"/>
+              <a:t>nt</a:t>
+            </a:r>
+            <a:r>
+              <a:rPr lang="en-US" sz="800" dirty="0" smtClean="0"/>
+              <a:t>                                                                                  </a:t>
+            </a:r>
+            <a:r>
+              <a:rPr lang="en-US" sz="800" dirty="0" err="1"/>
+              <a:t>tracePrintFd</a:t>
+            </a:r>
+            <a:r>
+              <a:rPr lang="en-US" sz="800" dirty="0"/>
+              <a:t>=1</a:t>
+            </a:r>
+            <a:r>
+              <a:rPr lang="en-US" sz="800" dirty="0" smtClean="0"/>
+              <a:t>;</a:t>
+            </a:r>
+          </a:p>
+          <a:p>
+            <a:r>
+              <a:rPr lang="en-US" sz="800" dirty="0" err="1" smtClean="0"/>
+              <a:t>pid_t</a:t>
+            </a:r>
+            <a:r>
+              <a:rPr lang="en-US" sz="800" dirty="0" smtClean="0"/>
+              <a:t>                                                                             </a:t>
+            </a:r>
+            <a:r>
+              <a:rPr lang="en-US" sz="800" dirty="0" err="1" smtClean="0"/>
+              <a:t>tracePid</a:t>
+            </a:r>
+            <a:r>
+              <a:rPr lang="en-US" sz="800" dirty="0"/>
+              <a:t>=0</a:t>
+            </a:r>
+            <a:r>
+              <a:rPr lang="en-US" sz="800" dirty="0" smtClean="0"/>
+              <a:t>;</a:t>
+            </a:r>
+          </a:p>
+          <a:p>
+            <a:r>
+              <a:rPr lang="en-US" sz="800" dirty="0" smtClean="0"/>
+              <a:t>TRACE_THREAD_LOCAL </a:t>
+            </a:r>
+            <a:r>
+              <a:rPr lang="en-US" sz="800" dirty="0" err="1"/>
+              <a:t>int</a:t>
+            </a:r>
+            <a:r>
+              <a:rPr lang="en-US" sz="800" dirty="0"/>
+              <a:t> </a:t>
+            </a:r>
+            <a:r>
+              <a:rPr lang="en-US" sz="800" dirty="0" smtClean="0"/>
+              <a:t>                                     </a:t>
+            </a:r>
+            <a:r>
+              <a:rPr lang="en-US" sz="800" dirty="0" err="1"/>
+              <a:t>traceTID</a:t>
+            </a:r>
+            <a:r>
+              <a:rPr lang="en-US" sz="800" dirty="0"/>
+              <a:t>=0</a:t>
+            </a:r>
+            <a:r>
+              <a:rPr lang="en-US" sz="800" dirty="0" smtClean="0"/>
+              <a:t>;</a:t>
+            </a:r>
+          </a:p>
+          <a:p>
+            <a:r>
+              <a:rPr lang="en-US" sz="800" dirty="0" smtClean="0"/>
+              <a:t>TRACE_THREAD_LOCAL </a:t>
+            </a:r>
+            <a:r>
+              <a:rPr lang="en-US" sz="800" dirty="0" err="1"/>
+              <a:t>pid_t</a:t>
+            </a:r>
+            <a:r>
+              <a:rPr lang="en-US" sz="800" dirty="0"/>
+              <a:t> </a:t>
+            </a:r>
+            <a:r>
+              <a:rPr lang="en-US" sz="800" dirty="0" smtClean="0"/>
+              <a:t>                                </a:t>
+            </a:r>
+            <a:r>
+              <a:rPr lang="en-US" sz="800" dirty="0" err="1" smtClean="0"/>
+              <a:t>traceTid</a:t>
+            </a:r>
+            <a:r>
+              <a:rPr lang="en-US" sz="800" dirty="0"/>
+              <a:t>=0;</a:t>
+            </a:r>
+            <a:endParaRPr lang="en-US" sz="800" dirty="0" smtClean="0"/>
           </a:p>
         </p:txBody>
       </p:sp>

</xml_diff>